<commit_message>
Completed presentation for Beer City Code 2018
</commit_message>
<xml_diff>
--- a/AWS Java Lambda Functions with Kotlin.pptx
+++ b/AWS Java Lambda Functions with Kotlin.pptx
@@ -5,22 +5,26 @@
     <p:sldMasterId id="2147483763" r:id="rId1"/>
   </p:sldMasterIdLst>
   <p:notesMasterIdLst>
-    <p:notesMasterId r:id="rId12"/>
+    <p:notesMasterId r:id="rId16"/>
   </p:notesMasterIdLst>
   <p:handoutMasterIdLst>
-    <p:handoutMasterId r:id="rId13"/>
+    <p:handoutMasterId r:id="rId17"/>
   </p:handoutMasterIdLst>
   <p:sldIdLst>
     <p:sldId id="256" r:id="rId2"/>
-    <p:sldId id="257" r:id="rId3"/>
-    <p:sldId id="266" r:id="rId4"/>
-    <p:sldId id="258" r:id="rId5"/>
-    <p:sldId id="259" r:id="rId6"/>
-    <p:sldId id="261" r:id="rId7"/>
-    <p:sldId id="265" r:id="rId8"/>
-    <p:sldId id="270" r:id="rId9"/>
-    <p:sldId id="271" r:id="rId10"/>
-    <p:sldId id="269" r:id="rId11"/>
+    <p:sldId id="274" r:id="rId3"/>
+    <p:sldId id="257" r:id="rId4"/>
+    <p:sldId id="266" r:id="rId5"/>
+    <p:sldId id="258" r:id="rId6"/>
+    <p:sldId id="259" r:id="rId7"/>
+    <p:sldId id="272" r:id="rId8"/>
+    <p:sldId id="261" r:id="rId9"/>
+    <p:sldId id="262" r:id="rId10"/>
+    <p:sldId id="265" r:id="rId11"/>
+    <p:sldId id="273" r:id="rId12"/>
+    <p:sldId id="270" r:id="rId13"/>
+    <p:sldId id="271" r:id="rId14"/>
+    <p:sldId id="269" r:id="rId15"/>
   </p:sldIdLst>
   <p:sldSz cx="12188825" cy="6858000"/>
   <p:notesSz cx="6858000" cy="9144000"/>
@@ -223,7 +227,7 @@
           <a:p>
             <a:fld id="{B398E617-937E-FC4A-8748-C6BABACC53FE}" type="datetimeFigureOut">
               <a:rPr lang="en-US" smtClean="0"/>
-              <a:t>6/5/18</a:t>
+              <a:t>6/18/18</a:t>
             </a:fld>
             <a:endParaRPr lang="en-US"/>
           </a:p>
@@ -388,7 +392,7 @@
           <a:p>
             <a:fld id="{1DC1E76F-63EC-3849-B890-E56FE4AABDB1}" type="datetimeFigureOut">
               <a:rPr lang="en-US" smtClean="0"/>
-              <a:t>6/5/18</a:t>
+              <a:t>6/18/18</a:t>
             </a:fld>
             <a:endParaRPr lang="en-US"/>
           </a:p>
@@ -809,7 +813,7 @@
           <a:p>
             <a:fld id="{172E2218-332F-2046-8919-12C975A973BC}" type="slidenum">
               <a:rPr lang="en-US" smtClean="0"/>
-              <a:t>4</a:t>
+              <a:t>5</a:t>
             </a:fld>
             <a:endParaRPr lang="en-US"/>
           </a:p>
@@ -926,7 +930,7 @@
           <a:p>
             <a:fld id="{172E2218-332F-2046-8919-12C975A973BC}" type="slidenum">
               <a:rPr lang="en-US" smtClean="0"/>
-              <a:t>6</a:t>
+              <a:t>8</a:t>
             </a:fld>
             <a:endParaRPr lang="en-US"/>
           </a:p>
@@ -1010,7 +1014,7 @@
           <a:p>
             <a:fld id="{172E2218-332F-2046-8919-12C975A973BC}" type="slidenum">
               <a:rPr lang="en-US" smtClean="0"/>
-              <a:t>7</a:t>
+              <a:t>10</a:t>
             </a:fld>
             <a:endParaRPr lang="en-US"/>
           </a:p>
@@ -1553,7 +1557,7 @@
           <a:p>
             <a:fld id="{96EC5AF0-5E41-B042-958C-1721F105CD05}" type="datetime1">
               <a:rPr lang="en-US" smtClean="0"/>
-              <a:t>6/5/18</a:t>
+              <a:t>6/18/18</a:t>
             </a:fld>
             <a:endParaRPr lang="en-US"/>
           </a:p>
@@ -1778,7 +1782,7 @@
           <a:p>
             <a:fld id="{66FD81AA-1FF7-F44E-9A25-A2825881B37B}" type="datetime1">
               <a:rPr lang="en-US" smtClean="0"/>
-              <a:t>6/5/18</a:t>
+              <a:t>6/18/18</a:t>
             </a:fld>
             <a:endParaRPr lang="en-US"/>
           </a:p>
@@ -2159,7 +2163,7 @@
           <a:p>
             <a:fld id="{34A713AB-6C81-BB44-8D40-AE3E8FBDBEA8}" type="datetime1">
               <a:rPr lang="en-US" smtClean="0"/>
-              <a:t>6/5/18</a:t>
+              <a:t>6/18/18</a:t>
             </a:fld>
             <a:endParaRPr lang="en-US"/>
           </a:p>
@@ -3125,7 +3129,7 @@
           <a:p>
             <a:fld id="{2ADECAF2-4F7E-9045-BC0E-90443DC223CE}" type="datetime1">
               <a:rPr lang="en-US" smtClean="0"/>
-              <a:t>6/5/18</a:t>
+              <a:t>6/18/18</a:t>
             </a:fld>
             <a:endParaRPr lang="en-US"/>
           </a:p>
@@ -3784,7 +3788,7 @@
           <a:p>
             <a:fld id="{583EE6F9-CE5C-E349-B049-03D39CC2B63C}" type="datetime1">
               <a:rPr lang="en-US" smtClean="0"/>
-              <a:t>6/5/18</a:t>
+              <a:t>6/18/18</a:t>
             </a:fld>
             <a:endParaRPr lang="en-US"/>
           </a:p>
@@ -4095,7 +4099,7 @@
           <a:p>
             <a:fld id="{55C7F7AE-3571-4242-BA7B-AD04F7748B8F}" type="datetime1">
               <a:rPr lang="en-US" smtClean="0"/>
-              <a:t>6/5/18</a:t>
+              <a:t>6/18/18</a:t>
             </a:fld>
             <a:endParaRPr lang="en-US"/>
           </a:p>
@@ -4352,7 +4356,7 @@
           <a:p>
             <a:fld id="{CC66FFE1-3721-EF4B-889E-E42A6B33304C}" type="datetime1">
               <a:rPr lang="en-US" smtClean="0"/>
-              <a:t>6/5/18</a:t>
+              <a:t>6/18/18</a:t>
             </a:fld>
             <a:endParaRPr lang="en-US" dirty="0"/>
           </a:p>
@@ -7470,7 +7474,7 @@
           <a:p>
             <a:fld id="{F08AB2A5-1A35-3740-B238-3D8D1F515C37}" type="datetime1">
               <a:rPr lang="en-US" smtClean="0"/>
-              <a:t>6/5/18</a:t>
+              <a:t>6/18/18</a:t>
             </a:fld>
             <a:endParaRPr lang="en-US"/>
           </a:p>
@@ -7752,7 +7756,7 @@
           <a:p>
             <a:fld id="{CEE3B40B-DE00-824C-8C47-6379AD442C2A}" type="datetime1">
               <a:rPr lang="en-US" smtClean="0"/>
-              <a:t>6/5/18</a:t>
+              <a:t>6/18/18</a:t>
             </a:fld>
             <a:endParaRPr lang="en-US"/>
           </a:p>
@@ -8317,6 +8321,1061 @@
           <p:cNvPr id="2" name="Title 1">
             <a:extLst>
               <a:ext uri="{FF2B5EF4-FFF2-40B4-BE49-F238E27FC236}">
+                <a16:creationId xmlns:a16="http://schemas.microsoft.com/office/drawing/2014/main" id="{6076743A-6C42-8644-AA7A-4FE77DBCC4B9}"/>
+              </a:ext>
+            </a:extLst>
+          </p:cNvPr>
+          <p:cNvSpPr>
+            <a:spLocks noGrp="1"/>
+          </p:cNvSpPr>
+          <p:nvPr>
+            <p:ph type="title"/>
+          </p:nvPr>
+        </p:nvSpPr>
+        <p:spPr/>
+        <p:txBody>
+          <a:bodyPr>
+            <a:noAutofit/>
+          </a:bodyPr>
+          <a:lstStyle/>
+          <a:p>
+            <a:r>
+              <a:rPr lang="en-US" dirty="0"/>
+              <a:t>So, how do we do this?</a:t>
+            </a:r>
+          </a:p>
+        </p:txBody>
+      </p:sp>
+      <p:sp>
+        <p:nvSpPr>
+          <p:cNvPr id="3" name="Content Placeholder 2">
+            <a:extLst>
+              <a:ext uri="{FF2B5EF4-FFF2-40B4-BE49-F238E27FC236}">
+                <a16:creationId xmlns:a16="http://schemas.microsoft.com/office/drawing/2014/main" id="{DE306633-5D07-9B44-AD8F-EED4A2BC5A65}"/>
+              </a:ext>
+            </a:extLst>
+          </p:cNvPr>
+          <p:cNvSpPr>
+            <a:spLocks noGrp="1"/>
+          </p:cNvSpPr>
+          <p:nvPr>
+            <p:ph idx="1"/>
+          </p:nvPr>
+        </p:nvSpPr>
+        <p:spPr/>
+        <p:txBody>
+          <a:bodyPr>
+            <a:normAutofit lnSpcReduction="10000"/>
+          </a:bodyPr>
+          <a:lstStyle/>
+          <a:p>
+            <a:pPr marL="51435" indent="0">
+              <a:buNone/>
+            </a:pPr>
+            <a:r>
+              <a:rPr lang="en-US" sz="2000" dirty="0"/>
+              <a:t>First, some prerequisites, recommendations and tips</a:t>
+            </a:r>
+          </a:p>
+          <a:p>
+            <a:r>
+              <a:rPr lang="en-US" sz="2000" dirty="0"/>
+              <a:t>Install </a:t>
+            </a:r>
+            <a:r>
+              <a:rPr lang="en-US" sz="2000" b="1" dirty="0"/>
+              <a:t>AWS CLI</a:t>
+            </a:r>
+          </a:p>
+          <a:p>
+            <a:pPr lvl="1"/>
+            <a:r>
+              <a:rPr lang="en-US" sz="1850" dirty="0">
+                <a:hlinkClick r:id="rId3"/>
+              </a:rPr>
+              <a:t>https://aws.amazon.com/cli/</a:t>
+            </a:r>
+            <a:endParaRPr lang="en-US" sz="1850" dirty="0"/>
+          </a:p>
+          <a:p>
+            <a:pPr lvl="2"/>
+            <a:r>
+              <a:rPr lang="en-US" sz="1700" dirty="0"/>
+              <a:t>Windows version uses Windows installer</a:t>
+            </a:r>
+          </a:p>
+          <a:p>
+            <a:pPr lvl="2"/>
+            <a:r>
+              <a:rPr lang="en-US" sz="1700" dirty="0"/>
+              <a:t>Mac OS version requires Python and pip (use pip3 if using Python 3)</a:t>
+            </a:r>
+          </a:p>
+          <a:p>
+            <a:r>
+              <a:rPr lang="en-US" sz="2000" dirty="0"/>
+              <a:t>Use </a:t>
+            </a:r>
+            <a:r>
+              <a:rPr lang="en-US" sz="2000" b="1" dirty="0"/>
+              <a:t>Postman</a:t>
+            </a:r>
+            <a:r>
+              <a:rPr lang="en-US" sz="2000" dirty="0"/>
+              <a:t> for REST API testing</a:t>
+            </a:r>
+          </a:p>
+          <a:p>
+            <a:pPr lvl="1"/>
+            <a:r>
+              <a:rPr lang="en-US" sz="1850" dirty="0">
+                <a:hlinkClick r:id="rId4"/>
+              </a:rPr>
+              <a:t>https://www.getpostman.com/apps</a:t>
+            </a:r>
+            <a:endParaRPr lang="en-US" sz="1850" dirty="0"/>
+          </a:p>
+          <a:p>
+            <a:r>
+              <a:rPr lang="en-US" sz="2000" dirty="0"/>
+              <a:t>Use </a:t>
+            </a:r>
+            <a:r>
+              <a:rPr lang="en-US" sz="2000" b="1" dirty="0" err="1"/>
+              <a:t>sdkman</a:t>
+            </a:r>
+            <a:r>
+              <a:rPr lang="en-US" sz="2000" dirty="0"/>
+              <a:t> to manage and use multiple </a:t>
+            </a:r>
+            <a:r>
+              <a:rPr lang="en-US" sz="2000" dirty="0" err="1"/>
+              <a:t>gradle</a:t>
+            </a:r>
+            <a:r>
+              <a:rPr lang="en-US" sz="2000" dirty="0"/>
+              <a:t> / </a:t>
+            </a:r>
+            <a:r>
+              <a:rPr lang="en-US" sz="2000" dirty="0" err="1"/>
+              <a:t>kotlin</a:t>
+            </a:r>
+            <a:r>
+              <a:rPr lang="en-US" sz="2000" dirty="0"/>
+              <a:t> / maven versions</a:t>
+            </a:r>
+          </a:p>
+          <a:p>
+            <a:pPr lvl="1"/>
+            <a:r>
+              <a:rPr lang="en-US" sz="1800" dirty="0">
+                <a:hlinkClick r:id="rId5"/>
+              </a:rPr>
+              <a:t>http://sdkman.io</a:t>
+            </a:r>
+            <a:endParaRPr lang="en-US" sz="1800" dirty="0"/>
+          </a:p>
+          <a:p>
+            <a:r>
+              <a:rPr lang="en-US" sz="2000" dirty="0"/>
+              <a:t>Use </a:t>
+            </a:r>
+            <a:r>
+              <a:rPr lang="en-US" sz="2000" dirty="0" err="1"/>
+              <a:t>gradle</a:t>
+            </a:r>
+            <a:r>
+              <a:rPr lang="en-US" sz="2000" dirty="0"/>
+              <a:t> wrapper inside Gradle based projects (demo soon)</a:t>
+            </a:r>
+          </a:p>
+          <a:p>
+            <a:r>
+              <a:rPr lang="en-US" sz="2000" dirty="0"/>
+              <a:t>Install a clipboard manager</a:t>
+            </a:r>
+          </a:p>
+          <a:p>
+            <a:pPr lvl="1"/>
+            <a:r>
+              <a:rPr lang="en-US" sz="1800" dirty="0"/>
+              <a:t>I like </a:t>
+            </a:r>
+            <a:r>
+              <a:rPr lang="en-US" sz="1800" b="1" dirty="0" err="1"/>
+              <a:t>Copy’em</a:t>
+            </a:r>
+            <a:r>
+              <a:rPr lang="en-US" sz="1800" b="1" dirty="0"/>
+              <a:t> Paste </a:t>
+            </a:r>
+            <a:r>
+              <a:rPr lang="en-US" sz="1800" dirty="0"/>
+              <a:t>- </a:t>
+            </a:r>
+            <a:r>
+              <a:rPr lang="en-US" sz="1800" dirty="0">
+                <a:hlinkClick r:id="rId6"/>
+              </a:rPr>
+              <a:t>https://goo.gl/MwSrkA</a:t>
+            </a:r>
+            <a:endParaRPr lang="en-US" sz="1800" dirty="0"/>
+          </a:p>
+        </p:txBody>
+      </p:sp>
+      <p:sp>
+        <p:nvSpPr>
+          <p:cNvPr id="4" name="Subtitle 3">
+            <a:extLst>
+              <a:ext uri="{FF2B5EF4-FFF2-40B4-BE49-F238E27FC236}">
+                <a16:creationId xmlns:a16="http://schemas.microsoft.com/office/drawing/2014/main" id="{3A7FC29D-DE93-D640-8034-41978FD492C6}"/>
+              </a:ext>
+            </a:extLst>
+          </p:cNvPr>
+          <p:cNvSpPr>
+            <a:spLocks noGrp="1"/>
+          </p:cNvSpPr>
+          <p:nvPr>
+            <p:ph type="subTitle" idx="12"/>
+          </p:nvPr>
+        </p:nvSpPr>
+        <p:spPr/>
+        <p:txBody>
+          <a:bodyPr>
+            <a:normAutofit/>
+          </a:bodyPr>
+          <a:lstStyle/>
+          <a:p>
+            <a:endParaRPr lang="en-US" sz="2000"/>
+          </a:p>
+        </p:txBody>
+      </p:sp>
+      <p:sp>
+        <p:nvSpPr>
+          <p:cNvPr id="5" name="Footer Placeholder 4">
+            <a:extLst>
+              <a:ext uri="{FF2B5EF4-FFF2-40B4-BE49-F238E27FC236}">
+                <a16:creationId xmlns:a16="http://schemas.microsoft.com/office/drawing/2014/main" id="{1CDD5634-CB80-2D45-A34C-24C66E6127AA}"/>
+              </a:ext>
+            </a:extLst>
+          </p:cNvPr>
+          <p:cNvSpPr>
+            <a:spLocks noGrp="1"/>
+          </p:cNvSpPr>
+          <p:nvPr>
+            <p:ph type="ftr" sz="quarter" idx="3"/>
+          </p:nvPr>
+        </p:nvSpPr>
+        <p:spPr/>
+        <p:txBody>
+          <a:bodyPr/>
+          <a:lstStyle/>
+          <a:p>
+            <a:r>
+              <a:rPr lang="en-US" sz="1600"/>
+              <a:t>AWS Java Lambda Functions with Kotlin</a:t>
+            </a:r>
+            <a:endParaRPr lang="en-US" sz="1600" dirty="0"/>
+          </a:p>
+        </p:txBody>
+      </p:sp>
+      <p:sp>
+        <p:nvSpPr>
+          <p:cNvPr id="6" name="Slide Number Placeholder 5">
+            <a:extLst>
+              <a:ext uri="{FF2B5EF4-FFF2-40B4-BE49-F238E27FC236}">
+                <a16:creationId xmlns:a16="http://schemas.microsoft.com/office/drawing/2014/main" id="{865CA060-3F57-694F-9B42-08335B8611F0}"/>
+              </a:ext>
+            </a:extLst>
+          </p:cNvPr>
+          <p:cNvSpPr>
+            <a:spLocks noGrp="1"/>
+          </p:cNvSpPr>
+          <p:nvPr>
+            <p:ph type="sldNum" sz="quarter" idx="4"/>
+          </p:nvPr>
+        </p:nvSpPr>
+        <p:spPr/>
+        <p:txBody>
+          <a:bodyPr/>
+          <a:lstStyle/>
+          <a:p>
+            <a:pPr algn="l"/>
+            <a:fld id="{ABCABC6B-F667-1540-8370-D056DC2C0FCE}" type="slidenum">
+              <a:rPr lang="en-US" sz="1600" smtClean="0"/>
+              <a:pPr algn="l"/>
+              <a:t>10</a:t>
+            </a:fld>
+            <a:endParaRPr lang="en-US" sz="1600" dirty="0"/>
+          </a:p>
+        </p:txBody>
+      </p:sp>
+    </p:spTree>
+    <p:extLst>
+      <p:ext uri="{BB962C8B-B14F-4D97-AF65-F5344CB8AC3E}">
+        <p14:creationId xmlns:p14="http://schemas.microsoft.com/office/powerpoint/2010/main" val="102645228"/>
+      </p:ext>
+    </p:extLst>
+  </p:cSld>
+  <p:clrMapOvr>
+    <a:masterClrMapping/>
+  </p:clrMapOvr>
+</p:sld>
+</file>
+
+<file path=ppt/slides/slide11.xml><?xml version="1.0" encoding="utf-8"?>
+<p:sld xmlns:a="http://schemas.openxmlformats.org/drawingml/2006/main" xmlns:r="http://schemas.openxmlformats.org/officeDocument/2006/relationships" xmlns:p="http://schemas.openxmlformats.org/presentationml/2006/main">
+  <p:cSld>
+    <p:spTree>
+      <p:nvGrpSpPr>
+        <p:cNvPr id="1" name=""/>
+        <p:cNvGrpSpPr/>
+        <p:nvPr/>
+      </p:nvGrpSpPr>
+      <p:grpSpPr>
+        <a:xfrm>
+          <a:off x="0" y="0"/>
+          <a:ext cx="0" cy="0"/>
+          <a:chOff x="0" y="0"/>
+          <a:chExt cx="0" cy="0"/>
+        </a:xfrm>
+      </p:grpSpPr>
+      <p:sp>
+        <p:nvSpPr>
+          <p:cNvPr id="2" name="Title 1">
+            <a:extLst>
+              <a:ext uri="{FF2B5EF4-FFF2-40B4-BE49-F238E27FC236}">
+                <a16:creationId xmlns:a16="http://schemas.microsoft.com/office/drawing/2014/main" id="{FF9FE4B9-8E19-3043-BE27-4533F815A882}"/>
+              </a:ext>
+            </a:extLst>
+          </p:cNvPr>
+          <p:cNvSpPr>
+            <a:spLocks noGrp="1"/>
+          </p:cNvSpPr>
+          <p:nvPr>
+            <p:ph type="title"/>
+          </p:nvPr>
+        </p:nvSpPr>
+        <p:spPr/>
+        <p:txBody>
+          <a:bodyPr/>
+          <a:lstStyle/>
+          <a:p>
+            <a:r>
+              <a:rPr lang="en-US" dirty="0"/>
+              <a:t>So, how do we do this?</a:t>
+            </a:r>
+          </a:p>
+        </p:txBody>
+      </p:sp>
+      <p:sp>
+        <p:nvSpPr>
+          <p:cNvPr id="3" name="Content Placeholder 2">
+            <a:extLst>
+              <a:ext uri="{FF2B5EF4-FFF2-40B4-BE49-F238E27FC236}">
+                <a16:creationId xmlns:a16="http://schemas.microsoft.com/office/drawing/2014/main" id="{11EA52BF-883C-E14F-8DFA-B2B8A1185567}"/>
+              </a:ext>
+            </a:extLst>
+          </p:cNvPr>
+          <p:cNvSpPr>
+            <a:spLocks noGrp="1"/>
+          </p:cNvSpPr>
+          <p:nvPr>
+            <p:ph idx="1"/>
+          </p:nvPr>
+        </p:nvSpPr>
+        <p:spPr/>
+        <p:txBody>
+          <a:bodyPr/>
+          <a:lstStyle/>
+          <a:p>
+            <a:pPr marL="394335" indent="-342900">
+              <a:buFont typeface="+mj-lt"/>
+              <a:buAutoNum type="arabicPeriod"/>
+            </a:pPr>
+            <a:r>
+              <a:rPr lang="en-US" dirty="0"/>
+              <a:t>Implement the function using the predefined AWS Lambda core interface</a:t>
+            </a:r>
+          </a:p>
+          <a:p>
+            <a:pPr marL="394335" indent="-342900">
+              <a:buFont typeface="+mj-lt"/>
+              <a:buAutoNum type="arabicPeriod"/>
+            </a:pPr>
+            <a:r>
+              <a:rPr lang="en-US" dirty="0"/>
+              <a:t>Build the deployment package</a:t>
+            </a:r>
+          </a:p>
+          <a:p>
+            <a:pPr marL="394335" indent="-342900">
+              <a:buFont typeface="+mj-lt"/>
+              <a:buAutoNum type="arabicPeriod"/>
+            </a:pPr>
+            <a:r>
+              <a:rPr lang="en-US" dirty="0"/>
+              <a:t>Create a new AWS lambda function</a:t>
+            </a:r>
+          </a:p>
+          <a:p>
+            <a:pPr marL="394335" indent="-342900">
+              <a:buFont typeface="+mj-lt"/>
+              <a:buAutoNum type="arabicPeriod"/>
+            </a:pPr>
+            <a:r>
+              <a:rPr lang="en-US" dirty="0"/>
+              <a:t>Upload the deployment package to AWS</a:t>
+            </a:r>
+          </a:p>
+          <a:p>
+            <a:pPr marL="394335" indent="-342900">
+              <a:buFont typeface="+mj-lt"/>
+              <a:buAutoNum type="arabicPeriod"/>
+            </a:pPr>
+            <a:r>
+              <a:rPr lang="en-US" dirty="0"/>
+              <a:t>Test the function</a:t>
+            </a:r>
+          </a:p>
+          <a:p>
+            <a:pPr marL="394335" indent="-342900">
+              <a:buFont typeface="+mj-lt"/>
+              <a:buAutoNum type="arabicPeriod"/>
+            </a:pPr>
+            <a:r>
+              <a:rPr lang="en-US" dirty="0"/>
+              <a:t>BONUS: Configure and execute REST API wrapper for the lambda function</a:t>
+            </a:r>
+          </a:p>
+        </p:txBody>
+      </p:sp>
+      <p:sp>
+        <p:nvSpPr>
+          <p:cNvPr id="4" name="Subtitle 3">
+            <a:extLst>
+              <a:ext uri="{FF2B5EF4-FFF2-40B4-BE49-F238E27FC236}">
+                <a16:creationId xmlns:a16="http://schemas.microsoft.com/office/drawing/2014/main" id="{CF7ABB60-3B3D-944C-A328-DF8FC18E8B8D}"/>
+              </a:ext>
+            </a:extLst>
+          </p:cNvPr>
+          <p:cNvSpPr>
+            <a:spLocks noGrp="1"/>
+          </p:cNvSpPr>
+          <p:nvPr>
+            <p:ph type="subTitle" idx="12"/>
+          </p:nvPr>
+        </p:nvSpPr>
+        <p:spPr/>
+        <p:txBody>
+          <a:bodyPr/>
+          <a:lstStyle/>
+          <a:p>
+            <a:endParaRPr lang="en-US"/>
+          </a:p>
+        </p:txBody>
+      </p:sp>
+      <p:sp>
+        <p:nvSpPr>
+          <p:cNvPr id="5" name="Footer Placeholder 4">
+            <a:extLst>
+              <a:ext uri="{FF2B5EF4-FFF2-40B4-BE49-F238E27FC236}">
+                <a16:creationId xmlns:a16="http://schemas.microsoft.com/office/drawing/2014/main" id="{4E32E5F1-A975-4A42-9225-C5970192F70A}"/>
+              </a:ext>
+            </a:extLst>
+          </p:cNvPr>
+          <p:cNvSpPr>
+            <a:spLocks noGrp="1"/>
+          </p:cNvSpPr>
+          <p:nvPr>
+            <p:ph type="ftr" sz="quarter" idx="3"/>
+          </p:nvPr>
+        </p:nvSpPr>
+        <p:spPr/>
+        <p:txBody>
+          <a:bodyPr/>
+          <a:lstStyle/>
+          <a:p>
+            <a:r>
+              <a:rPr lang="en-US"/>
+              <a:t>AWS Java Lambda Functions with Kotlin</a:t>
+            </a:r>
+            <a:endParaRPr lang="en-US" dirty="0"/>
+          </a:p>
+        </p:txBody>
+      </p:sp>
+      <p:sp>
+        <p:nvSpPr>
+          <p:cNvPr id="6" name="Slide Number Placeholder 5">
+            <a:extLst>
+              <a:ext uri="{FF2B5EF4-FFF2-40B4-BE49-F238E27FC236}">
+                <a16:creationId xmlns:a16="http://schemas.microsoft.com/office/drawing/2014/main" id="{F53941A6-D874-8146-BF12-DA0AC419BDD9}"/>
+              </a:ext>
+            </a:extLst>
+          </p:cNvPr>
+          <p:cNvSpPr>
+            <a:spLocks noGrp="1"/>
+          </p:cNvSpPr>
+          <p:nvPr>
+            <p:ph type="sldNum" sz="quarter" idx="4"/>
+          </p:nvPr>
+        </p:nvSpPr>
+        <p:spPr/>
+        <p:txBody>
+          <a:bodyPr/>
+          <a:lstStyle/>
+          <a:p>
+            <a:pPr algn="l"/>
+            <a:fld id="{ABCABC6B-F667-1540-8370-D056DC2C0FCE}" type="slidenum">
+              <a:rPr lang="en-US" smtClean="0"/>
+              <a:pPr algn="l"/>
+              <a:t>11</a:t>
+            </a:fld>
+            <a:endParaRPr lang="en-US" dirty="0"/>
+          </a:p>
+        </p:txBody>
+      </p:sp>
+    </p:spTree>
+    <p:extLst>
+      <p:ext uri="{BB962C8B-B14F-4D97-AF65-F5344CB8AC3E}">
+        <p14:creationId xmlns:p14="http://schemas.microsoft.com/office/powerpoint/2010/main" val="1539077060"/>
+      </p:ext>
+    </p:extLst>
+  </p:cSld>
+  <p:clrMapOvr>
+    <a:masterClrMapping/>
+  </p:clrMapOvr>
+</p:sld>
+</file>
+
+<file path=ppt/slides/slide12.xml><?xml version="1.0" encoding="utf-8"?>
+<p:sld xmlns:a="http://schemas.openxmlformats.org/drawingml/2006/main" xmlns:r="http://schemas.openxmlformats.org/officeDocument/2006/relationships" xmlns:p="http://schemas.openxmlformats.org/presentationml/2006/main">
+  <p:cSld>
+    <p:spTree>
+      <p:nvGrpSpPr>
+        <p:cNvPr id="1" name=""/>
+        <p:cNvGrpSpPr/>
+        <p:nvPr/>
+      </p:nvGrpSpPr>
+      <p:grpSpPr>
+        <a:xfrm>
+          <a:off x="0" y="0"/>
+          <a:ext cx="0" cy="0"/>
+          <a:chOff x="0" y="0"/>
+          <a:chExt cx="0" cy="0"/>
+        </a:xfrm>
+      </p:grpSpPr>
+      <p:sp>
+        <p:nvSpPr>
+          <p:cNvPr id="2" name="Title 1">
+            <a:extLst>
+              <a:ext uri="{FF2B5EF4-FFF2-40B4-BE49-F238E27FC236}">
+                <a16:creationId xmlns:a16="http://schemas.microsoft.com/office/drawing/2014/main" id="{1B47D5F0-355A-C845-A929-8F23CA86AE46}"/>
+              </a:ext>
+            </a:extLst>
+          </p:cNvPr>
+          <p:cNvSpPr>
+            <a:spLocks noGrp="1"/>
+          </p:cNvSpPr>
+          <p:nvPr>
+            <p:ph type="title"/>
+          </p:nvPr>
+        </p:nvSpPr>
+        <p:spPr/>
+        <p:txBody>
+          <a:bodyPr/>
+          <a:lstStyle/>
+          <a:p>
+            <a:r>
+              <a:rPr lang="en-US" dirty="0"/>
+              <a:t>So, how do we do this?</a:t>
+            </a:r>
+          </a:p>
+        </p:txBody>
+      </p:sp>
+      <p:sp>
+        <p:nvSpPr>
+          <p:cNvPr id="3" name="Content Placeholder 2">
+            <a:extLst>
+              <a:ext uri="{FF2B5EF4-FFF2-40B4-BE49-F238E27FC236}">
+                <a16:creationId xmlns:a16="http://schemas.microsoft.com/office/drawing/2014/main" id="{13E467B1-D15E-A444-907D-026A04681533}"/>
+              </a:ext>
+            </a:extLst>
+          </p:cNvPr>
+          <p:cNvSpPr>
+            <a:spLocks noGrp="1"/>
+          </p:cNvSpPr>
+          <p:nvPr>
+            <p:ph idx="1"/>
+          </p:nvPr>
+        </p:nvSpPr>
+        <p:spPr/>
+        <p:txBody>
+          <a:bodyPr>
+            <a:normAutofit/>
+          </a:bodyPr>
+          <a:lstStyle/>
+          <a:p>
+            <a:r>
+              <a:rPr lang="en-US" sz="3200" dirty="0"/>
+              <a:t>Let’s do this! (demo / code walkthrough)</a:t>
+            </a:r>
+          </a:p>
+        </p:txBody>
+      </p:sp>
+      <p:sp>
+        <p:nvSpPr>
+          <p:cNvPr id="4" name="Subtitle 3">
+            <a:extLst>
+              <a:ext uri="{FF2B5EF4-FFF2-40B4-BE49-F238E27FC236}">
+                <a16:creationId xmlns:a16="http://schemas.microsoft.com/office/drawing/2014/main" id="{3CC62F3A-88F1-D643-B02B-D37CFE56569F}"/>
+              </a:ext>
+            </a:extLst>
+          </p:cNvPr>
+          <p:cNvSpPr>
+            <a:spLocks noGrp="1"/>
+          </p:cNvSpPr>
+          <p:nvPr>
+            <p:ph type="subTitle" idx="12"/>
+          </p:nvPr>
+        </p:nvSpPr>
+        <p:spPr/>
+        <p:txBody>
+          <a:bodyPr/>
+          <a:lstStyle/>
+          <a:p>
+            <a:endParaRPr lang="en-US"/>
+          </a:p>
+        </p:txBody>
+      </p:sp>
+      <p:sp>
+        <p:nvSpPr>
+          <p:cNvPr id="5" name="Footer Placeholder 4">
+            <a:extLst>
+              <a:ext uri="{FF2B5EF4-FFF2-40B4-BE49-F238E27FC236}">
+                <a16:creationId xmlns:a16="http://schemas.microsoft.com/office/drawing/2014/main" id="{8F1AAF1F-311D-7543-9D16-E7D194E26896}"/>
+              </a:ext>
+            </a:extLst>
+          </p:cNvPr>
+          <p:cNvSpPr>
+            <a:spLocks noGrp="1"/>
+          </p:cNvSpPr>
+          <p:nvPr>
+            <p:ph type="ftr" sz="quarter" idx="3"/>
+          </p:nvPr>
+        </p:nvSpPr>
+        <p:spPr/>
+        <p:txBody>
+          <a:bodyPr/>
+          <a:lstStyle/>
+          <a:p>
+            <a:r>
+              <a:rPr lang="en-US"/>
+              <a:t>AWS Java Lambda Functions with Kotlin</a:t>
+            </a:r>
+            <a:endParaRPr lang="en-US" dirty="0"/>
+          </a:p>
+        </p:txBody>
+      </p:sp>
+      <p:sp>
+        <p:nvSpPr>
+          <p:cNvPr id="6" name="Slide Number Placeholder 5">
+            <a:extLst>
+              <a:ext uri="{FF2B5EF4-FFF2-40B4-BE49-F238E27FC236}">
+                <a16:creationId xmlns:a16="http://schemas.microsoft.com/office/drawing/2014/main" id="{B21D4419-596C-4243-A369-0800DBC911F5}"/>
+              </a:ext>
+            </a:extLst>
+          </p:cNvPr>
+          <p:cNvSpPr>
+            <a:spLocks noGrp="1"/>
+          </p:cNvSpPr>
+          <p:nvPr>
+            <p:ph type="sldNum" sz="quarter" idx="4"/>
+          </p:nvPr>
+        </p:nvSpPr>
+        <p:spPr/>
+        <p:txBody>
+          <a:bodyPr/>
+          <a:lstStyle/>
+          <a:p>
+            <a:pPr algn="l"/>
+            <a:fld id="{ABCABC6B-F667-1540-8370-D056DC2C0FCE}" type="slidenum">
+              <a:rPr lang="en-US" smtClean="0"/>
+              <a:pPr algn="l"/>
+              <a:t>12</a:t>
+            </a:fld>
+            <a:endParaRPr lang="en-US" dirty="0"/>
+          </a:p>
+        </p:txBody>
+      </p:sp>
+    </p:spTree>
+    <p:extLst>
+      <p:ext uri="{BB962C8B-B14F-4D97-AF65-F5344CB8AC3E}">
+        <p14:creationId xmlns:p14="http://schemas.microsoft.com/office/powerpoint/2010/main" val="2581210424"/>
+      </p:ext>
+    </p:extLst>
+  </p:cSld>
+  <p:clrMapOvr>
+    <a:masterClrMapping/>
+  </p:clrMapOvr>
+</p:sld>
+</file>
+
+<file path=ppt/slides/slide13.xml><?xml version="1.0" encoding="utf-8"?>
+<p:sld xmlns:a="http://schemas.openxmlformats.org/drawingml/2006/main" xmlns:r="http://schemas.openxmlformats.org/officeDocument/2006/relationships" xmlns:p="http://schemas.openxmlformats.org/presentationml/2006/main">
+  <p:cSld>
+    <p:spTree>
+      <p:nvGrpSpPr>
+        <p:cNvPr id="1" name=""/>
+        <p:cNvGrpSpPr/>
+        <p:nvPr/>
+      </p:nvGrpSpPr>
+      <p:grpSpPr>
+        <a:xfrm>
+          <a:off x="0" y="0"/>
+          <a:ext cx="0" cy="0"/>
+          <a:chOff x="0" y="0"/>
+          <a:chExt cx="0" cy="0"/>
+        </a:xfrm>
+      </p:grpSpPr>
+      <p:sp>
+        <p:nvSpPr>
+          <p:cNvPr id="2" name="Title 1">
+            <a:extLst>
+              <a:ext uri="{FF2B5EF4-FFF2-40B4-BE49-F238E27FC236}">
+                <a16:creationId xmlns:a16="http://schemas.microsoft.com/office/drawing/2014/main" id="{D88B2F82-0D62-FF4F-A850-9372C7C1DC1E}"/>
+              </a:ext>
+            </a:extLst>
+          </p:cNvPr>
+          <p:cNvSpPr>
+            <a:spLocks noGrp="1"/>
+          </p:cNvSpPr>
+          <p:nvPr>
+            <p:ph type="title"/>
+          </p:nvPr>
+        </p:nvSpPr>
+        <p:spPr/>
+        <p:txBody>
+          <a:bodyPr/>
+          <a:lstStyle/>
+          <a:p>
+            <a:r>
+              <a:rPr lang="en-US" dirty="0"/>
+              <a:t>Links</a:t>
+            </a:r>
+          </a:p>
+        </p:txBody>
+      </p:sp>
+      <p:sp>
+        <p:nvSpPr>
+          <p:cNvPr id="3" name="Content Placeholder 2">
+            <a:extLst>
+              <a:ext uri="{FF2B5EF4-FFF2-40B4-BE49-F238E27FC236}">
+                <a16:creationId xmlns:a16="http://schemas.microsoft.com/office/drawing/2014/main" id="{359C6424-1019-BB43-86AA-8BD2FD87BBD8}"/>
+              </a:ext>
+            </a:extLst>
+          </p:cNvPr>
+          <p:cNvSpPr>
+            <a:spLocks noGrp="1"/>
+          </p:cNvSpPr>
+          <p:nvPr>
+            <p:ph idx="1"/>
+          </p:nvPr>
+        </p:nvSpPr>
+        <p:spPr>
+          <a:xfrm>
+            <a:off x="1059591" y="1460501"/>
+            <a:ext cx="10062296" cy="4486429"/>
+          </a:xfrm>
+        </p:spPr>
+        <p:txBody>
+          <a:bodyPr>
+            <a:normAutofit/>
+          </a:bodyPr>
+          <a:lstStyle/>
+          <a:p>
+            <a:r>
+              <a:rPr lang="en-US" sz="1600" dirty="0"/>
+              <a:t>This Presentation:</a:t>
+            </a:r>
+            <a:br>
+              <a:rPr lang="en-US" sz="1600" dirty="0"/>
+            </a:br>
+            <a:r>
+              <a:rPr lang="en-US" sz="1600" dirty="0">
+                <a:hlinkClick r:id="rId2"/>
+              </a:rPr>
+              <a:t>https://goo.gl/EHfTEC</a:t>
+            </a:r>
+            <a:endParaRPr lang="en-US" sz="1600" dirty="0"/>
+          </a:p>
+          <a:p>
+            <a:r>
+              <a:rPr lang="en-US" sz="1600" dirty="0" err="1"/>
+              <a:t>Github</a:t>
+            </a:r>
+            <a:r>
+              <a:rPr lang="en-US" sz="1600" dirty="0"/>
+              <a:t> repositories:</a:t>
+            </a:r>
+          </a:p>
+          <a:p>
+            <a:pPr lvl="1"/>
+            <a:r>
+              <a:rPr lang="en-US" sz="1450" dirty="0"/>
+              <a:t>Lambda Function: </a:t>
+            </a:r>
+            <a:r>
+              <a:rPr lang="en-US" sz="1450" dirty="0">
+                <a:hlinkClick r:id="rId3"/>
+              </a:rPr>
+              <a:t>https://github.com/jkwuc89/kotlinawslambda</a:t>
+            </a:r>
+            <a:endParaRPr lang="en-US" sz="1450" dirty="0"/>
+          </a:p>
+          <a:p>
+            <a:pPr lvl="1"/>
+            <a:r>
+              <a:rPr lang="en-US" sz="1450" dirty="0" err="1"/>
+              <a:t>TaskTracker</a:t>
+            </a:r>
+            <a:r>
+              <a:rPr lang="en-US" sz="1450" dirty="0"/>
+              <a:t>: </a:t>
+            </a:r>
+            <a:r>
+              <a:rPr lang="en-US" sz="1450" dirty="0">
+                <a:hlinkClick r:id="rId4"/>
+              </a:rPr>
+              <a:t>https://github.com/jkwuc89/tasktracker</a:t>
+            </a:r>
+            <a:endParaRPr lang="en-US" sz="1450" dirty="0"/>
+          </a:p>
+          <a:p>
+            <a:r>
+              <a:rPr lang="en-US" sz="1600" dirty="0"/>
+              <a:t>Try Kotlin:</a:t>
+            </a:r>
+            <a:br>
+              <a:rPr lang="en-US" sz="1600" dirty="0"/>
+            </a:br>
+            <a:r>
+              <a:rPr lang="en-US" sz="1600" dirty="0">
+                <a:hlinkClick r:id="rId5"/>
+              </a:rPr>
+              <a:t>https://try.kotlinlang.org</a:t>
+            </a:r>
+            <a:endParaRPr lang="en-US" sz="1600" dirty="0"/>
+          </a:p>
+          <a:p>
+            <a:r>
+              <a:rPr lang="en-US" sz="1600" dirty="0"/>
+              <a:t>Gradle:</a:t>
+            </a:r>
+            <a:br>
+              <a:rPr lang="en-US" sz="1600" dirty="0"/>
+            </a:br>
+            <a:r>
+              <a:rPr lang="en-US" sz="1600" dirty="0">
+                <a:hlinkClick r:id="rId6"/>
+              </a:rPr>
+              <a:t>https://gradle.org</a:t>
+            </a:r>
+            <a:endParaRPr lang="en-US" sz="1600" dirty="0"/>
+          </a:p>
+          <a:p>
+            <a:r>
+              <a:rPr lang="en-US" sz="1600" dirty="0"/>
+              <a:t>Maven:</a:t>
+            </a:r>
+            <a:br>
+              <a:rPr lang="en-US" sz="1600" dirty="0"/>
+            </a:br>
+            <a:r>
+              <a:rPr lang="en-US" sz="1600" dirty="0">
+                <a:hlinkClick r:id="rId7"/>
+              </a:rPr>
+              <a:t>https://maven.apache.org</a:t>
+            </a:r>
+            <a:endParaRPr lang="en-US" sz="1600" dirty="0"/>
+          </a:p>
+          <a:p>
+            <a:r>
+              <a:rPr lang="en-US" sz="1600" dirty="0"/>
+              <a:t>AWS Lambda Function Documentation</a:t>
+            </a:r>
+            <a:br>
+              <a:rPr lang="en-US" sz="1600" dirty="0"/>
+            </a:br>
+            <a:r>
+              <a:rPr lang="en-US" sz="1600" dirty="0">
+                <a:hlinkClick r:id="rId8"/>
+              </a:rPr>
+              <a:t>https://aws.amazon.com/lambda/</a:t>
+            </a:r>
+            <a:br>
+              <a:rPr lang="en-US" sz="1600" dirty="0"/>
+            </a:br>
+            <a:r>
+              <a:rPr lang="en-US" sz="1600" dirty="0">
+                <a:hlinkClick r:id="rId9"/>
+              </a:rPr>
+              <a:t>https://docs.aws.amazon.com/lambda/latest/dg/java-programming-model.html</a:t>
+            </a:r>
+            <a:br>
+              <a:rPr lang="en-US" sz="1600" dirty="0"/>
+            </a:br>
+            <a:r>
+              <a:rPr lang="en-US" sz="1600" dirty="0">
+                <a:hlinkClick r:id="rId10"/>
+              </a:rPr>
+              <a:t>https://docs.aws.amazon.com/lambda/latest/dg/java-handler-using-predefined-interfaces.html</a:t>
+            </a:r>
+            <a:br>
+              <a:rPr lang="en-US" sz="1600" dirty="0"/>
+            </a:br>
+            <a:r>
+              <a:rPr lang="en-US" sz="1600" dirty="0">
+                <a:hlinkClick r:id="rId11"/>
+              </a:rPr>
+              <a:t>https://docs.aws.amazon.com/lambda/latest/dg/java-create-jar-pkg-maven-no-ide.html</a:t>
+            </a:r>
+            <a:endParaRPr lang="en-US" sz="1600" dirty="0"/>
+          </a:p>
+          <a:p>
+            <a:pPr marL="51435" indent="0">
+              <a:buNone/>
+            </a:pPr>
+            <a:endParaRPr lang="en-US" sz="1600" dirty="0"/>
+          </a:p>
+          <a:p>
+            <a:endParaRPr lang="en-US" sz="1600" dirty="0"/>
+          </a:p>
+          <a:p>
+            <a:endParaRPr lang="en-US" sz="1600" dirty="0"/>
+          </a:p>
+        </p:txBody>
+      </p:sp>
+      <p:sp>
+        <p:nvSpPr>
+          <p:cNvPr id="4" name="Subtitle 3">
+            <a:extLst>
+              <a:ext uri="{FF2B5EF4-FFF2-40B4-BE49-F238E27FC236}">
+                <a16:creationId xmlns:a16="http://schemas.microsoft.com/office/drawing/2014/main" id="{CA3820C2-B40F-8A4D-A37D-62770F40CA48}"/>
+              </a:ext>
+            </a:extLst>
+          </p:cNvPr>
+          <p:cNvSpPr>
+            <a:spLocks noGrp="1"/>
+          </p:cNvSpPr>
+          <p:nvPr>
+            <p:ph type="subTitle" idx="12"/>
+          </p:nvPr>
+        </p:nvSpPr>
+        <p:spPr/>
+        <p:txBody>
+          <a:bodyPr/>
+          <a:lstStyle/>
+          <a:p>
+            <a:endParaRPr lang="en-US"/>
+          </a:p>
+        </p:txBody>
+      </p:sp>
+      <p:sp>
+        <p:nvSpPr>
+          <p:cNvPr id="5" name="Footer Placeholder 4">
+            <a:extLst>
+              <a:ext uri="{FF2B5EF4-FFF2-40B4-BE49-F238E27FC236}">
+                <a16:creationId xmlns:a16="http://schemas.microsoft.com/office/drawing/2014/main" id="{C304C7D0-1E6B-C046-B901-7FA182C5FBE3}"/>
+              </a:ext>
+            </a:extLst>
+          </p:cNvPr>
+          <p:cNvSpPr>
+            <a:spLocks noGrp="1"/>
+          </p:cNvSpPr>
+          <p:nvPr>
+            <p:ph type="ftr" sz="quarter" idx="3"/>
+          </p:nvPr>
+        </p:nvSpPr>
+        <p:spPr/>
+        <p:txBody>
+          <a:bodyPr/>
+          <a:lstStyle/>
+          <a:p>
+            <a:r>
+              <a:rPr lang="en-US"/>
+              <a:t>AWS Java Lambda Functions with Kotlin</a:t>
+            </a:r>
+            <a:endParaRPr lang="en-US" dirty="0"/>
+          </a:p>
+        </p:txBody>
+      </p:sp>
+      <p:sp>
+        <p:nvSpPr>
+          <p:cNvPr id="6" name="Slide Number Placeholder 5">
+            <a:extLst>
+              <a:ext uri="{FF2B5EF4-FFF2-40B4-BE49-F238E27FC236}">
+                <a16:creationId xmlns:a16="http://schemas.microsoft.com/office/drawing/2014/main" id="{089861B6-A1A7-C54F-8115-BA4212716633}"/>
+              </a:ext>
+            </a:extLst>
+          </p:cNvPr>
+          <p:cNvSpPr>
+            <a:spLocks noGrp="1"/>
+          </p:cNvSpPr>
+          <p:nvPr>
+            <p:ph type="sldNum" sz="quarter" idx="4"/>
+          </p:nvPr>
+        </p:nvSpPr>
+        <p:spPr/>
+        <p:txBody>
+          <a:bodyPr/>
+          <a:lstStyle/>
+          <a:p>
+            <a:pPr algn="l"/>
+            <a:fld id="{ABCABC6B-F667-1540-8370-D056DC2C0FCE}" type="slidenum">
+              <a:rPr lang="en-US" smtClean="0"/>
+              <a:pPr algn="l"/>
+              <a:t>13</a:t>
+            </a:fld>
+            <a:endParaRPr lang="en-US" dirty="0"/>
+          </a:p>
+        </p:txBody>
+      </p:sp>
+    </p:spTree>
+    <p:extLst>
+      <p:ext uri="{BB962C8B-B14F-4D97-AF65-F5344CB8AC3E}">
+        <p14:creationId xmlns:p14="http://schemas.microsoft.com/office/powerpoint/2010/main" val="2092399202"/>
+      </p:ext>
+    </p:extLst>
+  </p:cSld>
+  <p:clrMapOvr>
+    <a:masterClrMapping/>
+  </p:clrMapOvr>
+</p:sld>
+</file>
+
+<file path=ppt/slides/slide14.xml><?xml version="1.0" encoding="utf-8"?>
+<p:sld xmlns:a="http://schemas.openxmlformats.org/drawingml/2006/main" xmlns:r="http://schemas.openxmlformats.org/officeDocument/2006/relationships" xmlns:p="http://schemas.openxmlformats.org/presentationml/2006/main">
+  <p:cSld>
+    <p:spTree>
+      <p:nvGrpSpPr>
+        <p:cNvPr id="1" name=""/>
+        <p:cNvGrpSpPr/>
+        <p:nvPr/>
+      </p:nvGrpSpPr>
+      <p:grpSpPr>
+        <a:xfrm>
+          <a:off x="0" y="0"/>
+          <a:ext cx="0" cy="0"/>
+          <a:chOff x="0" y="0"/>
+          <a:chExt cx="0" cy="0"/>
+        </a:xfrm>
+      </p:grpSpPr>
+      <p:sp>
+        <p:nvSpPr>
+          <p:cNvPr id="2" name="Title 1">
+            <a:extLst>
+              <a:ext uri="{FF2B5EF4-FFF2-40B4-BE49-F238E27FC236}">
                 <a16:creationId xmlns:a16="http://schemas.microsoft.com/office/drawing/2014/main" id="{18B96339-C805-F149-9761-3970846A228E}"/>
               </a:ext>
             </a:extLst>
@@ -8553,7 +9612,7 @@
             <a:fld id="{ABCABC6B-F667-1540-8370-D056DC2C0FCE}" type="slidenum">
               <a:rPr lang="en-US" smtClean="0"/>
               <a:pPr algn="l"/>
-              <a:t>10</a:t>
+              <a:t>14</a:t>
             </a:fld>
             <a:endParaRPr lang="en-US" dirty="0"/>
           </a:p>
@@ -8591,10 +9650,10 @@
       </p:grpSpPr>
       <p:sp>
         <p:nvSpPr>
-          <p:cNvPr id="2" name="Title 1">
+          <p:cNvPr id="5" name="Footer Placeholder 4">
             <a:extLst>
               <a:ext uri="{FF2B5EF4-FFF2-40B4-BE49-F238E27FC236}">
-                <a16:creationId xmlns:a16="http://schemas.microsoft.com/office/drawing/2014/main" id="{B421EA95-BB16-3742-876E-A41F29E75322}"/>
+                <a16:creationId xmlns:a16="http://schemas.microsoft.com/office/drawing/2014/main" id="{D4BE3EB9-5066-2F4C-A8B2-7C96288A6FFC}"/>
               </a:ext>
             </a:extLst>
           </p:cNvPr>
@@ -8602,111 +9661,6 @@
             <a:spLocks noGrp="1"/>
           </p:cNvSpPr>
           <p:nvPr>
-            <p:ph type="title"/>
-          </p:nvPr>
-        </p:nvSpPr>
-        <p:spPr/>
-        <p:txBody>
-          <a:bodyPr/>
-          <a:lstStyle/>
-          <a:p>
-            <a:r>
-              <a:rPr lang="en-US" dirty="0"/>
-              <a:t>Agenda</a:t>
-            </a:r>
-          </a:p>
-        </p:txBody>
-      </p:sp>
-      <p:sp>
-        <p:nvSpPr>
-          <p:cNvPr id="3" name="Content Placeholder 2">
-            <a:extLst>
-              <a:ext uri="{FF2B5EF4-FFF2-40B4-BE49-F238E27FC236}">
-                <a16:creationId xmlns:a16="http://schemas.microsoft.com/office/drawing/2014/main" id="{4A30129A-4023-334B-B984-DFE3844B1B9C}"/>
-              </a:ext>
-            </a:extLst>
-          </p:cNvPr>
-          <p:cNvSpPr>
-            <a:spLocks noGrp="1"/>
-          </p:cNvSpPr>
-          <p:nvPr>
-            <p:ph idx="1"/>
-          </p:nvPr>
-        </p:nvSpPr>
-        <p:spPr/>
-        <p:txBody>
-          <a:bodyPr/>
-          <a:lstStyle/>
-          <a:p>
-            <a:r>
-              <a:rPr lang="en-US" dirty="0"/>
-              <a:t>Introduction</a:t>
-            </a:r>
-          </a:p>
-          <a:p>
-            <a:r>
-              <a:rPr lang="en-US" dirty="0"/>
-              <a:t>Why Kotlin?</a:t>
-            </a:r>
-          </a:p>
-          <a:p>
-            <a:r>
-              <a:rPr lang="en-US" dirty="0"/>
-              <a:t>So, how do we do this?</a:t>
-            </a:r>
-          </a:p>
-          <a:p>
-            <a:r>
-              <a:rPr lang="en-US" dirty="0"/>
-              <a:t>Links</a:t>
-            </a:r>
-          </a:p>
-          <a:p>
-            <a:r>
-              <a:rPr lang="en-US" dirty="0"/>
-              <a:t>Questions</a:t>
-            </a:r>
-          </a:p>
-        </p:txBody>
-      </p:sp>
-      <p:sp>
-        <p:nvSpPr>
-          <p:cNvPr id="4" name="Subtitle 3">
-            <a:extLst>
-              <a:ext uri="{FF2B5EF4-FFF2-40B4-BE49-F238E27FC236}">
-                <a16:creationId xmlns:a16="http://schemas.microsoft.com/office/drawing/2014/main" id="{9AC6D470-5992-C345-9DEC-960511667D11}"/>
-              </a:ext>
-            </a:extLst>
-          </p:cNvPr>
-          <p:cNvSpPr>
-            <a:spLocks noGrp="1"/>
-          </p:cNvSpPr>
-          <p:nvPr>
-            <p:ph type="subTitle" idx="12"/>
-          </p:nvPr>
-        </p:nvSpPr>
-        <p:spPr/>
-        <p:txBody>
-          <a:bodyPr/>
-          <a:lstStyle/>
-          <a:p>
-            <a:endParaRPr lang="en-US"/>
-          </a:p>
-        </p:txBody>
-      </p:sp>
-      <p:sp>
-        <p:nvSpPr>
-          <p:cNvPr id="5" name="Footer Placeholder 4">
-            <a:extLst>
-              <a:ext uri="{FF2B5EF4-FFF2-40B4-BE49-F238E27FC236}">
-                <a16:creationId xmlns:a16="http://schemas.microsoft.com/office/drawing/2014/main" id="{23D155C1-BF6E-5745-92DF-ADCB7B6828D2}"/>
-              </a:ext>
-            </a:extLst>
-          </p:cNvPr>
-          <p:cNvSpPr>
-            <a:spLocks noGrp="1"/>
-          </p:cNvSpPr>
-          <p:nvPr>
             <p:ph type="ftr" sz="quarter" idx="3"/>
           </p:nvPr>
         </p:nvSpPr>
@@ -8728,7 +9682,7 @@
           <p:cNvPr id="6" name="Slide Number Placeholder 5">
             <a:extLst>
               <a:ext uri="{FF2B5EF4-FFF2-40B4-BE49-F238E27FC236}">
-                <a16:creationId xmlns:a16="http://schemas.microsoft.com/office/drawing/2014/main" id="{1B24E391-83E3-FF40-992E-18DE009D209B}"/>
+                <a16:creationId xmlns:a16="http://schemas.microsoft.com/office/drawing/2014/main" id="{DFBAC0A9-4FB7-414D-BFA7-B62195B7FD33}"/>
               </a:ext>
             </a:extLst>
           </p:cNvPr>
@@ -8754,10 +9708,40 @@
           </a:p>
         </p:txBody>
       </p:sp>
+      <p:pic>
+        <p:nvPicPr>
+          <p:cNvPr id="8" name="Picture 7">
+            <a:extLst>
+              <a:ext uri="{FF2B5EF4-FFF2-40B4-BE49-F238E27FC236}">
+                <a16:creationId xmlns:a16="http://schemas.microsoft.com/office/drawing/2014/main" id="{EC384AC9-957A-294C-B2F5-1B82B8753EE0}"/>
+              </a:ext>
+            </a:extLst>
+          </p:cNvPr>
+          <p:cNvPicPr>
+            <a:picLocks noChangeAspect="1"/>
+          </p:cNvPicPr>
+          <p:nvPr/>
+        </p:nvPicPr>
+        <p:blipFill>
+          <a:blip r:embed="rId2"/>
+          <a:stretch>
+            <a:fillRect/>
+          </a:stretch>
+        </p:blipFill>
+        <p:spPr>
+          <a:xfrm>
+            <a:off x="0" y="893"/>
+            <a:ext cx="12188825" cy="6856214"/>
+          </a:xfrm>
+          <a:prstGeom prst="rect">
+            <a:avLst/>
+          </a:prstGeom>
+        </p:spPr>
+      </p:pic>
     </p:spTree>
     <p:extLst>
       <p:ext uri="{BB962C8B-B14F-4D97-AF65-F5344CB8AC3E}">
-        <p14:creationId xmlns:p14="http://schemas.microsoft.com/office/powerpoint/2010/main" val="2514435320"/>
+        <p14:creationId xmlns:p14="http://schemas.microsoft.com/office/powerpoint/2010/main" val="1988005590"/>
       </p:ext>
     </p:extLst>
   </p:cSld>
@@ -8789,7 +9773,7 @@
           <p:cNvPr id="2" name="Title 1">
             <a:extLst>
               <a:ext uri="{FF2B5EF4-FFF2-40B4-BE49-F238E27FC236}">
-                <a16:creationId xmlns:a16="http://schemas.microsoft.com/office/drawing/2014/main" id="{019428AE-A3E3-764E-9B6A-8217D5478EAF}"/>
+                <a16:creationId xmlns:a16="http://schemas.microsoft.com/office/drawing/2014/main" id="{B421EA95-BB16-3742-876E-A41F29E75322}"/>
               </a:ext>
             </a:extLst>
           </p:cNvPr>
@@ -8807,46 +9791,77 @@
           <a:p>
             <a:r>
               <a:rPr lang="en-US" dirty="0"/>
-              <a:t>Before We Get Started…</a:t>
-            </a:r>
-          </a:p>
-        </p:txBody>
-      </p:sp>
-      <p:pic>
-        <p:nvPicPr>
-          <p:cNvPr id="7" name="Content Placeholder 6">
+              <a:t>Agenda</a:t>
+            </a:r>
+          </a:p>
+        </p:txBody>
+      </p:sp>
+      <p:sp>
+        <p:nvSpPr>
+          <p:cNvPr id="3" name="Content Placeholder 2">
             <a:extLst>
               <a:ext uri="{FF2B5EF4-FFF2-40B4-BE49-F238E27FC236}">
-                <a16:creationId xmlns:a16="http://schemas.microsoft.com/office/drawing/2014/main" id="{8C164050-9FAD-6B4B-AF7E-39F2469728BD}"/>
+                <a16:creationId xmlns:a16="http://schemas.microsoft.com/office/drawing/2014/main" id="{4A30129A-4023-334B-B984-DFE3844B1B9C}"/>
               </a:ext>
             </a:extLst>
           </p:cNvPr>
-          <p:cNvPicPr>
-            <a:picLocks noGrp="1" noChangeAspect="1"/>
-          </p:cNvPicPr>
+          <p:cNvSpPr>
+            <a:spLocks noGrp="1"/>
+          </p:cNvSpPr>
           <p:nvPr>
             <p:ph idx="1"/>
           </p:nvPr>
-        </p:nvPicPr>
-        <p:blipFill>
-          <a:blip r:embed="rId2"/>
-          <a:stretch>
-            <a:fillRect/>
-          </a:stretch>
-        </p:blipFill>
-        <p:spPr>
-          <a:xfrm>
-            <a:off x="4434567" y="1233152"/>
-            <a:ext cx="3340861" cy="3340861"/>
-          </a:xfrm>
-        </p:spPr>
-      </p:pic>
+        </p:nvSpPr>
+        <p:spPr/>
+        <p:txBody>
+          <a:bodyPr>
+            <a:normAutofit/>
+          </a:bodyPr>
+          <a:lstStyle/>
+          <a:p>
+            <a:r>
+              <a:rPr lang="en-US" sz="2400" dirty="0"/>
+              <a:t>Introduction</a:t>
+            </a:r>
+          </a:p>
+          <a:p>
+            <a:r>
+              <a:rPr lang="en-US" sz="2400" dirty="0"/>
+              <a:t>AWS Lambda Elevator Pitch</a:t>
+            </a:r>
+          </a:p>
+          <a:p>
+            <a:r>
+              <a:rPr lang="en-US" sz="2400" dirty="0"/>
+              <a:t>Why Kotlin?</a:t>
+            </a:r>
+          </a:p>
+          <a:p>
+            <a:r>
+              <a:rPr lang="en-US" sz="2400" dirty="0"/>
+              <a:t>So, how do we do this?</a:t>
+            </a:r>
+          </a:p>
+          <a:p>
+            <a:r>
+              <a:rPr lang="en-US" sz="2400" dirty="0"/>
+              <a:t>Links</a:t>
+            </a:r>
+          </a:p>
+          <a:p>
+            <a:r>
+              <a:rPr lang="en-US" sz="2400" dirty="0"/>
+              <a:t>Questions</a:t>
+            </a:r>
+          </a:p>
+        </p:txBody>
+      </p:sp>
       <p:sp>
         <p:nvSpPr>
           <p:cNvPr id="4" name="Subtitle 3">
             <a:extLst>
               <a:ext uri="{FF2B5EF4-FFF2-40B4-BE49-F238E27FC236}">
-                <a16:creationId xmlns:a16="http://schemas.microsoft.com/office/drawing/2014/main" id="{494F5345-2D74-7D49-8027-AF99D65D7382}"/>
+                <a16:creationId xmlns:a16="http://schemas.microsoft.com/office/drawing/2014/main" id="{9AC6D470-5992-C345-9DEC-960511667D11}"/>
               </a:ext>
             </a:extLst>
           </p:cNvPr>
@@ -8871,7 +9886,7 @@
           <p:cNvPr id="5" name="Footer Placeholder 4">
             <a:extLst>
               <a:ext uri="{FF2B5EF4-FFF2-40B4-BE49-F238E27FC236}">
-                <a16:creationId xmlns:a16="http://schemas.microsoft.com/office/drawing/2014/main" id="{6F1A7598-D015-D140-A248-0F4C10D6E22F}"/>
+                <a16:creationId xmlns:a16="http://schemas.microsoft.com/office/drawing/2014/main" id="{23D155C1-BF6E-5745-92DF-ADCB7B6828D2}"/>
               </a:ext>
             </a:extLst>
           </p:cNvPr>
@@ -8900,7 +9915,7 @@
           <p:cNvPr id="6" name="Slide Number Placeholder 5">
             <a:extLst>
               <a:ext uri="{FF2B5EF4-FFF2-40B4-BE49-F238E27FC236}">
-                <a16:creationId xmlns:a16="http://schemas.microsoft.com/office/drawing/2014/main" id="{44154E07-A14C-CB46-8835-DD36BE322D64}"/>
+                <a16:creationId xmlns:a16="http://schemas.microsoft.com/office/drawing/2014/main" id="{1B24E391-83E3-FF40-992E-18DE009D209B}"/>
               </a:ext>
             </a:extLst>
           </p:cNvPr>
@@ -8926,66 +9941,10 @@
           </a:p>
         </p:txBody>
       </p:sp>
-      <p:sp>
-        <p:nvSpPr>
-          <p:cNvPr id="8" name="TextBox 7">
-            <a:extLst>
-              <a:ext uri="{FF2B5EF4-FFF2-40B4-BE49-F238E27FC236}">
-                <a16:creationId xmlns:a16="http://schemas.microsoft.com/office/drawing/2014/main" id="{1BAC3316-0DC7-FE42-8C97-F233651D0BEC}"/>
-              </a:ext>
-            </a:extLst>
-          </p:cNvPr>
-          <p:cNvSpPr txBox="1"/>
-          <p:nvPr/>
-        </p:nvSpPr>
-        <p:spPr>
-          <a:xfrm>
-            <a:off x="289324" y="4772685"/>
-            <a:ext cx="11631346" cy="1384995"/>
-          </a:xfrm>
-          <a:prstGeom prst="rect">
-            <a:avLst/>
-          </a:prstGeom>
-          <a:noFill/>
-        </p:spPr>
-        <p:txBody>
-          <a:bodyPr wrap="square" rtlCol="0">
-            <a:spAutoFit/>
-          </a:bodyPr>
-          <a:lstStyle/>
-          <a:p>
-            <a:pPr algn="ctr"/>
-            <a:r>
-              <a:rPr lang="en-US" sz="2800" dirty="0"/>
-              <a:t>No need to write down or take pics of slide deck content</a:t>
-            </a:r>
-          </a:p>
-          <a:p>
-            <a:pPr algn="ctr"/>
-            <a:r>
-              <a:rPr lang="en-US" sz="2800" dirty="0"/>
-              <a:t>Presentation:</a:t>
-            </a:r>
-            <a:endParaRPr lang="en-US" sz="2800" b="1" dirty="0"/>
-          </a:p>
-          <a:p>
-            <a:pPr algn="ctr"/>
-            <a:r>
-              <a:rPr lang="en-US" sz="2800" dirty="0" err="1"/>
-              <a:t>Github</a:t>
-            </a:r>
-            <a:r>
-              <a:rPr lang="en-US" sz="2800" dirty="0"/>
-              <a:t> repository:</a:t>
-            </a:r>
-            <a:endParaRPr lang="en-US" sz="2800" b="1" dirty="0"/>
-          </a:p>
-        </p:txBody>
-      </p:sp>
     </p:spTree>
     <p:extLst>
       <p:ext uri="{BB962C8B-B14F-4D97-AF65-F5344CB8AC3E}">
-        <p14:creationId xmlns:p14="http://schemas.microsoft.com/office/powerpoint/2010/main" val="3923086136"/>
+        <p14:creationId xmlns:p14="http://schemas.microsoft.com/office/powerpoint/2010/main" val="2514435320"/>
       </p:ext>
     </p:extLst>
   </p:cSld>
@@ -9017,7 +9976,7 @@
           <p:cNvPr id="2" name="Title 1">
             <a:extLst>
               <a:ext uri="{FF2B5EF4-FFF2-40B4-BE49-F238E27FC236}">
-                <a16:creationId xmlns:a16="http://schemas.microsoft.com/office/drawing/2014/main" id="{C2CC7635-4966-BC4A-84DD-29BFC0ED1226}"/>
+                <a16:creationId xmlns:a16="http://schemas.microsoft.com/office/drawing/2014/main" id="{019428AE-A3E3-764E-9B6A-8217D5478EAF}"/>
               </a:ext>
             </a:extLst>
           </p:cNvPr>
@@ -9035,75 +9994,46 @@
           <a:p>
             <a:r>
               <a:rPr lang="en-US" dirty="0"/>
-              <a:t>Introduction (me)</a:t>
-            </a:r>
-          </a:p>
-        </p:txBody>
-      </p:sp>
-      <p:sp>
-        <p:nvSpPr>
-          <p:cNvPr id="3" name="Content Placeholder 2">
+              <a:t>Before We Get Started…</a:t>
+            </a:r>
+          </a:p>
+        </p:txBody>
+      </p:sp>
+      <p:pic>
+        <p:nvPicPr>
+          <p:cNvPr id="7" name="Content Placeholder 6">
             <a:extLst>
               <a:ext uri="{FF2B5EF4-FFF2-40B4-BE49-F238E27FC236}">
-                <a16:creationId xmlns:a16="http://schemas.microsoft.com/office/drawing/2014/main" id="{ADDCD2F1-0788-8746-8807-EE55D7BB763A}"/>
+                <a16:creationId xmlns:a16="http://schemas.microsoft.com/office/drawing/2014/main" id="{8C164050-9FAD-6B4B-AF7E-39F2469728BD}"/>
               </a:ext>
             </a:extLst>
           </p:cNvPr>
-          <p:cNvSpPr>
-            <a:spLocks noGrp="1"/>
-          </p:cNvSpPr>
+          <p:cNvPicPr>
+            <a:picLocks noGrp="1" noChangeAspect="1"/>
+          </p:cNvPicPr>
           <p:nvPr>
             <p:ph idx="1"/>
           </p:nvPr>
-        </p:nvSpPr>
-        <p:spPr/>
-        <p:txBody>
-          <a:bodyPr>
-            <a:normAutofit/>
-          </a:bodyPr>
-          <a:lstStyle/>
-          <a:p>
-            <a:r>
-              <a:rPr lang="en-US" sz="2400" dirty="0"/>
-              <a:t>28+ year career</a:t>
-            </a:r>
-          </a:p>
-          <a:p>
-            <a:r>
-              <a:rPr lang="en-US" sz="2400" dirty="0"/>
-              <a:t>Several development projects for multiple companies</a:t>
-            </a:r>
-          </a:p>
-          <a:p>
-            <a:pPr lvl="1"/>
-            <a:r>
-              <a:rPr lang="en-US" sz="2000" dirty="0"/>
-              <a:t>IBM, Lexmark, Diebold, Limited Brands, Sterling Commerce, IBM (again), Leading EDJE, Crown Equipment Corp, Wendy’s, OEC, Improving, Ohio State, Abercrombie &amp; Fitch</a:t>
-            </a:r>
-          </a:p>
-          <a:p>
-            <a:r>
-              <a:rPr lang="en-US" sz="2400" dirty="0"/>
-              <a:t>Enjoy dining, traveling and craft brewery exploration with my wife</a:t>
-            </a:r>
-          </a:p>
-          <a:p>
-            <a:r>
-              <a:rPr lang="en-US" sz="2400" dirty="0"/>
-              <a:t>Who are you?</a:t>
-            </a:r>
-          </a:p>
-          <a:p>
-            <a:endParaRPr lang="en-US" sz="2400" dirty="0"/>
-          </a:p>
-        </p:txBody>
-      </p:sp>
+        </p:nvPicPr>
+        <p:blipFill>
+          <a:blip r:embed="rId2"/>
+          <a:stretch>
+            <a:fillRect/>
+          </a:stretch>
+        </p:blipFill>
+        <p:spPr>
+          <a:xfrm>
+            <a:off x="4434567" y="1233152"/>
+            <a:ext cx="3340861" cy="3340861"/>
+          </a:xfrm>
+        </p:spPr>
+      </p:pic>
       <p:sp>
         <p:nvSpPr>
           <p:cNvPr id="4" name="Subtitle 3">
             <a:extLst>
               <a:ext uri="{FF2B5EF4-FFF2-40B4-BE49-F238E27FC236}">
-                <a16:creationId xmlns:a16="http://schemas.microsoft.com/office/drawing/2014/main" id="{697E533F-79B0-1242-B668-3B28772F61F0}"/>
+                <a16:creationId xmlns:a16="http://schemas.microsoft.com/office/drawing/2014/main" id="{494F5345-2D74-7D49-8027-AF99D65D7382}"/>
               </a:ext>
             </a:extLst>
           </p:cNvPr>
@@ -9128,7 +10058,7 @@
           <p:cNvPr id="5" name="Footer Placeholder 4">
             <a:extLst>
               <a:ext uri="{FF2B5EF4-FFF2-40B4-BE49-F238E27FC236}">
-                <a16:creationId xmlns:a16="http://schemas.microsoft.com/office/drawing/2014/main" id="{499E2D86-ADF2-A446-92C2-2DE3B2C01879}"/>
+                <a16:creationId xmlns:a16="http://schemas.microsoft.com/office/drawing/2014/main" id="{6F1A7598-D015-D140-A248-0F4C10D6E22F}"/>
               </a:ext>
             </a:extLst>
           </p:cNvPr>
@@ -9157,7 +10087,7 @@
           <p:cNvPr id="6" name="Slide Number Placeholder 5">
             <a:extLst>
               <a:ext uri="{FF2B5EF4-FFF2-40B4-BE49-F238E27FC236}">
-                <a16:creationId xmlns:a16="http://schemas.microsoft.com/office/drawing/2014/main" id="{5F065DAA-3C97-BB48-980B-806F5C93A8CC}"/>
+                <a16:creationId xmlns:a16="http://schemas.microsoft.com/office/drawing/2014/main" id="{44154E07-A14C-CB46-8835-DD36BE322D64}"/>
               </a:ext>
             </a:extLst>
           </p:cNvPr>
@@ -9183,10 +10113,78 @@
           </a:p>
         </p:txBody>
       </p:sp>
+      <p:sp>
+        <p:nvSpPr>
+          <p:cNvPr id="8" name="TextBox 7">
+            <a:extLst>
+              <a:ext uri="{FF2B5EF4-FFF2-40B4-BE49-F238E27FC236}">
+                <a16:creationId xmlns:a16="http://schemas.microsoft.com/office/drawing/2014/main" id="{1BAC3316-0DC7-FE42-8C97-F233651D0BEC}"/>
+              </a:ext>
+            </a:extLst>
+          </p:cNvPr>
+          <p:cNvSpPr txBox="1"/>
+          <p:nvPr/>
+        </p:nvSpPr>
+        <p:spPr>
+          <a:xfrm>
+            <a:off x="289324" y="4772685"/>
+            <a:ext cx="11631346" cy="1384995"/>
+          </a:xfrm>
+          <a:prstGeom prst="rect">
+            <a:avLst/>
+          </a:prstGeom>
+          <a:noFill/>
+        </p:spPr>
+        <p:txBody>
+          <a:bodyPr wrap="square" rtlCol="0">
+            <a:spAutoFit/>
+          </a:bodyPr>
+          <a:lstStyle/>
+          <a:p>
+            <a:pPr algn="ctr"/>
+            <a:r>
+              <a:rPr lang="en-US" sz="2800" dirty="0"/>
+              <a:t>No need to write down or take pics of slide deck content</a:t>
+            </a:r>
+          </a:p>
+          <a:p>
+            <a:pPr algn="ctr"/>
+            <a:r>
+              <a:rPr lang="en-US" sz="2800" dirty="0"/>
+              <a:t>Presentation: </a:t>
+            </a:r>
+            <a:r>
+              <a:rPr lang="en-US" sz="2800" dirty="0">
+                <a:hlinkClick r:id="rId3"/>
+              </a:rPr>
+              <a:t>https://goo.gl/EHfTEC</a:t>
+            </a:r>
+            <a:endParaRPr lang="en-US" sz="2800" dirty="0"/>
+          </a:p>
+          <a:p>
+            <a:pPr algn="ctr"/>
+            <a:r>
+              <a:rPr lang="en-US" sz="2800" dirty="0" err="1"/>
+              <a:t>Github</a:t>
+            </a:r>
+            <a:r>
+              <a:rPr lang="en-US" sz="2800" dirty="0"/>
+              <a:t> repository: </a:t>
+            </a:r>
+            <a:r>
+              <a:rPr lang="en-US" sz="2800" dirty="0">
+                <a:hlinkClick r:id="rId4"/>
+              </a:rPr>
+              <a:t>https://github.com/jkwuc89/kotlinawslambda</a:t>
+            </a:r>
+            <a:endParaRPr lang="en-US" sz="2800" dirty="0"/>
+          </a:p>
+        </p:txBody>
+      </p:sp>
     </p:spTree>
     <p:extLst>
       <p:ext uri="{BB962C8B-B14F-4D97-AF65-F5344CB8AC3E}">
-        <p14:creationId xmlns:p14="http://schemas.microsoft.com/office/powerpoint/2010/main" val="1247063801"/>
+        <p14:creationId xmlns:p14="http://schemas.microsoft.com/office/powerpoint/2010/main" val="3923086136"/>
       </p:ext>
     </p:extLst>
   </p:cSld>
@@ -9218,7 +10216,7 @@
           <p:cNvPr id="2" name="Title 1">
             <a:extLst>
               <a:ext uri="{FF2B5EF4-FFF2-40B4-BE49-F238E27FC236}">
-                <a16:creationId xmlns:a16="http://schemas.microsoft.com/office/drawing/2014/main" id="{FFC029B8-0887-0E44-94F7-FF3426F445C0}"/>
+                <a16:creationId xmlns:a16="http://schemas.microsoft.com/office/drawing/2014/main" id="{C2CC7635-4966-BC4A-84DD-29BFC0ED1226}"/>
               </a:ext>
             </a:extLst>
           </p:cNvPr>
@@ -9236,7 +10234,7 @@
           <a:p>
             <a:r>
               <a:rPr lang="en-US" dirty="0"/>
-              <a:t>Introduction (Improving)</a:t>
+              <a:t>Introduction (me)</a:t>
             </a:r>
           </a:p>
         </p:txBody>
@@ -9246,7 +10244,7 @@
           <p:cNvPr id="3" name="Content Placeholder 2">
             <a:extLst>
               <a:ext uri="{FF2B5EF4-FFF2-40B4-BE49-F238E27FC236}">
-                <a16:creationId xmlns:a16="http://schemas.microsoft.com/office/drawing/2014/main" id="{70E434A7-7358-3F4D-B766-3F6626014219}"/>
+                <a16:creationId xmlns:a16="http://schemas.microsoft.com/office/drawing/2014/main" id="{ADDCD2F1-0788-8746-8807-EE55D7BB763A}"/>
               </a:ext>
             </a:extLst>
           </p:cNvPr>
@@ -9265,81 +10263,37 @@
           <a:lstStyle/>
           <a:p>
             <a:r>
-              <a:rPr lang="en-US" sz="2000" b="1" dirty="0"/>
-              <a:t>Values: Excellence, Involvement, and Dedication</a:t>
-            </a:r>
+              <a:rPr lang="en-US" sz="2400" dirty="0"/>
+              <a:t>28+ year career</a:t>
+            </a:r>
+          </a:p>
+          <a:p>
+            <a:r>
+              <a:rPr lang="en-US" sz="2400" dirty="0"/>
+              <a:t>Several development projects for multiple companies</a:t>
+            </a:r>
+          </a:p>
+          <a:p>
+            <a:pPr lvl="1"/>
             <a:r>
               <a:rPr lang="en-US" sz="2000" dirty="0"/>
-              <a:t> </a:t>
-            </a:r>
-          </a:p>
-          <a:p>
-            <a:r>
-              <a:rPr lang="en-US" sz="2000" dirty="0"/>
-              <a:t>Complete IT services firm, offering training, consulting, recruiting, and project services</a:t>
-            </a:r>
-          </a:p>
-          <a:p>
-            <a:r>
-              <a:rPr lang="en-US" sz="2000" dirty="0"/>
-              <a:t>Offices in Columbus, Cleveland, Calgary, Minneapolis, Dallas, Houston and College Station</a:t>
-            </a:r>
-          </a:p>
-          <a:p>
-            <a:r>
-              <a:rPr lang="en-US" sz="2000" dirty="0"/>
-              <a:t>Creating a great place to work by </a:t>
-            </a:r>
-          </a:p>
-          <a:p>
-            <a:pPr lvl="1"/>
-            <a:r>
-              <a:rPr lang="en-US" sz="1800" dirty="0"/>
-              <a:t>Cultivating an environment that fosters authentic and long term professional relationships </a:t>
-            </a:r>
-          </a:p>
-          <a:p>
-            <a:pPr lvl="1"/>
-            <a:r>
-              <a:rPr lang="en-US" sz="1800" dirty="0"/>
-              <a:t>Sharing the success and accomplishments of the company </a:t>
-            </a:r>
-          </a:p>
-          <a:p>
-            <a:pPr lvl="1"/>
-            <a:r>
-              <a:rPr lang="en-US" sz="1800" dirty="0"/>
-              <a:t>Promoting open and honest communication </a:t>
-            </a:r>
-          </a:p>
-          <a:p>
-            <a:pPr lvl="1"/>
-            <a:r>
-              <a:rPr lang="en-US" sz="1800" dirty="0"/>
-              <a:t>Providing creative ways for each of us to learn and grow</a:t>
-            </a:r>
-          </a:p>
-          <a:p>
-            <a:pPr lvl="1"/>
-            <a:r>
-              <a:rPr lang="en-US" sz="1800" dirty="0"/>
-              <a:t>Encouraging a positive atmosphere which is both friendly and fun</a:t>
-            </a:r>
-          </a:p>
-          <a:p>
-            <a:r>
-              <a:rPr lang="en-US" sz="1950" dirty="0">
-                <a:hlinkClick r:id="rId2"/>
-              </a:rPr>
-              <a:t>http://improving.com</a:t>
-            </a:r>
-            <a:endParaRPr lang="en-US" sz="1950" dirty="0"/>
-          </a:p>
-          <a:p>
-            <a:pPr marL="51435" indent="0">
-              <a:buNone/>
-            </a:pPr>
-            <a:endParaRPr lang="en-US" sz="1950" dirty="0"/>
+              <a:t>IBM, Lexmark, Diebold, Limited Brands, Sterling Commerce, IBM (again), Leading EDJE, Crown Equipment Corp, Wendy’s, OEC, Improving, Ohio State, Abercrombie &amp; Fitch</a:t>
+            </a:r>
+          </a:p>
+          <a:p>
+            <a:r>
+              <a:rPr lang="en-US" sz="2400" dirty="0"/>
+              <a:t>Enjoy dining, traveling and craft brewery exploration with my wife</a:t>
+            </a:r>
+          </a:p>
+          <a:p>
+            <a:r>
+              <a:rPr lang="en-US" sz="2400" dirty="0"/>
+              <a:t>Who are you?</a:t>
+            </a:r>
+          </a:p>
+          <a:p>
+            <a:endParaRPr lang="en-US" sz="2400" dirty="0"/>
           </a:p>
         </p:txBody>
       </p:sp>
@@ -9348,7 +10302,7 @@
           <p:cNvPr id="4" name="Subtitle 3">
             <a:extLst>
               <a:ext uri="{FF2B5EF4-FFF2-40B4-BE49-F238E27FC236}">
-                <a16:creationId xmlns:a16="http://schemas.microsoft.com/office/drawing/2014/main" id="{0DF9A954-920E-734B-BC6B-DAB19D274AC3}"/>
+                <a16:creationId xmlns:a16="http://schemas.microsoft.com/office/drawing/2014/main" id="{697E533F-79B0-1242-B668-3B28772F61F0}"/>
               </a:ext>
             </a:extLst>
           </p:cNvPr>
@@ -9373,7 +10327,7 @@
           <p:cNvPr id="5" name="Footer Placeholder 4">
             <a:extLst>
               <a:ext uri="{FF2B5EF4-FFF2-40B4-BE49-F238E27FC236}">
-                <a16:creationId xmlns:a16="http://schemas.microsoft.com/office/drawing/2014/main" id="{B2C7DCCD-B733-914A-AB9B-8803BCA8771B}"/>
+                <a16:creationId xmlns:a16="http://schemas.microsoft.com/office/drawing/2014/main" id="{499E2D86-ADF2-A446-92C2-2DE3B2C01879}"/>
               </a:ext>
             </a:extLst>
           </p:cNvPr>
@@ -9402,7 +10356,7 @@
           <p:cNvPr id="6" name="Slide Number Placeholder 5">
             <a:extLst>
               <a:ext uri="{FF2B5EF4-FFF2-40B4-BE49-F238E27FC236}">
-                <a16:creationId xmlns:a16="http://schemas.microsoft.com/office/drawing/2014/main" id="{33C67A40-2014-2441-9229-6743DB3B77D0}"/>
+                <a16:creationId xmlns:a16="http://schemas.microsoft.com/office/drawing/2014/main" id="{5F065DAA-3C97-BB48-980B-806F5C93A8CC}"/>
               </a:ext>
             </a:extLst>
           </p:cNvPr>
@@ -9431,7 +10385,7 @@
     </p:spTree>
     <p:extLst>
       <p:ext uri="{BB962C8B-B14F-4D97-AF65-F5344CB8AC3E}">
-        <p14:creationId xmlns:p14="http://schemas.microsoft.com/office/powerpoint/2010/main" val="2676875404"/>
+        <p14:creationId xmlns:p14="http://schemas.microsoft.com/office/powerpoint/2010/main" val="1247063801"/>
       </p:ext>
     </p:extLst>
   </p:cSld>
@@ -9463,7 +10417,7 @@
           <p:cNvPr id="2" name="Title 1">
             <a:extLst>
               <a:ext uri="{FF2B5EF4-FFF2-40B4-BE49-F238E27FC236}">
-                <a16:creationId xmlns:a16="http://schemas.microsoft.com/office/drawing/2014/main" id="{136A9C2F-85A6-1F48-B084-1DDE61AB24D1}"/>
+                <a16:creationId xmlns:a16="http://schemas.microsoft.com/office/drawing/2014/main" id="{FFC029B8-0887-0E44-94F7-FF3426F445C0}"/>
               </a:ext>
             </a:extLst>
           </p:cNvPr>
@@ -9481,15 +10435,7 @@
           <a:p>
             <a:r>
               <a:rPr lang="en-US" dirty="0"/>
-              <a:t>Why </a:t>
-            </a:r>
-            <a:r>
-              <a:rPr lang="en-US" dirty="0" err="1"/>
-              <a:t>Kotlin</a:t>
-            </a:r>
-            <a:r>
-              <a:rPr lang="en-US" dirty="0"/>
-              <a:t>?</a:t>
+              <a:t>Introduction (Improving)</a:t>
             </a:r>
           </a:p>
         </p:txBody>
@@ -9499,7 +10445,7 @@
           <p:cNvPr id="3" name="Content Placeholder 2">
             <a:extLst>
               <a:ext uri="{FF2B5EF4-FFF2-40B4-BE49-F238E27FC236}">
-                <a16:creationId xmlns:a16="http://schemas.microsoft.com/office/drawing/2014/main" id="{F7E7C40A-DF6E-9741-96BE-4CB57A697E02}"/>
+                <a16:creationId xmlns:a16="http://schemas.microsoft.com/office/drawing/2014/main" id="{70E434A7-7358-3F4D-B766-3F6626014219}"/>
               </a:ext>
             </a:extLst>
           </p:cNvPr>
@@ -9512,131 +10458,87 @@
         </p:nvSpPr>
         <p:spPr/>
         <p:txBody>
-          <a:bodyPr/>
+          <a:bodyPr>
+            <a:normAutofit/>
+          </a:bodyPr>
           <a:lstStyle/>
           <a:p>
             <a:r>
-              <a:rPr lang="en-US" dirty="0"/>
-              <a:t>Reason #1: 100% compatibility with Java</a:t>
+              <a:rPr lang="en-US" sz="2000" b="1" dirty="0"/>
+              <a:t>Values: Excellence, Involvement, and Dedication</a:t>
+            </a:r>
+            <a:r>
+              <a:rPr lang="en-US" sz="2000" dirty="0"/>
+              <a:t> </a:t>
+            </a:r>
+          </a:p>
+          <a:p>
+            <a:r>
+              <a:rPr lang="en-US" sz="2000" dirty="0"/>
+              <a:t>Complete IT services firm, offering training, consulting, recruiting, and project services</a:t>
+            </a:r>
+          </a:p>
+          <a:p>
+            <a:r>
+              <a:rPr lang="en-US" sz="2000" dirty="0"/>
+              <a:t>Offices in Columbus, Cleveland, Calgary, Minneapolis, Dallas, Houston and College Station</a:t>
+            </a:r>
+          </a:p>
+          <a:p>
+            <a:r>
+              <a:rPr lang="en-US" sz="2000" dirty="0"/>
+              <a:t>Creating a great place to work by </a:t>
             </a:r>
           </a:p>
           <a:p>
             <a:pPr lvl="1"/>
             <a:r>
-              <a:rPr lang="en-US" dirty="0"/>
-              <a:t>Mix and match Java code and </a:t>
-            </a:r>
-            <a:r>
-              <a:rPr lang="en-US" dirty="0" err="1"/>
-              <a:t>Kotlin</a:t>
-            </a:r>
-            <a:r>
-              <a:rPr lang="en-US" dirty="0"/>
-              <a:t> code freely!</a:t>
+              <a:rPr lang="en-US" sz="1800" dirty="0"/>
+              <a:t>Cultivating an environment that fosters authentic and long term professional relationships </a:t>
             </a:r>
           </a:p>
           <a:p>
             <a:pPr lvl="1"/>
             <a:r>
-              <a:rPr lang="en-US" dirty="0"/>
-              <a:t>Demo</a:t>
-            </a:r>
-          </a:p>
-          <a:p>
-            <a:r>
-              <a:rPr lang="en-US" dirty="0"/>
-              <a:t>Reason #2: Code brevity</a:t>
+              <a:rPr lang="en-US" sz="1800" dirty="0"/>
+              <a:t>Sharing the success and accomplishments of the company </a:t>
             </a:r>
           </a:p>
           <a:p>
             <a:pPr lvl="1"/>
             <a:r>
-              <a:rPr lang="en-US" dirty="0"/>
-              <a:t>Prime example: Data classes</a:t>
-            </a:r>
-          </a:p>
-          <a:p>
-            <a:pPr lvl="2"/>
-            <a:r>
-              <a:rPr lang="en-US" dirty="0"/>
-              <a:t>No more writing getters/setters/</a:t>
-            </a:r>
-            <a:r>
-              <a:rPr lang="en-US" dirty="0" err="1"/>
-              <a:t>hashCode</a:t>
-            </a:r>
-            <a:r>
-              <a:rPr lang="en-US" dirty="0"/>
-              <a:t>/equals/</a:t>
-            </a:r>
-            <a:r>
-              <a:rPr lang="en-US" dirty="0" err="1"/>
-              <a:t>toString</a:t>
-            </a:r>
-            <a:r>
-              <a:rPr lang="en-US" dirty="0"/>
-              <a:t>()</a:t>
+              <a:rPr lang="en-US" sz="1800" dirty="0"/>
+              <a:t>Promoting open and honest communication </a:t>
             </a:r>
           </a:p>
           <a:p>
             <a:pPr lvl="1"/>
             <a:r>
-              <a:rPr lang="en-US" dirty="0"/>
-              <a:t>Demo</a:t>
-            </a:r>
-          </a:p>
-          <a:p>
-            <a:r>
-              <a:rPr lang="en-US" dirty="0"/>
-              <a:t>Reason #3: Ecosystem support</a:t>
+              <a:rPr lang="en-US" sz="1800" dirty="0"/>
+              <a:t>Providing creative ways for each of us to learn and grow</a:t>
             </a:r>
           </a:p>
           <a:p>
             <a:pPr lvl="1"/>
             <a:r>
-              <a:rPr lang="en-US" dirty="0"/>
-              <a:t>Spring Framework 5.0</a:t>
-            </a:r>
-          </a:p>
-          <a:p>
-            <a:pPr lvl="2"/>
-            <a:r>
-              <a:rPr lang="en-US" dirty="0">
-                <a:hlinkClick r:id="rId3"/>
+              <a:rPr lang="en-US" sz="1800" dirty="0"/>
+              <a:t>Encouraging a positive atmosphere which is both friendly and fun</a:t>
+            </a:r>
+          </a:p>
+          <a:p>
+            <a:r>
+              <a:rPr lang="en-US" sz="1950" dirty="0">
+                <a:hlinkClick r:id="rId2"/>
               </a:rPr>
-              <a:t>https://spring.io/blog/2017/01/04/introducing-kotlin-support-in-spring-framework-5-0</a:t>
-            </a:r>
-            <a:endParaRPr lang="en-US" dirty="0"/>
-          </a:p>
-          <a:p>
-            <a:pPr lvl="1"/>
-            <a:r>
-              <a:rPr lang="en-US" dirty="0"/>
-              <a:t>Android</a:t>
-            </a:r>
-          </a:p>
-          <a:p>
-            <a:pPr lvl="1"/>
-            <a:r>
-              <a:rPr lang="en-US" dirty="0"/>
-              <a:t>IntelliJ IDEA</a:t>
-            </a:r>
-          </a:p>
-          <a:p>
-            <a:pPr lvl="2"/>
-            <a:r>
-              <a:rPr lang="en-US" dirty="0"/>
-              <a:t>Bonus: Convert Java to </a:t>
-            </a:r>
-            <a:r>
-              <a:rPr lang="en-US" dirty="0" err="1"/>
-              <a:t>Kotlin</a:t>
-            </a:r>
-            <a:endParaRPr lang="en-US" dirty="0"/>
-          </a:p>
-          <a:p>
-            <a:pPr lvl="1"/>
-            <a:endParaRPr lang="en-US" dirty="0"/>
+              <a:t>http://improving.com</a:t>
+            </a:r>
+            <a:endParaRPr lang="en-US" sz="1950" dirty="0"/>
+          </a:p>
+          <a:p>
+            <a:pPr marL="51435" indent="0">
+              <a:buNone/>
+            </a:pPr>
+            <a:endParaRPr lang="en-US" sz="1950" dirty="0"/>
           </a:p>
         </p:txBody>
       </p:sp>
@@ -9645,7 +10547,7 @@
           <p:cNvPr id="4" name="Subtitle 3">
             <a:extLst>
               <a:ext uri="{FF2B5EF4-FFF2-40B4-BE49-F238E27FC236}">
-                <a16:creationId xmlns:a16="http://schemas.microsoft.com/office/drawing/2014/main" id="{452221BF-98F6-934D-84FC-A5C3EACB4147}"/>
+                <a16:creationId xmlns:a16="http://schemas.microsoft.com/office/drawing/2014/main" id="{0DF9A954-920E-734B-BC6B-DAB19D274AC3}"/>
               </a:ext>
             </a:extLst>
           </p:cNvPr>
@@ -9670,7 +10572,7 @@
           <p:cNvPr id="5" name="Footer Placeholder 4">
             <a:extLst>
               <a:ext uri="{FF2B5EF4-FFF2-40B4-BE49-F238E27FC236}">
-                <a16:creationId xmlns:a16="http://schemas.microsoft.com/office/drawing/2014/main" id="{23751EEB-57C6-024E-B90E-03EBDCB2F94C}"/>
+                <a16:creationId xmlns:a16="http://schemas.microsoft.com/office/drawing/2014/main" id="{B2C7DCCD-B733-914A-AB9B-8803BCA8771B}"/>
               </a:ext>
             </a:extLst>
           </p:cNvPr>
@@ -9699,7 +10601,7 @@
           <p:cNvPr id="6" name="Slide Number Placeholder 5">
             <a:extLst>
               <a:ext uri="{FF2B5EF4-FFF2-40B4-BE49-F238E27FC236}">
-                <a16:creationId xmlns:a16="http://schemas.microsoft.com/office/drawing/2014/main" id="{621FAAC5-FC95-C843-ADEA-B9D8D66A0CAA}"/>
+                <a16:creationId xmlns:a16="http://schemas.microsoft.com/office/drawing/2014/main" id="{33C67A40-2014-2441-9229-6743DB3B77D0}"/>
               </a:ext>
             </a:extLst>
           </p:cNvPr>
@@ -9728,7 +10630,7 @@
     </p:spTree>
     <p:extLst>
       <p:ext uri="{BB962C8B-B14F-4D97-AF65-F5344CB8AC3E}">
-        <p14:creationId xmlns:p14="http://schemas.microsoft.com/office/powerpoint/2010/main" val="2410272699"/>
+        <p14:creationId xmlns:p14="http://schemas.microsoft.com/office/powerpoint/2010/main" val="2676875404"/>
       </p:ext>
     </p:extLst>
   </p:cSld>
@@ -9760,7 +10662,7 @@
           <p:cNvPr id="2" name="Title 1">
             <a:extLst>
               <a:ext uri="{FF2B5EF4-FFF2-40B4-BE49-F238E27FC236}">
-                <a16:creationId xmlns:a16="http://schemas.microsoft.com/office/drawing/2014/main" id="{6076743A-6C42-8644-AA7A-4FE77DBCC4B9}"/>
+                <a16:creationId xmlns:a16="http://schemas.microsoft.com/office/drawing/2014/main" id="{369CD339-1E2E-944A-8563-AA22857F3965}"/>
               </a:ext>
             </a:extLst>
           </p:cNvPr>
@@ -9778,7 +10680,7 @@
           <a:p>
             <a:r>
               <a:rPr lang="en-US" dirty="0"/>
-              <a:t>So, how do we do this?</a:t>
+              <a:t>AWS Lambda Elevator Pitch</a:t>
             </a:r>
           </a:p>
         </p:txBody>
@@ -9788,7 +10690,7 @@
           <p:cNvPr id="3" name="Content Placeholder 2">
             <a:extLst>
               <a:ext uri="{FF2B5EF4-FFF2-40B4-BE49-F238E27FC236}">
-                <a16:creationId xmlns:a16="http://schemas.microsoft.com/office/drawing/2014/main" id="{DE306633-5D07-9B44-AD8F-EED4A2BC5A65}"/>
+                <a16:creationId xmlns:a16="http://schemas.microsoft.com/office/drawing/2014/main" id="{81C062E8-9121-AB4F-AF9B-2487EDB8DE52}"/>
               </a:ext>
             </a:extLst>
           </p:cNvPr>
@@ -9801,103 +10703,125 @@
         </p:nvSpPr>
         <p:spPr/>
         <p:txBody>
-          <a:bodyPr>
-            <a:normAutofit/>
-          </a:bodyPr>
+          <a:bodyPr/>
           <a:lstStyle/>
           <a:p>
-            <a:pPr marL="51435" indent="0">
-              <a:buNone/>
-            </a:pPr>
             <a:r>
               <a:rPr lang="en-US" dirty="0"/>
-              <a:t>First, some recommendations and tips</a:t>
+              <a:t>“Serverless” computing…what does this mean?</a:t>
             </a:r>
           </a:p>
           <a:p>
             <a:r>
               <a:rPr lang="en-US" dirty="0"/>
-              <a:t>Use </a:t>
-            </a:r>
-            <a:r>
-              <a:rPr lang="en-US" b="1" dirty="0" err="1"/>
-              <a:t>sdkman</a:t>
-            </a:r>
+              <a:t>“Run code without thinking about servers”</a:t>
+            </a:r>
+          </a:p>
+          <a:p>
+            <a:pPr lvl="1"/>
             <a:r>
               <a:rPr lang="en-US" dirty="0"/>
-              <a:t> to manage and use multiple </a:t>
+              <a:t>No servers to provision or manage</a:t>
+            </a:r>
+          </a:p>
+          <a:p>
+            <a:pPr lvl="2"/>
+            <a:r>
+              <a:rPr lang="en-US" dirty="0"/>
+              <a:t>Performs all the operational and administrative activities on your behalf</a:t>
+            </a:r>
+          </a:p>
+          <a:p>
+            <a:pPr lvl="1"/>
+            <a:r>
+              <a:rPr lang="en-US" dirty="0"/>
+              <a:t>Lambda only runs when triggered</a:t>
+            </a:r>
+          </a:p>
+          <a:p>
+            <a:pPr lvl="1"/>
+            <a:r>
+              <a:rPr lang="en-US" dirty="0"/>
+              <a:t>Uses only the compute resources needed</a:t>
+            </a:r>
+          </a:p>
+          <a:p>
+            <a:pPr lvl="2"/>
+            <a:r>
+              <a:rPr lang="en-US" dirty="0"/>
+              <a:t>Automatic scales up to large number of parallel executions</a:t>
+            </a:r>
+          </a:p>
+          <a:p>
+            <a:pPr lvl="2"/>
+            <a:r>
+              <a:rPr lang="en-US" dirty="0"/>
+              <a:t>Automatic downscaling by terminating execution when function ends</a:t>
+            </a:r>
+          </a:p>
+          <a:p>
+            <a:pPr lvl="1"/>
+            <a:r>
+              <a:rPr lang="en-US" dirty="0"/>
+              <a:t>Pay as you Go pricing rounded to nearest 100 </a:t>
             </a:r>
             <a:r>
               <a:rPr lang="en-US" dirty="0" err="1"/>
-              <a:t>gradle</a:t>
-            </a:r>
+              <a:t>ms</a:t>
+            </a:r>
+            <a:endParaRPr lang="en-US" dirty="0"/>
+          </a:p>
+          <a:p>
+            <a:pPr lvl="2"/>
             <a:r>
               <a:rPr lang="en-US" dirty="0"/>
-              <a:t> / </a:t>
-            </a:r>
-            <a:r>
-              <a:rPr lang="en-US" dirty="0" err="1"/>
-              <a:t>kotlin</a:t>
-            </a:r>
+              <a:t>Generous free tier: See </a:t>
+            </a:r>
+            <a:r>
+              <a:rPr lang="en-US" dirty="0">
+                <a:hlinkClick r:id="rId2"/>
+              </a:rPr>
+              <a:t>https://aws.amazon.com/lambda/pricing/</a:t>
+            </a:r>
+            <a:endParaRPr lang="en-US" dirty="0"/>
+          </a:p>
+          <a:p>
+            <a:pPr lvl="1"/>
             <a:r>
               <a:rPr lang="en-US" dirty="0"/>
-              <a:t> / maven versions</a:t>
+              <a:t>Native support for:</a:t>
+            </a:r>
+          </a:p>
+          <a:p>
+            <a:pPr lvl="2"/>
+            <a:r>
+              <a:rPr lang="en-US" dirty="0"/>
+              <a:t>C# with .NET Core 1.0 or 2.0</a:t>
+            </a:r>
+          </a:p>
+          <a:p>
+            <a:pPr lvl="2"/>
+            <a:r>
+              <a:rPr lang="en-US" dirty="0"/>
+              <a:t>Java 8</a:t>
+            </a:r>
+          </a:p>
+          <a:p>
+            <a:pPr lvl="2"/>
+            <a:r>
+              <a:rPr lang="en-US" dirty="0"/>
+              <a:t>NodeJS 6.10 or 8.10</a:t>
+            </a:r>
+          </a:p>
+          <a:p>
+            <a:pPr lvl="2"/>
+            <a:r>
+              <a:rPr lang="en-US" dirty="0"/>
+              <a:t>Python 2.7 or 3.6</a:t>
             </a:r>
           </a:p>
           <a:p>
             <a:pPr lvl="1"/>
-            <a:r>
-              <a:rPr lang="en-US" sz="1600" dirty="0">
-                <a:hlinkClick r:id="rId3"/>
-              </a:rPr>
-              <a:t>http://sdkman.io</a:t>
-            </a:r>
-            <a:endParaRPr lang="en-US" sz="1600" dirty="0"/>
-          </a:p>
-          <a:p>
-            <a:r>
-              <a:rPr lang="en-US" dirty="0"/>
-              <a:t>Use </a:t>
-            </a:r>
-            <a:r>
-              <a:rPr lang="en-US" dirty="0" err="1"/>
-              <a:t>gradle</a:t>
-            </a:r>
-            <a:r>
-              <a:rPr lang="en-US" dirty="0"/>
-              <a:t> wrapper inside Gradle based projects (demo soon)</a:t>
-            </a:r>
-          </a:p>
-          <a:p>
-            <a:r>
-              <a:rPr lang="en-US" dirty="0"/>
-              <a:t>Install a clipboard manager</a:t>
-            </a:r>
-          </a:p>
-          <a:p>
-            <a:pPr lvl="1"/>
-            <a:r>
-              <a:rPr lang="en-US" dirty="0"/>
-              <a:t>I like </a:t>
-            </a:r>
-            <a:r>
-              <a:rPr lang="en-US" b="1" dirty="0" err="1"/>
-              <a:t>Copy’em</a:t>
-            </a:r>
-            <a:r>
-              <a:rPr lang="en-US" b="1" dirty="0"/>
-              <a:t> Paste </a:t>
-            </a:r>
-            <a:r>
-              <a:rPr lang="en-US" dirty="0"/>
-              <a:t>- </a:t>
-            </a:r>
-            <a:r>
-              <a:rPr lang="en-US" dirty="0">
-                <a:hlinkClick r:id="rId4"/>
-              </a:rPr>
-              <a:t>https://goo.gl/MwSrkA</a:t>
-            </a:r>
             <a:endParaRPr lang="en-US" dirty="0"/>
           </a:p>
         </p:txBody>
@@ -9907,7 +10831,7 @@
           <p:cNvPr id="4" name="Subtitle 3">
             <a:extLst>
               <a:ext uri="{FF2B5EF4-FFF2-40B4-BE49-F238E27FC236}">
-                <a16:creationId xmlns:a16="http://schemas.microsoft.com/office/drawing/2014/main" id="{3A7FC29D-DE93-D640-8034-41978FD492C6}"/>
+                <a16:creationId xmlns:a16="http://schemas.microsoft.com/office/drawing/2014/main" id="{F7F32C62-F1D1-2B4C-85F2-92258682D1CE}"/>
               </a:ext>
             </a:extLst>
           </p:cNvPr>
@@ -9932,7 +10856,7 @@
           <p:cNvPr id="5" name="Footer Placeholder 4">
             <a:extLst>
               <a:ext uri="{FF2B5EF4-FFF2-40B4-BE49-F238E27FC236}">
-                <a16:creationId xmlns:a16="http://schemas.microsoft.com/office/drawing/2014/main" id="{1CDD5634-CB80-2D45-A34C-24C66E6127AA}"/>
+                <a16:creationId xmlns:a16="http://schemas.microsoft.com/office/drawing/2014/main" id="{AED3FABB-4992-6E43-95FB-C5C28B23D5BF}"/>
               </a:ext>
             </a:extLst>
           </p:cNvPr>
@@ -9961,7 +10885,7 @@
           <p:cNvPr id="6" name="Slide Number Placeholder 5">
             <a:extLst>
               <a:ext uri="{FF2B5EF4-FFF2-40B4-BE49-F238E27FC236}">
-                <a16:creationId xmlns:a16="http://schemas.microsoft.com/office/drawing/2014/main" id="{865CA060-3F57-694F-9B42-08335B8611F0}"/>
+                <a16:creationId xmlns:a16="http://schemas.microsoft.com/office/drawing/2014/main" id="{0CD66874-E8F4-BB4D-AC40-F55F4D5E6F37}"/>
               </a:ext>
             </a:extLst>
           </p:cNvPr>
@@ -9990,7 +10914,7 @@
     </p:spTree>
     <p:extLst>
       <p:ext uri="{BB962C8B-B14F-4D97-AF65-F5344CB8AC3E}">
-        <p14:creationId xmlns:p14="http://schemas.microsoft.com/office/powerpoint/2010/main" val="102645228"/>
+        <p14:creationId xmlns:p14="http://schemas.microsoft.com/office/powerpoint/2010/main" val="3715813274"/>
       </p:ext>
     </p:extLst>
   </p:cSld>
@@ -10022,7 +10946,7 @@
           <p:cNvPr id="2" name="Title 1">
             <a:extLst>
               <a:ext uri="{FF2B5EF4-FFF2-40B4-BE49-F238E27FC236}">
-                <a16:creationId xmlns:a16="http://schemas.microsoft.com/office/drawing/2014/main" id="{1B47D5F0-355A-C845-A929-8F23CA86AE46}"/>
+                <a16:creationId xmlns:a16="http://schemas.microsoft.com/office/drawing/2014/main" id="{136A9C2F-85A6-1F48-B084-1DDE61AB24D1}"/>
               </a:ext>
             </a:extLst>
           </p:cNvPr>
@@ -10040,7 +10964,15 @@
           <a:p>
             <a:r>
               <a:rPr lang="en-US" dirty="0"/>
-              <a:t>So, how do we do this?</a:t>
+              <a:t>Why </a:t>
+            </a:r>
+            <a:r>
+              <a:rPr lang="en-US" dirty="0" err="1"/>
+              <a:t>Kotlin</a:t>
+            </a:r>
+            <a:r>
+              <a:rPr lang="en-US" dirty="0"/>
+              <a:t>?</a:t>
             </a:r>
           </a:p>
         </p:txBody>
@@ -10050,7 +10982,7 @@
           <p:cNvPr id="3" name="Content Placeholder 2">
             <a:extLst>
               <a:ext uri="{FF2B5EF4-FFF2-40B4-BE49-F238E27FC236}">
-                <a16:creationId xmlns:a16="http://schemas.microsoft.com/office/drawing/2014/main" id="{13E467B1-D15E-A444-907D-026A04681533}"/>
+                <a16:creationId xmlns:a16="http://schemas.microsoft.com/office/drawing/2014/main" id="{F7E7C40A-DF6E-9741-96BE-4CB57A697E02}"/>
               </a:ext>
             </a:extLst>
           </p:cNvPr>
@@ -10069,9 +11001,141 @@
           <a:lstStyle/>
           <a:p>
             <a:r>
-              <a:rPr lang="en-US" sz="3200" dirty="0"/>
-              <a:t>Let’s do this! (demo / code walkthrough)</a:t>
-            </a:r>
+              <a:rPr lang="en-US" dirty="0"/>
+              <a:t>Reason #1: 100% compatibility with Java</a:t>
+            </a:r>
+          </a:p>
+          <a:p>
+            <a:pPr lvl="1"/>
+            <a:r>
+              <a:rPr lang="en-US" dirty="0"/>
+              <a:t>Mix and match Java code and </a:t>
+            </a:r>
+            <a:r>
+              <a:rPr lang="en-US" dirty="0" err="1"/>
+              <a:t>Kotlin</a:t>
+            </a:r>
+            <a:r>
+              <a:rPr lang="en-US" dirty="0"/>
+              <a:t> code freely!</a:t>
+            </a:r>
+          </a:p>
+          <a:p>
+            <a:pPr lvl="1"/>
+            <a:r>
+              <a:rPr lang="en-US" dirty="0"/>
+              <a:t>Demo</a:t>
+            </a:r>
+          </a:p>
+          <a:p>
+            <a:r>
+              <a:rPr lang="en-US" dirty="0"/>
+              <a:t>Reason #2: Code brevity</a:t>
+            </a:r>
+          </a:p>
+          <a:p>
+            <a:pPr lvl="1"/>
+            <a:r>
+              <a:rPr lang="en-US" dirty="0"/>
+              <a:t>Prime example: Data classes</a:t>
+            </a:r>
+          </a:p>
+          <a:p>
+            <a:pPr lvl="2"/>
+            <a:r>
+              <a:rPr lang="en-US" dirty="0"/>
+              <a:t>No more writing getters/setters/</a:t>
+            </a:r>
+            <a:r>
+              <a:rPr lang="en-US" dirty="0" err="1"/>
+              <a:t>hashCode</a:t>
+            </a:r>
+            <a:r>
+              <a:rPr lang="en-US" dirty="0"/>
+              <a:t>/equals/</a:t>
+            </a:r>
+            <a:r>
+              <a:rPr lang="en-US" dirty="0" err="1"/>
+              <a:t>toString</a:t>
+            </a:r>
+            <a:r>
+              <a:rPr lang="en-US" dirty="0"/>
+              <a:t>()</a:t>
+            </a:r>
+          </a:p>
+          <a:p>
+            <a:pPr lvl="2"/>
+            <a:r>
+              <a:rPr lang="en-US" dirty="0"/>
+              <a:t>JSON serialization is coming: </a:t>
+            </a:r>
+            <a:r>
+              <a:rPr lang="en-US" dirty="0">
+                <a:hlinkClick r:id="rId3"/>
+              </a:rPr>
+              <a:t>https://github.com/Kotlin/kotlinx.serialization</a:t>
+            </a:r>
+            <a:endParaRPr lang="en-US" dirty="0"/>
+          </a:p>
+          <a:p>
+            <a:pPr lvl="1"/>
+            <a:r>
+              <a:rPr lang="en-US" dirty="0"/>
+              <a:t>Demo</a:t>
+            </a:r>
+          </a:p>
+          <a:p>
+            <a:r>
+              <a:rPr lang="en-US" dirty="0"/>
+              <a:t>Reason #3: Ecosystem support</a:t>
+            </a:r>
+          </a:p>
+          <a:p>
+            <a:pPr lvl="1"/>
+            <a:r>
+              <a:rPr lang="en-US" dirty="0"/>
+              <a:t>Spring Framework 5.0</a:t>
+            </a:r>
+          </a:p>
+          <a:p>
+            <a:pPr lvl="2"/>
+            <a:r>
+              <a:rPr lang="en-US" dirty="0">
+                <a:hlinkClick r:id="rId4"/>
+              </a:rPr>
+              <a:t>https://spring.io/blog/2017/01/04/introducing-kotlin-support-in-spring-framework-5-0</a:t>
+            </a:r>
+            <a:endParaRPr lang="en-US" dirty="0"/>
+          </a:p>
+          <a:p>
+            <a:pPr lvl="1"/>
+            <a:r>
+              <a:rPr lang="en-US" dirty="0"/>
+              <a:t>Android</a:t>
+            </a:r>
+          </a:p>
+          <a:p>
+            <a:pPr lvl="1"/>
+            <a:r>
+              <a:rPr lang="en-US" dirty="0"/>
+              <a:t>IntelliJ IDEA</a:t>
+            </a:r>
+          </a:p>
+          <a:p>
+            <a:pPr lvl="2"/>
+            <a:r>
+              <a:rPr lang="en-US" dirty="0"/>
+              <a:t>Bonus: Convert Java to </a:t>
+            </a:r>
+            <a:r>
+              <a:rPr lang="en-US" dirty="0" err="1"/>
+              <a:t>Kotlin</a:t>
+            </a:r>
+            <a:endParaRPr lang="en-US" dirty="0"/>
+          </a:p>
+          <a:p>
+            <a:pPr lvl="1"/>
+            <a:endParaRPr lang="en-US" dirty="0"/>
           </a:p>
         </p:txBody>
       </p:sp>
@@ -10080,7 +11144,7 @@
           <p:cNvPr id="4" name="Subtitle 3">
             <a:extLst>
               <a:ext uri="{FF2B5EF4-FFF2-40B4-BE49-F238E27FC236}">
-                <a16:creationId xmlns:a16="http://schemas.microsoft.com/office/drawing/2014/main" id="{3CC62F3A-88F1-D643-B02B-D37CFE56569F}"/>
+                <a16:creationId xmlns:a16="http://schemas.microsoft.com/office/drawing/2014/main" id="{452221BF-98F6-934D-84FC-A5C3EACB4147}"/>
               </a:ext>
             </a:extLst>
           </p:cNvPr>
@@ -10105,7 +11169,7 @@
           <p:cNvPr id="5" name="Footer Placeholder 4">
             <a:extLst>
               <a:ext uri="{FF2B5EF4-FFF2-40B4-BE49-F238E27FC236}">
-                <a16:creationId xmlns:a16="http://schemas.microsoft.com/office/drawing/2014/main" id="{8F1AAF1F-311D-7543-9D16-E7D194E26896}"/>
+                <a16:creationId xmlns:a16="http://schemas.microsoft.com/office/drawing/2014/main" id="{23751EEB-57C6-024E-B90E-03EBDCB2F94C}"/>
               </a:ext>
             </a:extLst>
           </p:cNvPr>
@@ -10134,7 +11198,7 @@
           <p:cNvPr id="6" name="Slide Number Placeholder 5">
             <a:extLst>
               <a:ext uri="{FF2B5EF4-FFF2-40B4-BE49-F238E27FC236}">
-                <a16:creationId xmlns:a16="http://schemas.microsoft.com/office/drawing/2014/main" id="{B21D4419-596C-4243-A369-0800DBC911F5}"/>
+                <a16:creationId xmlns:a16="http://schemas.microsoft.com/office/drawing/2014/main" id="{621FAAC5-FC95-C843-ADEA-B9D8D66A0CAA}"/>
               </a:ext>
             </a:extLst>
           </p:cNvPr>
@@ -10163,7 +11227,7 @@
     </p:spTree>
     <p:extLst>
       <p:ext uri="{BB962C8B-B14F-4D97-AF65-F5344CB8AC3E}">
-        <p14:creationId xmlns:p14="http://schemas.microsoft.com/office/powerpoint/2010/main" val="2581210424"/>
+        <p14:creationId xmlns:p14="http://schemas.microsoft.com/office/powerpoint/2010/main" val="2410272699"/>
       </p:ext>
     </p:extLst>
   </p:cSld>
@@ -10195,7 +11259,7 @@
           <p:cNvPr id="2" name="Title 1">
             <a:extLst>
               <a:ext uri="{FF2B5EF4-FFF2-40B4-BE49-F238E27FC236}">
-                <a16:creationId xmlns:a16="http://schemas.microsoft.com/office/drawing/2014/main" id="{D88B2F82-0D62-FF4F-A850-9372C7C1DC1E}"/>
+                <a16:creationId xmlns:a16="http://schemas.microsoft.com/office/drawing/2014/main" id="{22AE005E-2764-DA4D-8B29-5547B81AB2FA}"/>
               </a:ext>
             </a:extLst>
           </p:cNvPr>
@@ -10213,7 +11277,15 @@
           <a:p>
             <a:r>
               <a:rPr lang="en-US" dirty="0"/>
-              <a:t>Links</a:t>
+              <a:t>Why </a:t>
+            </a:r>
+            <a:r>
+              <a:rPr lang="en-US" dirty="0" err="1"/>
+              <a:t>Kotlin</a:t>
+            </a:r>
+            <a:r>
+              <a:rPr lang="en-US" dirty="0"/>
+              <a:t>?</a:t>
             </a:r>
           </a:p>
         </p:txBody>
@@ -10223,7 +11295,7 @@
           <p:cNvPr id="3" name="Content Placeholder 2">
             <a:extLst>
               <a:ext uri="{FF2B5EF4-FFF2-40B4-BE49-F238E27FC236}">
-                <a16:creationId xmlns:a16="http://schemas.microsoft.com/office/drawing/2014/main" id="{359C6424-1019-BB43-86AA-8BD2FD87BBD8}"/>
+                <a16:creationId xmlns:a16="http://schemas.microsoft.com/office/drawing/2014/main" id="{910A520C-7947-094A-81DA-E71851EC052D}"/>
               </a:ext>
             </a:extLst>
           </p:cNvPr>
@@ -10236,50 +11308,95 @@
         </p:nvSpPr>
         <p:spPr/>
         <p:txBody>
-          <a:bodyPr/>
+          <a:bodyPr>
+            <a:normAutofit/>
+          </a:bodyPr>
           <a:lstStyle/>
           <a:p>
             <a:r>
-              <a:rPr lang="en-US" dirty="0"/>
-              <a:t>This Presentation:</a:t>
-            </a:r>
-            <a:br>
-              <a:rPr lang="en-US" dirty="0"/>
-            </a:br>
-            <a:endParaRPr lang="en-US" dirty="0"/>
-          </a:p>
-          <a:p>
-            <a:r>
-              <a:rPr lang="en-US" dirty="0" err="1"/>
-              <a:t>Github</a:t>
-            </a:r>
-            <a:r>
-              <a:rPr lang="en-US" dirty="0"/>
-              <a:t> repository:</a:t>
-            </a:r>
-            <a:br>
-              <a:rPr lang="en-US" dirty="0"/>
-            </a:br>
-            <a:endParaRPr lang="en-US" dirty="0"/>
-          </a:p>
-          <a:p>
-            <a:r>
-              <a:rPr lang="en-US" dirty="0"/>
-              <a:t>Try Kotlin:</a:t>
-            </a:r>
-            <a:br>
-              <a:rPr lang="en-US" dirty="0"/>
-            </a:br>
-            <a:r>
-              <a:rPr lang="en-US" dirty="0">
+              <a:rPr lang="en-US" sz="2800" dirty="0"/>
+              <a:t>So, how do I learn?</a:t>
+            </a:r>
+          </a:p>
+          <a:p>
+            <a:pPr lvl="1"/>
+            <a:r>
+              <a:rPr lang="en-US" sz="2400" dirty="0"/>
+              <a:t>Documentation</a:t>
+            </a:r>
+          </a:p>
+          <a:p>
+            <a:pPr lvl="2"/>
+            <a:r>
+              <a:rPr lang="en-US" sz="2000" dirty="0">
                 <a:hlinkClick r:id="rId2"/>
               </a:rPr>
-              <a:t>https://try.kotlinlang.org</a:t>
-            </a:r>
-            <a:endParaRPr lang="en-US" dirty="0"/>
-          </a:p>
-          <a:p>
-            <a:endParaRPr lang="en-US" dirty="0"/>
+              <a:t>https://kotlinlang.org/docs/reference/</a:t>
+            </a:r>
+            <a:endParaRPr lang="en-US" sz="2000" dirty="0"/>
+          </a:p>
+          <a:p>
+            <a:pPr lvl="1"/>
+            <a:r>
+              <a:rPr lang="en-US" sz="2400" dirty="0" err="1"/>
+              <a:t>Kotlin</a:t>
+            </a:r>
+            <a:r>
+              <a:rPr lang="en-US" sz="2400" dirty="0"/>
+              <a:t> </a:t>
+            </a:r>
+            <a:r>
+              <a:rPr lang="en-US" sz="2400" dirty="0" err="1"/>
+              <a:t>Koans</a:t>
+            </a:r>
+            <a:endParaRPr lang="en-US" sz="2400" dirty="0"/>
+          </a:p>
+          <a:p>
+            <a:pPr lvl="2"/>
+            <a:r>
+              <a:rPr lang="en-US" sz="2000" dirty="0"/>
+              <a:t>Completely online, no local tools necessary</a:t>
+            </a:r>
+          </a:p>
+          <a:p>
+            <a:pPr lvl="2"/>
+            <a:r>
+              <a:rPr lang="en-US" sz="2000" dirty="0">
+                <a:hlinkClick r:id="rId3"/>
+              </a:rPr>
+              <a:t>https://try.kotlinlang.org/</a:t>
+            </a:r>
+            <a:endParaRPr lang="en-US" sz="2000" dirty="0"/>
+          </a:p>
+          <a:p>
+            <a:pPr lvl="1"/>
+            <a:r>
+              <a:rPr lang="en-US" sz="2000" dirty="0"/>
+              <a:t>Pick a project or challenge and implement it in </a:t>
+            </a:r>
+            <a:r>
+              <a:rPr lang="en-US" sz="2000" dirty="0" err="1"/>
+              <a:t>Kotlin</a:t>
+            </a:r>
+            <a:endParaRPr lang="en-US" sz="2000" dirty="0"/>
+          </a:p>
+          <a:p>
+            <a:pPr lvl="2"/>
+            <a:r>
+              <a:rPr lang="en-US" sz="2000" dirty="0"/>
+              <a:t>Advent of Code - </a:t>
+            </a:r>
+            <a:r>
+              <a:rPr lang="en-US" sz="2000" dirty="0">
+                <a:hlinkClick r:id="rId4"/>
+              </a:rPr>
+              <a:t>http://adventofcode.com</a:t>
+            </a:r>
+            <a:endParaRPr lang="en-US" sz="2000" dirty="0"/>
+          </a:p>
+          <a:p>
+            <a:pPr lvl="2"/>
+            <a:endParaRPr lang="en-US" sz="2000" dirty="0"/>
           </a:p>
         </p:txBody>
       </p:sp>
@@ -10288,7 +11405,7 @@
           <p:cNvPr id="4" name="Subtitle 3">
             <a:extLst>
               <a:ext uri="{FF2B5EF4-FFF2-40B4-BE49-F238E27FC236}">
-                <a16:creationId xmlns:a16="http://schemas.microsoft.com/office/drawing/2014/main" id="{CA3820C2-B40F-8A4D-A37D-62770F40CA48}"/>
+                <a16:creationId xmlns:a16="http://schemas.microsoft.com/office/drawing/2014/main" id="{CB326C52-2385-074C-AD86-6059FA534673}"/>
               </a:ext>
             </a:extLst>
           </p:cNvPr>
@@ -10313,7 +11430,7 @@
           <p:cNvPr id="5" name="Footer Placeholder 4">
             <a:extLst>
               <a:ext uri="{FF2B5EF4-FFF2-40B4-BE49-F238E27FC236}">
-                <a16:creationId xmlns:a16="http://schemas.microsoft.com/office/drawing/2014/main" id="{C304C7D0-1E6B-C046-B901-7FA182C5FBE3}"/>
+                <a16:creationId xmlns:a16="http://schemas.microsoft.com/office/drawing/2014/main" id="{5D37C899-C7E9-CB47-9A81-7259E1E4715A}"/>
               </a:ext>
             </a:extLst>
           </p:cNvPr>
@@ -10331,7 +11448,7 @@
           <a:p>
             <a:r>
               <a:rPr lang="en-US"/>
-              <a:t>AWS Java Lambda Functions with Kotlin</a:t>
+              <a:t>Dogs and Cats, Living Together: Kotlin, Spring Boot and REST on Azure</a:t>
             </a:r>
             <a:endParaRPr lang="en-US" dirty="0"/>
           </a:p>
@@ -10342,7 +11459,7 @@
           <p:cNvPr id="6" name="Slide Number Placeholder 5">
             <a:extLst>
               <a:ext uri="{FF2B5EF4-FFF2-40B4-BE49-F238E27FC236}">
-                <a16:creationId xmlns:a16="http://schemas.microsoft.com/office/drawing/2014/main" id="{089861B6-A1A7-C54F-8115-BA4212716633}"/>
+                <a16:creationId xmlns:a16="http://schemas.microsoft.com/office/drawing/2014/main" id="{DF19A58A-0FC0-4742-9E7C-6F8A0FE0A386}"/>
               </a:ext>
             </a:extLst>
           </p:cNvPr>
@@ -10371,7 +11488,7 @@
     </p:spTree>
     <p:extLst>
       <p:ext uri="{BB962C8B-B14F-4D97-AF65-F5344CB8AC3E}">
-        <p14:creationId xmlns:p14="http://schemas.microsoft.com/office/powerpoint/2010/main" val="2092399202"/>
+        <p14:creationId xmlns:p14="http://schemas.microsoft.com/office/powerpoint/2010/main" val="1807632402"/>
       </p:ext>
     </p:extLst>
   </p:cSld>

</xml_diff>

<commit_message>
Final version of Dogs and Cats for DogFoodCon, AWS Java Lambda Functions with Kotlin theme update and Ohio DevFest version
</commit_message>
<xml_diff>
--- a/AWS Java Lambda Functions with Kotlin.pptx
+++ b/AWS Java Lambda Functions with Kotlin.pptx
@@ -5,26 +5,25 @@
     <p:sldMasterId id="2147483763" r:id="rId1"/>
   </p:sldMasterIdLst>
   <p:notesMasterIdLst>
-    <p:notesMasterId r:id="rId16"/>
+    <p:notesMasterId r:id="rId15"/>
   </p:notesMasterIdLst>
   <p:handoutMasterIdLst>
-    <p:handoutMasterId r:id="rId17"/>
+    <p:handoutMasterId r:id="rId16"/>
   </p:handoutMasterIdLst>
   <p:sldIdLst>
     <p:sldId id="256" r:id="rId2"/>
-    <p:sldId id="274" r:id="rId3"/>
-    <p:sldId id="257" r:id="rId4"/>
-    <p:sldId id="266" r:id="rId5"/>
-    <p:sldId id="258" r:id="rId6"/>
-    <p:sldId id="259" r:id="rId7"/>
-    <p:sldId id="272" r:id="rId8"/>
-    <p:sldId id="261" r:id="rId9"/>
-    <p:sldId id="262" r:id="rId10"/>
-    <p:sldId id="265" r:id="rId11"/>
-    <p:sldId id="273" r:id="rId12"/>
-    <p:sldId id="270" r:id="rId13"/>
-    <p:sldId id="271" r:id="rId14"/>
-    <p:sldId id="269" r:id="rId15"/>
+    <p:sldId id="257" r:id="rId3"/>
+    <p:sldId id="266" r:id="rId4"/>
+    <p:sldId id="258" r:id="rId5"/>
+    <p:sldId id="259" r:id="rId6"/>
+    <p:sldId id="272" r:id="rId7"/>
+    <p:sldId id="261" r:id="rId8"/>
+    <p:sldId id="262" r:id="rId9"/>
+    <p:sldId id="265" r:id="rId10"/>
+    <p:sldId id="273" r:id="rId11"/>
+    <p:sldId id="270" r:id="rId12"/>
+    <p:sldId id="271" r:id="rId13"/>
+    <p:sldId id="269" r:id="rId14"/>
   </p:sldIdLst>
   <p:sldSz cx="12188825" cy="6858000"/>
   <p:notesSz cx="6858000" cy="9144000"/>
@@ -227,7 +226,7 @@
           <a:p>
             <a:fld id="{B398E617-937E-FC4A-8748-C6BABACC53FE}" type="datetimeFigureOut">
               <a:rPr lang="en-US" smtClean="0"/>
-              <a:t>6/18/18</a:t>
+              <a:t>10/1/18</a:t>
             </a:fld>
             <a:endParaRPr lang="en-US"/>
           </a:p>
@@ -392,7 +391,7 @@
           <a:p>
             <a:fld id="{1DC1E76F-63EC-3849-B890-E56FE4AABDB1}" type="datetimeFigureOut">
               <a:rPr lang="en-US" smtClean="0"/>
-              <a:t>6/18/18</a:t>
+              <a:t>10/1/18</a:t>
             </a:fld>
             <a:endParaRPr lang="en-US"/>
           </a:p>
@@ -813,7 +812,7 @@
           <a:p>
             <a:fld id="{172E2218-332F-2046-8919-12C975A973BC}" type="slidenum">
               <a:rPr lang="en-US" smtClean="0"/>
-              <a:t>5</a:t>
+              <a:t>4</a:t>
             </a:fld>
             <a:endParaRPr lang="en-US"/>
           </a:p>
@@ -930,7 +929,7 @@
           <a:p>
             <a:fld id="{172E2218-332F-2046-8919-12C975A973BC}" type="slidenum">
               <a:rPr lang="en-US" smtClean="0"/>
-              <a:t>8</a:t>
+              <a:t>7</a:t>
             </a:fld>
             <a:endParaRPr lang="en-US"/>
           </a:p>
@@ -1014,7 +1013,7 @@
           <a:p>
             <a:fld id="{172E2218-332F-2046-8919-12C975A973BC}" type="slidenum">
               <a:rPr lang="en-US" smtClean="0"/>
-              <a:t>10</a:t>
+              <a:t>9</a:t>
             </a:fld>
             <a:endParaRPr lang="en-US"/>
           </a:p>
@@ -1557,7 +1556,7 @@
           <a:p>
             <a:fld id="{96EC5AF0-5E41-B042-958C-1721F105CD05}" type="datetime1">
               <a:rPr lang="en-US" smtClean="0"/>
-              <a:t>6/18/18</a:t>
+              <a:t>10/1/18</a:t>
             </a:fld>
             <a:endParaRPr lang="en-US"/>
           </a:p>
@@ -1782,7 +1781,7 @@
           <a:p>
             <a:fld id="{66FD81AA-1FF7-F44E-9A25-A2825881B37B}" type="datetime1">
               <a:rPr lang="en-US" smtClean="0"/>
-              <a:t>6/18/18</a:t>
+              <a:t>10/1/18</a:t>
             </a:fld>
             <a:endParaRPr lang="en-US"/>
           </a:p>
@@ -2163,7 +2162,7 @@
           <a:p>
             <a:fld id="{34A713AB-6C81-BB44-8D40-AE3E8FBDBEA8}" type="datetime1">
               <a:rPr lang="en-US" smtClean="0"/>
-              <a:t>6/18/18</a:t>
+              <a:t>10/1/18</a:t>
             </a:fld>
             <a:endParaRPr lang="en-US"/>
           </a:p>
@@ -3129,7 +3128,7 @@
           <a:p>
             <a:fld id="{2ADECAF2-4F7E-9045-BC0E-90443DC223CE}" type="datetime1">
               <a:rPr lang="en-US" smtClean="0"/>
-              <a:t>6/18/18</a:t>
+              <a:t>10/1/18</a:t>
             </a:fld>
             <a:endParaRPr lang="en-US"/>
           </a:p>
@@ -3788,7 +3787,7 @@
           <a:p>
             <a:fld id="{583EE6F9-CE5C-E349-B049-03D39CC2B63C}" type="datetime1">
               <a:rPr lang="en-US" smtClean="0"/>
-              <a:t>6/18/18</a:t>
+              <a:t>10/1/18</a:t>
             </a:fld>
             <a:endParaRPr lang="en-US"/>
           </a:p>
@@ -4099,7 +4098,7 @@
           <a:p>
             <a:fld id="{55C7F7AE-3571-4242-BA7B-AD04F7748B8F}" type="datetime1">
               <a:rPr lang="en-US" smtClean="0"/>
-              <a:t>6/18/18</a:t>
+              <a:t>10/1/18</a:t>
             </a:fld>
             <a:endParaRPr lang="en-US"/>
           </a:p>
@@ -4356,7 +4355,7 @@
           <a:p>
             <a:fld id="{CC66FFE1-3721-EF4B-889E-E42A6B33304C}" type="datetime1">
               <a:rPr lang="en-US" smtClean="0"/>
-              <a:t>6/18/18</a:t>
+              <a:t>10/1/18</a:t>
             </a:fld>
             <a:endParaRPr lang="en-US" dirty="0"/>
           </a:p>
@@ -7474,7 +7473,7 @@
           <a:p>
             <a:fld id="{F08AB2A5-1A35-3740-B238-3D8D1F515C37}" type="datetime1">
               <a:rPr lang="en-US" smtClean="0"/>
-              <a:t>6/18/18</a:t>
+              <a:t>10/1/18</a:t>
             </a:fld>
             <a:endParaRPr lang="en-US"/>
           </a:p>
@@ -7756,7 +7755,7 @@
           <a:p>
             <a:fld id="{CEE3B40B-DE00-824C-8C47-6379AD442C2A}" type="datetime1">
               <a:rPr lang="en-US" smtClean="0"/>
-              <a:t>6/18/18</a:t>
+              <a:t>10/1/18</a:t>
             </a:fld>
             <a:endParaRPr lang="en-US"/>
           </a:p>
@@ -8254,8 +8253,13 @@
           <a:p>
             <a:r>
               <a:rPr lang="en-US" sz="1800" dirty="0"/>
-              <a:t>Technical Director, Improving Columbus</a:t>
-            </a:r>
+              <a:t>Senior Software Engineer, </a:t>
+            </a:r>
+            <a:r>
+              <a:rPr lang="en-US" sz="1800"/>
+              <a:t>Root Insurance</a:t>
+            </a:r>
+            <a:endParaRPr lang="en-US" sz="1800" dirty="0"/>
           </a:p>
         </p:txBody>
       </p:sp>
@@ -8321,7 +8325,7 @@
           <p:cNvPr id="2" name="Title 1">
             <a:extLst>
               <a:ext uri="{FF2B5EF4-FFF2-40B4-BE49-F238E27FC236}">
-                <a16:creationId xmlns:a16="http://schemas.microsoft.com/office/drawing/2014/main" id="{6076743A-6C42-8644-AA7A-4FE77DBCC4B9}"/>
+                <a16:creationId xmlns:a16="http://schemas.microsoft.com/office/drawing/2014/main" id="{FF9FE4B9-8E19-3043-BE27-4533F815A882}"/>
               </a:ext>
             </a:extLst>
           </p:cNvPr>
@@ -8334,9 +8338,7 @@
         </p:nvSpPr>
         <p:spPr/>
         <p:txBody>
-          <a:bodyPr>
-            <a:noAutofit/>
-          </a:bodyPr>
+          <a:bodyPr/>
           <a:lstStyle/>
           <a:p>
             <a:r>
@@ -8351,7 +8353,7 @@
           <p:cNvPr id="3" name="Content Placeholder 2">
             <a:extLst>
               <a:ext uri="{FF2B5EF4-FFF2-40B4-BE49-F238E27FC236}">
-                <a16:creationId xmlns:a16="http://schemas.microsoft.com/office/drawing/2014/main" id="{DE306633-5D07-9B44-AD8F-EED4A2BC5A65}"/>
+                <a16:creationId xmlns:a16="http://schemas.microsoft.com/office/drawing/2014/main" id="{11EA52BF-883C-E14F-8DFA-B2B8A1185567}"/>
               </a:ext>
             </a:extLst>
           </p:cNvPr>
@@ -8364,162 +8366,67 @@
         </p:nvSpPr>
         <p:spPr/>
         <p:txBody>
-          <a:bodyPr>
-            <a:normAutofit lnSpcReduction="10000"/>
-          </a:bodyPr>
+          <a:bodyPr/>
           <a:lstStyle/>
           <a:p>
-            <a:pPr marL="51435" indent="0">
-              <a:buNone/>
+            <a:pPr marL="394335" indent="-342900">
+              <a:buFont typeface="+mj-lt"/>
+              <a:buAutoNum type="arabicPeriod"/>
             </a:pPr>
             <a:r>
-              <a:rPr lang="en-US" sz="2000" dirty="0"/>
-              <a:t>First, some prerequisites, recommendations and tips</a:t>
-            </a:r>
-          </a:p>
-          <a:p>
-            <a:r>
-              <a:rPr lang="en-US" sz="2000" dirty="0"/>
-              <a:t>Install </a:t>
-            </a:r>
-            <a:r>
-              <a:rPr lang="en-US" sz="2000" b="1" dirty="0"/>
-              <a:t>AWS CLI</a:t>
-            </a:r>
-          </a:p>
-          <a:p>
-            <a:pPr lvl="1"/>
-            <a:r>
-              <a:rPr lang="en-US" sz="1850" dirty="0">
-                <a:hlinkClick r:id="rId3"/>
-              </a:rPr>
-              <a:t>https://aws.amazon.com/cli/</a:t>
-            </a:r>
-            <a:endParaRPr lang="en-US" sz="1850" dirty="0"/>
-          </a:p>
-          <a:p>
-            <a:pPr lvl="2"/>
-            <a:r>
-              <a:rPr lang="en-US" sz="1700" dirty="0"/>
-              <a:t>Windows version uses Windows installer</a:t>
-            </a:r>
-          </a:p>
-          <a:p>
-            <a:pPr lvl="2"/>
-            <a:r>
-              <a:rPr lang="en-US" sz="1700" dirty="0"/>
-              <a:t>Mac OS version requires Python and pip (use pip3 if using Python 3)</a:t>
-            </a:r>
-          </a:p>
-          <a:p>
-            <a:r>
-              <a:rPr lang="en-US" sz="2000" dirty="0"/>
-              <a:t>Use </a:t>
-            </a:r>
-            <a:r>
-              <a:rPr lang="en-US" sz="2000" b="1" dirty="0"/>
-              <a:t>Postman</a:t>
-            </a:r>
-            <a:r>
-              <a:rPr lang="en-US" sz="2000" dirty="0"/>
-              <a:t> for REST API testing</a:t>
-            </a:r>
-          </a:p>
-          <a:p>
-            <a:pPr lvl="1"/>
-            <a:r>
-              <a:rPr lang="en-US" sz="1850" dirty="0">
-                <a:hlinkClick r:id="rId4"/>
-              </a:rPr>
-              <a:t>https://www.getpostman.com/apps</a:t>
-            </a:r>
-            <a:endParaRPr lang="en-US" sz="1850" dirty="0"/>
-          </a:p>
-          <a:p>
-            <a:r>
-              <a:rPr lang="en-US" sz="2000" dirty="0"/>
-              <a:t>Use </a:t>
-            </a:r>
-            <a:r>
-              <a:rPr lang="en-US" sz="2000" b="1" dirty="0" err="1"/>
-              <a:t>sdkman</a:t>
-            </a:r>
-            <a:r>
-              <a:rPr lang="en-US" sz="2000" dirty="0"/>
-              <a:t> to manage and use multiple </a:t>
-            </a:r>
-            <a:r>
-              <a:rPr lang="en-US" sz="2000" dirty="0" err="1"/>
-              <a:t>gradle</a:t>
-            </a:r>
-            <a:r>
-              <a:rPr lang="en-US" sz="2000" dirty="0"/>
-              <a:t> / </a:t>
-            </a:r>
-            <a:r>
-              <a:rPr lang="en-US" sz="2000" dirty="0" err="1"/>
-              <a:t>kotlin</a:t>
-            </a:r>
-            <a:r>
-              <a:rPr lang="en-US" sz="2000" dirty="0"/>
-              <a:t> / maven versions</a:t>
-            </a:r>
-          </a:p>
-          <a:p>
-            <a:pPr lvl="1"/>
-            <a:r>
-              <a:rPr lang="en-US" sz="1800" dirty="0">
-                <a:hlinkClick r:id="rId5"/>
-              </a:rPr>
-              <a:t>http://sdkman.io</a:t>
-            </a:r>
-            <a:endParaRPr lang="en-US" sz="1800" dirty="0"/>
-          </a:p>
-          <a:p>
-            <a:r>
-              <a:rPr lang="en-US" sz="2000" dirty="0"/>
-              <a:t>Use </a:t>
-            </a:r>
-            <a:r>
-              <a:rPr lang="en-US" sz="2000" dirty="0" err="1"/>
-              <a:t>gradle</a:t>
-            </a:r>
-            <a:r>
-              <a:rPr lang="en-US" sz="2000" dirty="0"/>
-              <a:t> wrapper inside Gradle based projects (demo soon)</a:t>
-            </a:r>
-          </a:p>
-          <a:p>
-            <a:r>
-              <a:rPr lang="en-US" sz="2000" dirty="0"/>
-              <a:t>Install a clipboard manager</a:t>
-            </a:r>
-          </a:p>
-          <a:p>
-            <a:pPr lvl="1"/>
-            <a:r>
-              <a:rPr lang="en-US" sz="1800" dirty="0"/>
-              <a:t>I like </a:t>
-            </a:r>
-            <a:r>
-              <a:rPr lang="en-US" sz="1800" b="1" dirty="0" err="1"/>
-              <a:t>Copy’em</a:t>
-            </a:r>
-            <a:r>
-              <a:rPr lang="en-US" sz="1800" b="1" dirty="0"/>
-              <a:t> Paste </a:t>
-            </a:r>
-            <a:r>
-              <a:rPr lang="en-US" sz="1800" dirty="0"/>
-              <a:t>- </a:t>
-            </a:r>
-            <a:r>
-              <a:rPr lang="en-US" sz="1800" dirty="0">
-                <a:hlinkClick r:id="rId6"/>
-              </a:rPr>
-              <a:t>https://goo.gl/MwSrkA</a:t>
-            </a:r>
-            <a:endParaRPr lang="en-US" sz="1800" dirty="0"/>
+              <a:rPr lang="en-US" dirty="0"/>
+              <a:t>Implement the function using the predefined AWS Lambda core interface</a:t>
+            </a:r>
+          </a:p>
+          <a:p>
+            <a:pPr marL="394335" indent="-342900">
+              <a:buFont typeface="+mj-lt"/>
+              <a:buAutoNum type="arabicPeriod"/>
+            </a:pPr>
+            <a:r>
+              <a:rPr lang="en-US" dirty="0"/>
+              <a:t>Build the deployment package</a:t>
+            </a:r>
+          </a:p>
+          <a:p>
+            <a:pPr marL="394335" indent="-342900">
+              <a:buFont typeface="+mj-lt"/>
+              <a:buAutoNum type="arabicPeriod"/>
+            </a:pPr>
+            <a:r>
+              <a:rPr lang="en-US" dirty="0"/>
+              <a:t>Create a new AWS lambda function</a:t>
+            </a:r>
+          </a:p>
+          <a:p>
+            <a:pPr marL="394335" indent="-342900">
+              <a:buFont typeface="+mj-lt"/>
+              <a:buAutoNum type="arabicPeriod"/>
+            </a:pPr>
+            <a:r>
+              <a:rPr lang="en-US" dirty="0"/>
+              <a:t>Upload the deployment package to AWS</a:t>
+            </a:r>
+          </a:p>
+          <a:p>
+            <a:pPr marL="394335" indent="-342900">
+              <a:buFont typeface="+mj-lt"/>
+              <a:buAutoNum type="arabicPeriod"/>
+            </a:pPr>
+            <a:r>
+              <a:rPr lang="en-US" dirty="0"/>
+              <a:t>Test the function</a:t>
+            </a:r>
+          </a:p>
+          <a:p>
+            <a:pPr marL="394335" indent="-342900">
+              <a:buFont typeface="+mj-lt"/>
+              <a:buAutoNum type="arabicPeriod"/>
+            </a:pPr>
+            <a:r>
+              <a:rPr lang="en-US" dirty="0"/>
+              <a:t>BONUS: Configure and execute REST API wrapper for the lambda function</a:t>
+            </a:r>
           </a:p>
         </p:txBody>
       </p:sp>
@@ -8528,7 +8435,7 @@
           <p:cNvPr id="4" name="Subtitle 3">
             <a:extLst>
               <a:ext uri="{FF2B5EF4-FFF2-40B4-BE49-F238E27FC236}">
-                <a16:creationId xmlns:a16="http://schemas.microsoft.com/office/drawing/2014/main" id="{3A7FC29D-DE93-D640-8034-41978FD492C6}"/>
+                <a16:creationId xmlns:a16="http://schemas.microsoft.com/office/drawing/2014/main" id="{CF7ABB60-3B3D-944C-A328-DF8FC18E8B8D}"/>
               </a:ext>
             </a:extLst>
           </p:cNvPr>
@@ -8541,12 +8448,10 @@
         </p:nvSpPr>
         <p:spPr/>
         <p:txBody>
-          <a:bodyPr>
-            <a:normAutofit/>
-          </a:bodyPr>
+          <a:bodyPr/>
           <a:lstStyle/>
           <a:p>
-            <a:endParaRPr lang="en-US" sz="2000"/>
+            <a:endParaRPr lang="en-US"/>
           </a:p>
         </p:txBody>
       </p:sp>
@@ -8555,7 +8460,7 @@
           <p:cNvPr id="5" name="Footer Placeholder 4">
             <a:extLst>
               <a:ext uri="{FF2B5EF4-FFF2-40B4-BE49-F238E27FC236}">
-                <a16:creationId xmlns:a16="http://schemas.microsoft.com/office/drawing/2014/main" id="{1CDD5634-CB80-2D45-A34C-24C66E6127AA}"/>
+                <a16:creationId xmlns:a16="http://schemas.microsoft.com/office/drawing/2014/main" id="{4E32E5F1-A975-4A42-9225-C5970192F70A}"/>
               </a:ext>
             </a:extLst>
           </p:cNvPr>
@@ -8572,10 +8477,10 @@
           <a:lstStyle/>
           <a:p>
             <a:r>
-              <a:rPr lang="en-US" sz="1600"/>
+              <a:rPr lang="en-US"/>
               <a:t>AWS Java Lambda Functions with Kotlin</a:t>
             </a:r>
-            <a:endParaRPr lang="en-US" sz="1600" dirty="0"/>
+            <a:endParaRPr lang="en-US" dirty="0"/>
           </a:p>
         </p:txBody>
       </p:sp>
@@ -8584,7 +8489,7 @@
           <p:cNvPr id="6" name="Slide Number Placeholder 5">
             <a:extLst>
               <a:ext uri="{FF2B5EF4-FFF2-40B4-BE49-F238E27FC236}">
-                <a16:creationId xmlns:a16="http://schemas.microsoft.com/office/drawing/2014/main" id="{865CA060-3F57-694F-9B42-08335B8611F0}"/>
+                <a16:creationId xmlns:a16="http://schemas.microsoft.com/office/drawing/2014/main" id="{F53941A6-D874-8146-BF12-DA0AC419BDD9}"/>
               </a:ext>
             </a:extLst>
           </p:cNvPr>
@@ -8602,18 +8507,18 @@
           <a:p>
             <a:pPr algn="l"/>
             <a:fld id="{ABCABC6B-F667-1540-8370-D056DC2C0FCE}" type="slidenum">
-              <a:rPr lang="en-US" sz="1600" smtClean="0"/>
+              <a:rPr lang="en-US" smtClean="0"/>
               <a:pPr algn="l"/>
               <a:t>10</a:t>
             </a:fld>
-            <a:endParaRPr lang="en-US" sz="1600" dirty="0"/>
+            <a:endParaRPr lang="en-US" dirty="0"/>
           </a:p>
         </p:txBody>
       </p:sp>
     </p:spTree>
     <p:extLst>
       <p:ext uri="{BB962C8B-B14F-4D97-AF65-F5344CB8AC3E}">
-        <p14:creationId xmlns:p14="http://schemas.microsoft.com/office/powerpoint/2010/main" val="102645228"/>
+        <p14:creationId xmlns:p14="http://schemas.microsoft.com/office/powerpoint/2010/main" val="1539077060"/>
       </p:ext>
     </p:extLst>
   </p:cSld>
@@ -8645,7 +8550,7 @@
           <p:cNvPr id="2" name="Title 1">
             <a:extLst>
               <a:ext uri="{FF2B5EF4-FFF2-40B4-BE49-F238E27FC236}">
-                <a16:creationId xmlns:a16="http://schemas.microsoft.com/office/drawing/2014/main" id="{FF9FE4B9-8E19-3043-BE27-4533F815A882}"/>
+                <a16:creationId xmlns:a16="http://schemas.microsoft.com/office/drawing/2014/main" id="{1B47D5F0-355A-C845-A929-8F23CA86AE46}"/>
               </a:ext>
             </a:extLst>
           </p:cNvPr>
@@ -8673,7 +8578,7 @@
           <p:cNvPr id="3" name="Content Placeholder 2">
             <a:extLst>
               <a:ext uri="{FF2B5EF4-FFF2-40B4-BE49-F238E27FC236}">
-                <a16:creationId xmlns:a16="http://schemas.microsoft.com/office/drawing/2014/main" id="{11EA52BF-883C-E14F-8DFA-B2B8A1185567}"/>
+                <a16:creationId xmlns:a16="http://schemas.microsoft.com/office/drawing/2014/main" id="{13E467B1-D15E-A444-907D-026A04681533}"/>
               </a:ext>
             </a:extLst>
           </p:cNvPr>
@@ -8686,66 +8591,14 @@
         </p:nvSpPr>
         <p:spPr/>
         <p:txBody>
-          <a:bodyPr/>
+          <a:bodyPr>
+            <a:normAutofit/>
+          </a:bodyPr>
           <a:lstStyle/>
           <a:p>
-            <a:pPr marL="394335" indent="-342900">
-              <a:buFont typeface="+mj-lt"/>
-              <a:buAutoNum type="arabicPeriod"/>
-            </a:pPr>
-            <a:r>
-              <a:rPr lang="en-US" dirty="0"/>
-              <a:t>Implement the function using the predefined AWS Lambda core interface</a:t>
-            </a:r>
-          </a:p>
-          <a:p>
-            <a:pPr marL="394335" indent="-342900">
-              <a:buFont typeface="+mj-lt"/>
-              <a:buAutoNum type="arabicPeriod"/>
-            </a:pPr>
-            <a:r>
-              <a:rPr lang="en-US" dirty="0"/>
-              <a:t>Build the deployment package</a:t>
-            </a:r>
-          </a:p>
-          <a:p>
-            <a:pPr marL="394335" indent="-342900">
-              <a:buFont typeface="+mj-lt"/>
-              <a:buAutoNum type="arabicPeriod"/>
-            </a:pPr>
-            <a:r>
-              <a:rPr lang="en-US" dirty="0"/>
-              <a:t>Create a new AWS lambda function</a:t>
-            </a:r>
-          </a:p>
-          <a:p>
-            <a:pPr marL="394335" indent="-342900">
-              <a:buFont typeface="+mj-lt"/>
-              <a:buAutoNum type="arabicPeriod"/>
-            </a:pPr>
-            <a:r>
-              <a:rPr lang="en-US" dirty="0"/>
-              <a:t>Upload the deployment package to AWS</a:t>
-            </a:r>
-          </a:p>
-          <a:p>
-            <a:pPr marL="394335" indent="-342900">
-              <a:buFont typeface="+mj-lt"/>
-              <a:buAutoNum type="arabicPeriod"/>
-            </a:pPr>
-            <a:r>
-              <a:rPr lang="en-US" dirty="0"/>
-              <a:t>Test the function</a:t>
-            </a:r>
-          </a:p>
-          <a:p>
-            <a:pPr marL="394335" indent="-342900">
-              <a:buFont typeface="+mj-lt"/>
-              <a:buAutoNum type="arabicPeriod"/>
-            </a:pPr>
-            <a:r>
-              <a:rPr lang="en-US" dirty="0"/>
-              <a:t>BONUS: Configure and execute REST API wrapper for the lambda function</a:t>
+            <a:r>
+              <a:rPr lang="en-US" sz="3200" dirty="0"/>
+              <a:t>Let’s do this! (demo / code walkthrough)</a:t>
             </a:r>
           </a:p>
         </p:txBody>
@@ -8755,7 +8608,7 @@
           <p:cNvPr id="4" name="Subtitle 3">
             <a:extLst>
               <a:ext uri="{FF2B5EF4-FFF2-40B4-BE49-F238E27FC236}">
-                <a16:creationId xmlns:a16="http://schemas.microsoft.com/office/drawing/2014/main" id="{CF7ABB60-3B3D-944C-A328-DF8FC18E8B8D}"/>
+                <a16:creationId xmlns:a16="http://schemas.microsoft.com/office/drawing/2014/main" id="{3CC62F3A-88F1-D643-B02B-D37CFE56569F}"/>
               </a:ext>
             </a:extLst>
           </p:cNvPr>
@@ -8780,7 +8633,7 @@
           <p:cNvPr id="5" name="Footer Placeholder 4">
             <a:extLst>
               <a:ext uri="{FF2B5EF4-FFF2-40B4-BE49-F238E27FC236}">
-                <a16:creationId xmlns:a16="http://schemas.microsoft.com/office/drawing/2014/main" id="{4E32E5F1-A975-4A42-9225-C5970192F70A}"/>
+                <a16:creationId xmlns:a16="http://schemas.microsoft.com/office/drawing/2014/main" id="{8F1AAF1F-311D-7543-9D16-E7D194E26896}"/>
               </a:ext>
             </a:extLst>
           </p:cNvPr>
@@ -8809,7 +8662,7 @@
           <p:cNvPr id="6" name="Slide Number Placeholder 5">
             <a:extLst>
               <a:ext uri="{FF2B5EF4-FFF2-40B4-BE49-F238E27FC236}">
-                <a16:creationId xmlns:a16="http://schemas.microsoft.com/office/drawing/2014/main" id="{F53941A6-D874-8146-BF12-DA0AC419BDD9}"/>
+                <a16:creationId xmlns:a16="http://schemas.microsoft.com/office/drawing/2014/main" id="{B21D4419-596C-4243-A369-0800DBC911F5}"/>
               </a:ext>
             </a:extLst>
           </p:cNvPr>
@@ -8838,7 +8691,7 @@
     </p:spTree>
     <p:extLst>
       <p:ext uri="{BB962C8B-B14F-4D97-AF65-F5344CB8AC3E}">
-        <p14:creationId xmlns:p14="http://schemas.microsoft.com/office/powerpoint/2010/main" val="1539077060"/>
+        <p14:creationId xmlns:p14="http://schemas.microsoft.com/office/powerpoint/2010/main" val="2581210424"/>
       </p:ext>
     </p:extLst>
   </p:cSld>
@@ -8870,7 +8723,7 @@
           <p:cNvPr id="2" name="Title 1">
             <a:extLst>
               <a:ext uri="{FF2B5EF4-FFF2-40B4-BE49-F238E27FC236}">
-                <a16:creationId xmlns:a16="http://schemas.microsoft.com/office/drawing/2014/main" id="{1B47D5F0-355A-C845-A929-8F23CA86AE46}"/>
+                <a16:creationId xmlns:a16="http://schemas.microsoft.com/office/drawing/2014/main" id="{D88B2F82-0D62-FF4F-A850-9372C7C1DC1E}"/>
               </a:ext>
             </a:extLst>
           </p:cNvPr>
@@ -8888,7 +8741,7 @@
           <a:p>
             <a:r>
               <a:rPr lang="en-US" dirty="0"/>
-              <a:t>So, how do we do this?</a:t>
+              <a:t>Links</a:t>
             </a:r>
           </a:p>
         </p:txBody>
@@ -8898,7 +8751,7 @@
           <p:cNvPr id="3" name="Content Placeholder 2">
             <a:extLst>
               <a:ext uri="{FF2B5EF4-FFF2-40B4-BE49-F238E27FC236}">
-                <a16:creationId xmlns:a16="http://schemas.microsoft.com/office/drawing/2014/main" id="{13E467B1-D15E-A444-907D-026A04681533}"/>
+                <a16:creationId xmlns:a16="http://schemas.microsoft.com/office/drawing/2014/main" id="{359C6424-1019-BB43-86AA-8BD2FD87BBD8}"/>
               </a:ext>
             </a:extLst>
           </p:cNvPr>
@@ -8909,7 +8762,12 @@
             <p:ph idx="1"/>
           </p:nvPr>
         </p:nvSpPr>
-        <p:spPr/>
+        <p:spPr>
+          <a:xfrm>
+            <a:off x="289325" y="1460501"/>
+            <a:ext cx="11631346" cy="4486429"/>
+          </a:xfrm>
+        </p:spPr>
         <p:txBody>
           <a:bodyPr>
             <a:normAutofit/>
@@ -8917,9 +8775,167 @@
           <a:lstStyle/>
           <a:p>
             <a:r>
-              <a:rPr lang="en-US" sz="3200" dirty="0"/>
-              <a:t>Let’s do this! (demo / code walkthrough)</a:t>
-            </a:r>
+              <a:rPr lang="en-US" sz="1600" dirty="0"/>
+              <a:t>This Presentation:</a:t>
+            </a:r>
+            <a:br>
+              <a:rPr lang="en-US" sz="1600" dirty="0"/>
+            </a:br>
+            <a:r>
+              <a:rPr lang="en-US" sz="1600" dirty="0">
+                <a:hlinkClick r:id="rId2"/>
+              </a:rPr>
+              <a:t>https://goo.gl/EHfTEC</a:t>
+            </a:r>
+            <a:endParaRPr lang="en-US" sz="1600" dirty="0"/>
+          </a:p>
+          <a:p>
+            <a:r>
+              <a:rPr lang="en-US" sz="1600" dirty="0" err="1"/>
+              <a:t>Github</a:t>
+            </a:r>
+            <a:r>
+              <a:rPr lang="en-US" sz="1600" dirty="0"/>
+              <a:t> repositories:</a:t>
+            </a:r>
+          </a:p>
+          <a:p>
+            <a:pPr lvl="1"/>
+            <a:r>
+              <a:rPr lang="en-US" sz="1450" dirty="0"/>
+              <a:t>Lambda Function: </a:t>
+            </a:r>
+            <a:r>
+              <a:rPr lang="en-US" sz="1450" dirty="0">
+                <a:hlinkClick r:id="rId3"/>
+              </a:rPr>
+              <a:t>https://github.com/jkwuc89/kotlinawslambda</a:t>
+            </a:r>
+            <a:endParaRPr lang="en-US" sz="1450" dirty="0"/>
+          </a:p>
+          <a:p>
+            <a:pPr lvl="1"/>
+            <a:r>
+              <a:rPr lang="en-US" sz="1450" dirty="0" err="1"/>
+              <a:t>TaskTracker</a:t>
+            </a:r>
+            <a:r>
+              <a:rPr lang="en-US" sz="1450" dirty="0"/>
+              <a:t>: </a:t>
+            </a:r>
+            <a:r>
+              <a:rPr lang="en-US" sz="1450" dirty="0">
+                <a:hlinkClick r:id="rId4"/>
+              </a:rPr>
+              <a:t>https://github.com/jkwuc89/tasktracker</a:t>
+            </a:r>
+            <a:endParaRPr lang="en-US" sz="1450" dirty="0"/>
+          </a:p>
+          <a:p>
+            <a:r>
+              <a:rPr lang="en-US" sz="1600" dirty="0"/>
+              <a:t>Try Kotlin:</a:t>
+            </a:r>
+            <a:br>
+              <a:rPr lang="en-US" sz="1600" dirty="0"/>
+            </a:br>
+            <a:r>
+              <a:rPr lang="en-US" sz="1600" dirty="0">
+                <a:hlinkClick r:id="rId5"/>
+              </a:rPr>
+              <a:t>https://try.kotlinlang.org</a:t>
+            </a:r>
+            <a:endParaRPr lang="en-US" sz="1600" dirty="0"/>
+          </a:p>
+          <a:p>
+            <a:r>
+              <a:rPr lang="en-US" sz="1600" dirty="0"/>
+              <a:t>Gradle:</a:t>
+            </a:r>
+            <a:br>
+              <a:rPr lang="en-US" sz="1600" dirty="0"/>
+            </a:br>
+            <a:r>
+              <a:rPr lang="en-US" sz="1600" dirty="0">
+                <a:hlinkClick r:id="rId6"/>
+              </a:rPr>
+              <a:t>https://gradle.org</a:t>
+            </a:r>
+            <a:endParaRPr lang="en-US" sz="1600" dirty="0"/>
+          </a:p>
+          <a:p>
+            <a:r>
+              <a:rPr lang="en-US" sz="1600" dirty="0"/>
+              <a:t>Maven:</a:t>
+            </a:r>
+            <a:br>
+              <a:rPr lang="en-US" sz="1600" dirty="0"/>
+            </a:br>
+            <a:r>
+              <a:rPr lang="en-US" sz="1600" dirty="0">
+                <a:hlinkClick r:id="rId7"/>
+              </a:rPr>
+              <a:t>https://maven.apache.org</a:t>
+            </a:r>
+            <a:endParaRPr lang="en-US" sz="1600" dirty="0"/>
+          </a:p>
+          <a:p>
+            <a:r>
+              <a:rPr lang="en-US" sz="1600" dirty="0"/>
+              <a:t>AWS Lambda Function Documentation</a:t>
+            </a:r>
+            <a:br>
+              <a:rPr lang="en-US" sz="1600" dirty="0"/>
+            </a:br>
+            <a:r>
+              <a:rPr lang="en-US" sz="1600" dirty="0">
+                <a:hlinkClick r:id="rId8"/>
+              </a:rPr>
+              <a:t>https://aws.amazon.com/lambda/</a:t>
+            </a:r>
+            <a:br>
+              <a:rPr lang="en-US" sz="1600" dirty="0"/>
+            </a:br>
+            <a:r>
+              <a:rPr lang="en-US" sz="1600" dirty="0">
+                <a:hlinkClick r:id="rId9"/>
+              </a:rPr>
+              <a:t>https://docs.aws.amazon.com/lambda/latest/dg/java-programming-model.html</a:t>
+            </a:r>
+            <a:br>
+              <a:rPr lang="en-US" sz="1600" dirty="0"/>
+            </a:br>
+            <a:r>
+              <a:rPr lang="en-US" sz="1600" dirty="0">
+                <a:hlinkClick r:id="rId10"/>
+              </a:rPr>
+              <a:t>https://docs.aws.amazon.com/lambda/latest/dg/java-handler-using-predefined-interfaces.html</a:t>
+            </a:r>
+            <a:br>
+              <a:rPr lang="en-US" sz="1600" dirty="0"/>
+            </a:br>
+            <a:r>
+              <a:rPr lang="en-US" sz="1600" dirty="0">
+                <a:hlinkClick r:id="rId11"/>
+              </a:rPr>
+              <a:t>https://docs.aws.amazon.com/lambda/latest/dg/lambda-java-how-to-create-deployment-package.html</a:t>
+            </a:r>
+            <a:endParaRPr lang="en-US" sz="1600" dirty="0"/>
+          </a:p>
+          <a:p>
+            <a:endParaRPr lang="en-US" sz="1600" dirty="0"/>
+          </a:p>
+          <a:p>
+            <a:pPr marL="51435" indent="0">
+              <a:buNone/>
+            </a:pPr>
+            <a:endParaRPr lang="en-US" sz="1600" dirty="0"/>
+          </a:p>
+          <a:p>
+            <a:endParaRPr lang="en-US" sz="1600" dirty="0"/>
+          </a:p>
+          <a:p>
+            <a:endParaRPr lang="en-US" sz="1600" dirty="0"/>
           </a:p>
         </p:txBody>
       </p:sp>
@@ -8928,7 +8944,7 @@
           <p:cNvPr id="4" name="Subtitle 3">
             <a:extLst>
               <a:ext uri="{FF2B5EF4-FFF2-40B4-BE49-F238E27FC236}">
-                <a16:creationId xmlns:a16="http://schemas.microsoft.com/office/drawing/2014/main" id="{3CC62F3A-88F1-D643-B02B-D37CFE56569F}"/>
+                <a16:creationId xmlns:a16="http://schemas.microsoft.com/office/drawing/2014/main" id="{CA3820C2-B40F-8A4D-A37D-62770F40CA48}"/>
               </a:ext>
             </a:extLst>
           </p:cNvPr>
@@ -8953,7 +8969,7 @@
           <p:cNvPr id="5" name="Footer Placeholder 4">
             <a:extLst>
               <a:ext uri="{FF2B5EF4-FFF2-40B4-BE49-F238E27FC236}">
-                <a16:creationId xmlns:a16="http://schemas.microsoft.com/office/drawing/2014/main" id="{8F1AAF1F-311D-7543-9D16-E7D194E26896}"/>
+                <a16:creationId xmlns:a16="http://schemas.microsoft.com/office/drawing/2014/main" id="{C304C7D0-1E6B-C046-B901-7FA182C5FBE3}"/>
               </a:ext>
             </a:extLst>
           </p:cNvPr>
@@ -8982,7 +8998,7 @@
           <p:cNvPr id="6" name="Slide Number Placeholder 5">
             <a:extLst>
               <a:ext uri="{FF2B5EF4-FFF2-40B4-BE49-F238E27FC236}">
-                <a16:creationId xmlns:a16="http://schemas.microsoft.com/office/drawing/2014/main" id="{B21D4419-596C-4243-A369-0800DBC911F5}"/>
+                <a16:creationId xmlns:a16="http://schemas.microsoft.com/office/drawing/2014/main" id="{089861B6-A1A7-C54F-8115-BA4212716633}"/>
               </a:ext>
             </a:extLst>
           </p:cNvPr>
@@ -9011,7 +9027,7 @@
     </p:spTree>
     <p:extLst>
       <p:ext uri="{BB962C8B-B14F-4D97-AF65-F5344CB8AC3E}">
-        <p14:creationId xmlns:p14="http://schemas.microsoft.com/office/powerpoint/2010/main" val="2581210424"/>
+        <p14:creationId xmlns:p14="http://schemas.microsoft.com/office/powerpoint/2010/main" val="2092399202"/>
       </p:ext>
     </p:extLst>
   </p:cSld>
@@ -9043,339 +9059,6 @@
           <p:cNvPr id="2" name="Title 1">
             <a:extLst>
               <a:ext uri="{FF2B5EF4-FFF2-40B4-BE49-F238E27FC236}">
-                <a16:creationId xmlns:a16="http://schemas.microsoft.com/office/drawing/2014/main" id="{D88B2F82-0D62-FF4F-A850-9372C7C1DC1E}"/>
-              </a:ext>
-            </a:extLst>
-          </p:cNvPr>
-          <p:cNvSpPr>
-            <a:spLocks noGrp="1"/>
-          </p:cNvSpPr>
-          <p:nvPr>
-            <p:ph type="title"/>
-          </p:nvPr>
-        </p:nvSpPr>
-        <p:spPr/>
-        <p:txBody>
-          <a:bodyPr/>
-          <a:lstStyle/>
-          <a:p>
-            <a:r>
-              <a:rPr lang="en-US" dirty="0"/>
-              <a:t>Links</a:t>
-            </a:r>
-          </a:p>
-        </p:txBody>
-      </p:sp>
-      <p:sp>
-        <p:nvSpPr>
-          <p:cNvPr id="3" name="Content Placeholder 2">
-            <a:extLst>
-              <a:ext uri="{FF2B5EF4-FFF2-40B4-BE49-F238E27FC236}">
-                <a16:creationId xmlns:a16="http://schemas.microsoft.com/office/drawing/2014/main" id="{359C6424-1019-BB43-86AA-8BD2FD87BBD8}"/>
-              </a:ext>
-            </a:extLst>
-          </p:cNvPr>
-          <p:cNvSpPr>
-            <a:spLocks noGrp="1"/>
-          </p:cNvSpPr>
-          <p:nvPr>
-            <p:ph idx="1"/>
-          </p:nvPr>
-        </p:nvSpPr>
-        <p:spPr>
-          <a:xfrm>
-            <a:off x="1059591" y="1460501"/>
-            <a:ext cx="10062296" cy="4486429"/>
-          </a:xfrm>
-        </p:spPr>
-        <p:txBody>
-          <a:bodyPr>
-            <a:normAutofit/>
-          </a:bodyPr>
-          <a:lstStyle/>
-          <a:p>
-            <a:r>
-              <a:rPr lang="en-US" sz="1600" dirty="0"/>
-              <a:t>This Presentation:</a:t>
-            </a:r>
-            <a:br>
-              <a:rPr lang="en-US" sz="1600" dirty="0"/>
-            </a:br>
-            <a:r>
-              <a:rPr lang="en-US" sz="1600" dirty="0">
-                <a:hlinkClick r:id="rId2"/>
-              </a:rPr>
-              <a:t>https://goo.gl/EHfTEC</a:t>
-            </a:r>
-            <a:endParaRPr lang="en-US" sz="1600" dirty="0"/>
-          </a:p>
-          <a:p>
-            <a:r>
-              <a:rPr lang="en-US" sz="1600" dirty="0" err="1"/>
-              <a:t>Github</a:t>
-            </a:r>
-            <a:r>
-              <a:rPr lang="en-US" sz="1600" dirty="0"/>
-              <a:t> repositories:</a:t>
-            </a:r>
-          </a:p>
-          <a:p>
-            <a:pPr lvl="1"/>
-            <a:r>
-              <a:rPr lang="en-US" sz="1450" dirty="0"/>
-              <a:t>Lambda Function: </a:t>
-            </a:r>
-            <a:r>
-              <a:rPr lang="en-US" sz="1450" dirty="0">
-                <a:hlinkClick r:id="rId3"/>
-              </a:rPr>
-              <a:t>https://github.com/jkwuc89/kotlinawslambda</a:t>
-            </a:r>
-            <a:endParaRPr lang="en-US" sz="1450" dirty="0"/>
-          </a:p>
-          <a:p>
-            <a:pPr lvl="1"/>
-            <a:r>
-              <a:rPr lang="en-US" sz="1450" dirty="0" err="1"/>
-              <a:t>TaskTracker</a:t>
-            </a:r>
-            <a:r>
-              <a:rPr lang="en-US" sz="1450" dirty="0"/>
-              <a:t>: </a:t>
-            </a:r>
-            <a:r>
-              <a:rPr lang="en-US" sz="1450" dirty="0">
-                <a:hlinkClick r:id="rId4"/>
-              </a:rPr>
-              <a:t>https://github.com/jkwuc89/tasktracker</a:t>
-            </a:r>
-            <a:endParaRPr lang="en-US" sz="1450" dirty="0"/>
-          </a:p>
-          <a:p>
-            <a:r>
-              <a:rPr lang="en-US" sz="1600" dirty="0"/>
-              <a:t>Try Kotlin:</a:t>
-            </a:r>
-            <a:br>
-              <a:rPr lang="en-US" sz="1600" dirty="0"/>
-            </a:br>
-            <a:r>
-              <a:rPr lang="en-US" sz="1600" dirty="0">
-                <a:hlinkClick r:id="rId5"/>
-              </a:rPr>
-              <a:t>https://try.kotlinlang.org</a:t>
-            </a:r>
-            <a:endParaRPr lang="en-US" sz="1600" dirty="0"/>
-          </a:p>
-          <a:p>
-            <a:r>
-              <a:rPr lang="en-US" sz="1600" dirty="0"/>
-              <a:t>Gradle:</a:t>
-            </a:r>
-            <a:br>
-              <a:rPr lang="en-US" sz="1600" dirty="0"/>
-            </a:br>
-            <a:r>
-              <a:rPr lang="en-US" sz="1600" dirty="0">
-                <a:hlinkClick r:id="rId6"/>
-              </a:rPr>
-              <a:t>https://gradle.org</a:t>
-            </a:r>
-            <a:endParaRPr lang="en-US" sz="1600" dirty="0"/>
-          </a:p>
-          <a:p>
-            <a:r>
-              <a:rPr lang="en-US" sz="1600" dirty="0"/>
-              <a:t>Maven:</a:t>
-            </a:r>
-            <a:br>
-              <a:rPr lang="en-US" sz="1600" dirty="0"/>
-            </a:br>
-            <a:r>
-              <a:rPr lang="en-US" sz="1600" dirty="0">
-                <a:hlinkClick r:id="rId7"/>
-              </a:rPr>
-              <a:t>https://maven.apache.org</a:t>
-            </a:r>
-            <a:endParaRPr lang="en-US" sz="1600" dirty="0"/>
-          </a:p>
-          <a:p>
-            <a:r>
-              <a:rPr lang="en-US" sz="1600" dirty="0"/>
-              <a:t>AWS Lambda Function Documentation</a:t>
-            </a:r>
-            <a:br>
-              <a:rPr lang="en-US" sz="1600" dirty="0"/>
-            </a:br>
-            <a:r>
-              <a:rPr lang="en-US" sz="1600" dirty="0">
-                <a:hlinkClick r:id="rId8"/>
-              </a:rPr>
-              <a:t>https://aws.amazon.com/lambda/</a:t>
-            </a:r>
-            <a:br>
-              <a:rPr lang="en-US" sz="1600" dirty="0"/>
-            </a:br>
-            <a:r>
-              <a:rPr lang="en-US" sz="1600" dirty="0">
-                <a:hlinkClick r:id="rId9"/>
-              </a:rPr>
-              <a:t>https://docs.aws.amazon.com/lambda/latest/dg/java-programming-model.html</a:t>
-            </a:r>
-            <a:br>
-              <a:rPr lang="en-US" sz="1600" dirty="0"/>
-            </a:br>
-            <a:r>
-              <a:rPr lang="en-US" sz="1600" dirty="0">
-                <a:hlinkClick r:id="rId10"/>
-              </a:rPr>
-              <a:t>https://docs.aws.amazon.com/lambda/latest/dg/java-handler-using-predefined-interfaces.html</a:t>
-            </a:r>
-            <a:br>
-              <a:rPr lang="en-US" sz="1600" dirty="0"/>
-            </a:br>
-            <a:r>
-              <a:rPr lang="en-US" sz="1600" dirty="0">
-                <a:hlinkClick r:id="rId11"/>
-              </a:rPr>
-              <a:t>https://docs.aws.amazon.com/lambda/latest/dg/java-create-jar-pkg-maven-no-ide.html</a:t>
-            </a:r>
-            <a:endParaRPr lang="en-US" sz="1600" dirty="0"/>
-          </a:p>
-          <a:p>
-            <a:pPr marL="51435" indent="0">
-              <a:buNone/>
-            </a:pPr>
-            <a:endParaRPr lang="en-US" sz="1600" dirty="0"/>
-          </a:p>
-          <a:p>
-            <a:endParaRPr lang="en-US" sz="1600" dirty="0"/>
-          </a:p>
-          <a:p>
-            <a:endParaRPr lang="en-US" sz="1600" dirty="0"/>
-          </a:p>
-        </p:txBody>
-      </p:sp>
-      <p:sp>
-        <p:nvSpPr>
-          <p:cNvPr id="4" name="Subtitle 3">
-            <a:extLst>
-              <a:ext uri="{FF2B5EF4-FFF2-40B4-BE49-F238E27FC236}">
-                <a16:creationId xmlns:a16="http://schemas.microsoft.com/office/drawing/2014/main" id="{CA3820C2-B40F-8A4D-A37D-62770F40CA48}"/>
-              </a:ext>
-            </a:extLst>
-          </p:cNvPr>
-          <p:cNvSpPr>
-            <a:spLocks noGrp="1"/>
-          </p:cNvSpPr>
-          <p:nvPr>
-            <p:ph type="subTitle" idx="12"/>
-          </p:nvPr>
-        </p:nvSpPr>
-        <p:spPr/>
-        <p:txBody>
-          <a:bodyPr/>
-          <a:lstStyle/>
-          <a:p>
-            <a:endParaRPr lang="en-US"/>
-          </a:p>
-        </p:txBody>
-      </p:sp>
-      <p:sp>
-        <p:nvSpPr>
-          <p:cNvPr id="5" name="Footer Placeholder 4">
-            <a:extLst>
-              <a:ext uri="{FF2B5EF4-FFF2-40B4-BE49-F238E27FC236}">
-                <a16:creationId xmlns:a16="http://schemas.microsoft.com/office/drawing/2014/main" id="{C304C7D0-1E6B-C046-B901-7FA182C5FBE3}"/>
-              </a:ext>
-            </a:extLst>
-          </p:cNvPr>
-          <p:cNvSpPr>
-            <a:spLocks noGrp="1"/>
-          </p:cNvSpPr>
-          <p:nvPr>
-            <p:ph type="ftr" sz="quarter" idx="3"/>
-          </p:nvPr>
-        </p:nvSpPr>
-        <p:spPr/>
-        <p:txBody>
-          <a:bodyPr/>
-          <a:lstStyle/>
-          <a:p>
-            <a:r>
-              <a:rPr lang="en-US"/>
-              <a:t>AWS Java Lambda Functions with Kotlin</a:t>
-            </a:r>
-            <a:endParaRPr lang="en-US" dirty="0"/>
-          </a:p>
-        </p:txBody>
-      </p:sp>
-      <p:sp>
-        <p:nvSpPr>
-          <p:cNvPr id="6" name="Slide Number Placeholder 5">
-            <a:extLst>
-              <a:ext uri="{FF2B5EF4-FFF2-40B4-BE49-F238E27FC236}">
-                <a16:creationId xmlns:a16="http://schemas.microsoft.com/office/drawing/2014/main" id="{089861B6-A1A7-C54F-8115-BA4212716633}"/>
-              </a:ext>
-            </a:extLst>
-          </p:cNvPr>
-          <p:cNvSpPr>
-            <a:spLocks noGrp="1"/>
-          </p:cNvSpPr>
-          <p:nvPr>
-            <p:ph type="sldNum" sz="quarter" idx="4"/>
-          </p:nvPr>
-        </p:nvSpPr>
-        <p:spPr/>
-        <p:txBody>
-          <a:bodyPr/>
-          <a:lstStyle/>
-          <a:p>
-            <a:pPr algn="l"/>
-            <a:fld id="{ABCABC6B-F667-1540-8370-D056DC2C0FCE}" type="slidenum">
-              <a:rPr lang="en-US" smtClean="0"/>
-              <a:pPr algn="l"/>
-              <a:t>13</a:t>
-            </a:fld>
-            <a:endParaRPr lang="en-US" dirty="0"/>
-          </a:p>
-        </p:txBody>
-      </p:sp>
-    </p:spTree>
-    <p:extLst>
-      <p:ext uri="{BB962C8B-B14F-4D97-AF65-F5344CB8AC3E}">
-        <p14:creationId xmlns:p14="http://schemas.microsoft.com/office/powerpoint/2010/main" val="2092399202"/>
-      </p:ext>
-    </p:extLst>
-  </p:cSld>
-  <p:clrMapOvr>
-    <a:masterClrMapping/>
-  </p:clrMapOvr>
-</p:sld>
-</file>
-
-<file path=ppt/slides/slide14.xml><?xml version="1.0" encoding="utf-8"?>
-<p:sld xmlns:a="http://schemas.openxmlformats.org/drawingml/2006/main" xmlns:r="http://schemas.openxmlformats.org/officeDocument/2006/relationships" xmlns:p="http://schemas.openxmlformats.org/presentationml/2006/main">
-  <p:cSld>
-    <p:spTree>
-      <p:nvGrpSpPr>
-        <p:cNvPr id="1" name=""/>
-        <p:cNvGrpSpPr/>
-        <p:nvPr/>
-      </p:nvGrpSpPr>
-      <p:grpSpPr>
-        <a:xfrm>
-          <a:off x="0" y="0"/>
-          <a:ext cx="0" cy="0"/>
-          <a:chOff x="0" y="0"/>
-          <a:chExt cx="0" cy="0"/>
-        </a:xfrm>
-      </p:grpSpPr>
-      <p:sp>
-        <p:nvSpPr>
-          <p:cNvPr id="2" name="Title 1">
-            <a:extLst>
-              <a:ext uri="{FF2B5EF4-FFF2-40B4-BE49-F238E27FC236}">
                 <a16:creationId xmlns:a16="http://schemas.microsoft.com/office/drawing/2014/main" id="{18B96339-C805-F149-9761-3970846A228E}"/>
               </a:ext>
             </a:extLst>
@@ -9612,7 +9295,7 @@
             <a:fld id="{ABCABC6B-F667-1540-8370-D056DC2C0FCE}" type="slidenum">
               <a:rPr lang="en-US" smtClean="0"/>
               <a:pPr algn="l"/>
-              <a:t>14</a:t>
+              <a:t>13</a:t>
             </a:fld>
             <a:endParaRPr lang="en-US" dirty="0"/>
           </a:p>
@@ -9650,10 +9333,123 @@
       </p:grpSpPr>
       <p:sp>
         <p:nvSpPr>
+          <p:cNvPr id="2" name="Title 1">
+            <a:extLst>
+              <a:ext uri="{FF2B5EF4-FFF2-40B4-BE49-F238E27FC236}">
+                <a16:creationId xmlns:a16="http://schemas.microsoft.com/office/drawing/2014/main" id="{B421EA95-BB16-3742-876E-A41F29E75322}"/>
+              </a:ext>
+            </a:extLst>
+          </p:cNvPr>
+          <p:cNvSpPr>
+            <a:spLocks noGrp="1"/>
+          </p:cNvSpPr>
+          <p:nvPr>
+            <p:ph type="title"/>
+          </p:nvPr>
+        </p:nvSpPr>
+        <p:spPr/>
+        <p:txBody>
+          <a:bodyPr/>
+          <a:lstStyle/>
+          <a:p>
+            <a:r>
+              <a:rPr lang="en-US" dirty="0"/>
+              <a:t>Agenda</a:t>
+            </a:r>
+          </a:p>
+        </p:txBody>
+      </p:sp>
+      <p:sp>
+        <p:nvSpPr>
+          <p:cNvPr id="3" name="Content Placeholder 2">
+            <a:extLst>
+              <a:ext uri="{FF2B5EF4-FFF2-40B4-BE49-F238E27FC236}">
+                <a16:creationId xmlns:a16="http://schemas.microsoft.com/office/drawing/2014/main" id="{4A30129A-4023-334B-B984-DFE3844B1B9C}"/>
+              </a:ext>
+            </a:extLst>
+          </p:cNvPr>
+          <p:cNvSpPr>
+            <a:spLocks noGrp="1"/>
+          </p:cNvSpPr>
+          <p:nvPr>
+            <p:ph idx="1"/>
+          </p:nvPr>
+        </p:nvSpPr>
+        <p:spPr/>
+        <p:txBody>
+          <a:bodyPr>
+            <a:normAutofit/>
+          </a:bodyPr>
+          <a:lstStyle/>
+          <a:p>
+            <a:r>
+              <a:rPr lang="en-US" sz="2400" dirty="0"/>
+              <a:t>Introduction</a:t>
+            </a:r>
+          </a:p>
+          <a:p>
+            <a:r>
+              <a:rPr lang="en-US" sz="2400" dirty="0"/>
+              <a:t>AWS Lambda Elevator Pitch</a:t>
+            </a:r>
+          </a:p>
+          <a:p>
+            <a:r>
+              <a:rPr lang="en-US" sz="2400" dirty="0"/>
+              <a:t>Why Kotlin?</a:t>
+            </a:r>
+          </a:p>
+          <a:p>
+            <a:r>
+              <a:rPr lang="en-US" sz="2400" dirty="0"/>
+              <a:t>So, how do we do this?</a:t>
+            </a:r>
+          </a:p>
+          <a:p>
+            <a:r>
+              <a:rPr lang="en-US" sz="2400" dirty="0"/>
+              <a:t>Links</a:t>
+            </a:r>
+          </a:p>
+          <a:p>
+            <a:r>
+              <a:rPr lang="en-US" sz="2400" dirty="0"/>
+              <a:t>Questions</a:t>
+            </a:r>
+          </a:p>
+        </p:txBody>
+      </p:sp>
+      <p:sp>
+        <p:nvSpPr>
+          <p:cNvPr id="4" name="Subtitle 3">
+            <a:extLst>
+              <a:ext uri="{FF2B5EF4-FFF2-40B4-BE49-F238E27FC236}">
+                <a16:creationId xmlns:a16="http://schemas.microsoft.com/office/drawing/2014/main" id="{9AC6D470-5992-C345-9DEC-960511667D11}"/>
+              </a:ext>
+            </a:extLst>
+          </p:cNvPr>
+          <p:cNvSpPr>
+            <a:spLocks noGrp="1"/>
+          </p:cNvSpPr>
+          <p:nvPr>
+            <p:ph type="subTitle" idx="12"/>
+          </p:nvPr>
+        </p:nvSpPr>
+        <p:spPr/>
+        <p:txBody>
+          <a:bodyPr/>
+          <a:lstStyle/>
+          <a:p>
+            <a:endParaRPr lang="en-US"/>
+          </a:p>
+        </p:txBody>
+      </p:sp>
+      <p:sp>
+        <p:nvSpPr>
           <p:cNvPr id="5" name="Footer Placeholder 4">
             <a:extLst>
               <a:ext uri="{FF2B5EF4-FFF2-40B4-BE49-F238E27FC236}">
-                <a16:creationId xmlns:a16="http://schemas.microsoft.com/office/drawing/2014/main" id="{D4BE3EB9-5066-2F4C-A8B2-7C96288A6FFC}"/>
+                <a16:creationId xmlns:a16="http://schemas.microsoft.com/office/drawing/2014/main" id="{23D155C1-BF6E-5745-92DF-ADCB7B6828D2}"/>
               </a:ext>
             </a:extLst>
           </p:cNvPr>
@@ -9682,7 +9478,7 @@
           <p:cNvPr id="6" name="Slide Number Placeholder 5">
             <a:extLst>
               <a:ext uri="{FF2B5EF4-FFF2-40B4-BE49-F238E27FC236}">
-                <a16:creationId xmlns:a16="http://schemas.microsoft.com/office/drawing/2014/main" id="{DFBAC0A9-4FB7-414D-BFA7-B62195B7FD33}"/>
+                <a16:creationId xmlns:a16="http://schemas.microsoft.com/office/drawing/2014/main" id="{1B24E391-83E3-FF40-992E-18DE009D209B}"/>
               </a:ext>
             </a:extLst>
           </p:cNvPr>
@@ -9708,40 +9504,10 @@
           </a:p>
         </p:txBody>
       </p:sp>
-      <p:pic>
-        <p:nvPicPr>
-          <p:cNvPr id="8" name="Picture 7">
-            <a:extLst>
-              <a:ext uri="{FF2B5EF4-FFF2-40B4-BE49-F238E27FC236}">
-                <a16:creationId xmlns:a16="http://schemas.microsoft.com/office/drawing/2014/main" id="{EC384AC9-957A-294C-B2F5-1B82B8753EE0}"/>
-              </a:ext>
-            </a:extLst>
-          </p:cNvPr>
-          <p:cNvPicPr>
-            <a:picLocks noChangeAspect="1"/>
-          </p:cNvPicPr>
-          <p:nvPr/>
-        </p:nvPicPr>
-        <p:blipFill>
-          <a:blip r:embed="rId2"/>
-          <a:stretch>
-            <a:fillRect/>
-          </a:stretch>
-        </p:blipFill>
-        <p:spPr>
-          <a:xfrm>
-            <a:off x="0" y="893"/>
-            <a:ext cx="12188825" cy="6856214"/>
-          </a:xfrm>
-          <a:prstGeom prst="rect">
-            <a:avLst/>
-          </a:prstGeom>
-        </p:spPr>
-      </p:pic>
     </p:spTree>
     <p:extLst>
       <p:ext uri="{BB962C8B-B14F-4D97-AF65-F5344CB8AC3E}">
-        <p14:creationId xmlns:p14="http://schemas.microsoft.com/office/powerpoint/2010/main" val="1988005590"/>
+        <p14:creationId xmlns:p14="http://schemas.microsoft.com/office/powerpoint/2010/main" val="2514435320"/>
       </p:ext>
     </p:extLst>
   </p:cSld>
@@ -9773,7 +9539,7 @@
           <p:cNvPr id="2" name="Title 1">
             <a:extLst>
               <a:ext uri="{FF2B5EF4-FFF2-40B4-BE49-F238E27FC236}">
-                <a16:creationId xmlns:a16="http://schemas.microsoft.com/office/drawing/2014/main" id="{B421EA95-BB16-3742-876E-A41F29E75322}"/>
+                <a16:creationId xmlns:a16="http://schemas.microsoft.com/office/drawing/2014/main" id="{019428AE-A3E3-764E-9B6A-8217D5478EAF}"/>
               </a:ext>
             </a:extLst>
           </p:cNvPr>
@@ -9791,77 +9557,46 @@
           <a:p>
             <a:r>
               <a:rPr lang="en-US" dirty="0"/>
-              <a:t>Agenda</a:t>
-            </a:r>
-          </a:p>
-        </p:txBody>
-      </p:sp>
-      <p:sp>
-        <p:nvSpPr>
-          <p:cNvPr id="3" name="Content Placeholder 2">
+              <a:t>Before We Get Started…</a:t>
+            </a:r>
+          </a:p>
+        </p:txBody>
+      </p:sp>
+      <p:pic>
+        <p:nvPicPr>
+          <p:cNvPr id="7" name="Content Placeholder 6">
             <a:extLst>
               <a:ext uri="{FF2B5EF4-FFF2-40B4-BE49-F238E27FC236}">
-                <a16:creationId xmlns:a16="http://schemas.microsoft.com/office/drawing/2014/main" id="{4A30129A-4023-334B-B984-DFE3844B1B9C}"/>
+                <a16:creationId xmlns:a16="http://schemas.microsoft.com/office/drawing/2014/main" id="{8C164050-9FAD-6B4B-AF7E-39F2469728BD}"/>
               </a:ext>
             </a:extLst>
           </p:cNvPr>
-          <p:cNvSpPr>
-            <a:spLocks noGrp="1"/>
-          </p:cNvSpPr>
+          <p:cNvPicPr>
+            <a:picLocks noGrp="1" noChangeAspect="1"/>
+          </p:cNvPicPr>
           <p:nvPr>
             <p:ph idx="1"/>
           </p:nvPr>
-        </p:nvSpPr>
-        <p:spPr/>
-        <p:txBody>
-          <a:bodyPr>
-            <a:normAutofit/>
-          </a:bodyPr>
-          <a:lstStyle/>
-          <a:p>
-            <a:r>
-              <a:rPr lang="en-US" sz="2400" dirty="0"/>
-              <a:t>Introduction</a:t>
-            </a:r>
-          </a:p>
-          <a:p>
-            <a:r>
-              <a:rPr lang="en-US" sz="2400" dirty="0"/>
-              <a:t>AWS Lambda Elevator Pitch</a:t>
-            </a:r>
-          </a:p>
-          <a:p>
-            <a:r>
-              <a:rPr lang="en-US" sz="2400" dirty="0"/>
-              <a:t>Why Kotlin?</a:t>
-            </a:r>
-          </a:p>
-          <a:p>
-            <a:r>
-              <a:rPr lang="en-US" sz="2400" dirty="0"/>
-              <a:t>So, how do we do this?</a:t>
-            </a:r>
-          </a:p>
-          <a:p>
-            <a:r>
-              <a:rPr lang="en-US" sz="2400" dirty="0"/>
-              <a:t>Links</a:t>
-            </a:r>
-          </a:p>
-          <a:p>
-            <a:r>
-              <a:rPr lang="en-US" sz="2400" dirty="0"/>
-              <a:t>Questions</a:t>
-            </a:r>
-          </a:p>
-        </p:txBody>
-      </p:sp>
+        </p:nvPicPr>
+        <p:blipFill>
+          <a:blip r:embed="rId2"/>
+          <a:stretch>
+            <a:fillRect/>
+          </a:stretch>
+        </p:blipFill>
+        <p:spPr>
+          <a:xfrm>
+            <a:off x="4434567" y="1233152"/>
+            <a:ext cx="3340861" cy="3340861"/>
+          </a:xfrm>
+        </p:spPr>
+      </p:pic>
       <p:sp>
         <p:nvSpPr>
           <p:cNvPr id="4" name="Subtitle 3">
             <a:extLst>
               <a:ext uri="{FF2B5EF4-FFF2-40B4-BE49-F238E27FC236}">
-                <a16:creationId xmlns:a16="http://schemas.microsoft.com/office/drawing/2014/main" id="{9AC6D470-5992-C345-9DEC-960511667D11}"/>
+                <a16:creationId xmlns:a16="http://schemas.microsoft.com/office/drawing/2014/main" id="{494F5345-2D74-7D49-8027-AF99D65D7382}"/>
               </a:ext>
             </a:extLst>
           </p:cNvPr>
@@ -9886,7 +9621,7 @@
           <p:cNvPr id="5" name="Footer Placeholder 4">
             <a:extLst>
               <a:ext uri="{FF2B5EF4-FFF2-40B4-BE49-F238E27FC236}">
-                <a16:creationId xmlns:a16="http://schemas.microsoft.com/office/drawing/2014/main" id="{23D155C1-BF6E-5745-92DF-ADCB7B6828D2}"/>
+                <a16:creationId xmlns:a16="http://schemas.microsoft.com/office/drawing/2014/main" id="{6F1A7598-D015-D140-A248-0F4C10D6E22F}"/>
               </a:ext>
             </a:extLst>
           </p:cNvPr>
@@ -9915,7 +9650,7 @@
           <p:cNvPr id="6" name="Slide Number Placeholder 5">
             <a:extLst>
               <a:ext uri="{FF2B5EF4-FFF2-40B4-BE49-F238E27FC236}">
-                <a16:creationId xmlns:a16="http://schemas.microsoft.com/office/drawing/2014/main" id="{1B24E391-83E3-FF40-992E-18DE009D209B}"/>
+                <a16:creationId xmlns:a16="http://schemas.microsoft.com/office/drawing/2014/main" id="{44154E07-A14C-CB46-8835-DD36BE322D64}"/>
               </a:ext>
             </a:extLst>
           </p:cNvPr>
@@ -9941,10 +9676,78 @@
           </a:p>
         </p:txBody>
       </p:sp>
+      <p:sp>
+        <p:nvSpPr>
+          <p:cNvPr id="8" name="TextBox 7">
+            <a:extLst>
+              <a:ext uri="{FF2B5EF4-FFF2-40B4-BE49-F238E27FC236}">
+                <a16:creationId xmlns:a16="http://schemas.microsoft.com/office/drawing/2014/main" id="{1BAC3316-0DC7-FE42-8C97-F233651D0BEC}"/>
+              </a:ext>
+            </a:extLst>
+          </p:cNvPr>
+          <p:cNvSpPr txBox="1"/>
+          <p:nvPr/>
+        </p:nvSpPr>
+        <p:spPr>
+          <a:xfrm>
+            <a:off x="289324" y="4772685"/>
+            <a:ext cx="11631346" cy="1384995"/>
+          </a:xfrm>
+          <a:prstGeom prst="rect">
+            <a:avLst/>
+          </a:prstGeom>
+          <a:noFill/>
+        </p:spPr>
+        <p:txBody>
+          <a:bodyPr wrap="square" rtlCol="0">
+            <a:spAutoFit/>
+          </a:bodyPr>
+          <a:lstStyle/>
+          <a:p>
+            <a:pPr algn="ctr"/>
+            <a:r>
+              <a:rPr lang="en-US" sz="2800" dirty="0"/>
+              <a:t>No need to write down or take pics of slide deck content</a:t>
+            </a:r>
+          </a:p>
+          <a:p>
+            <a:pPr algn="ctr"/>
+            <a:r>
+              <a:rPr lang="en-US" sz="2800" dirty="0"/>
+              <a:t>Presentation: </a:t>
+            </a:r>
+            <a:r>
+              <a:rPr lang="en-US" sz="2800" dirty="0">
+                <a:hlinkClick r:id="rId3"/>
+              </a:rPr>
+              <a:t>https://goo.gl/EHfTEC</a:t>
+            </a:r>
+            <a:endParaRPr lang="en-US" sz="2800" dirty="0"/>
+          </a:p>
+          <a:p>
+            <a:pPr algn="ctr"/>
+            <a:r>
+              <a:rPr lang="en-US" sz="2800" dirty="0" err="1"/>
+              <a:t>Github</a:t>
+            </a:r>
+            <a:r>
+              <a:rPr lang="en-US" sz="2800" dirty="0"/>
+              <a:t> repository: </a:t>
+            </a:r>
+            <a:r>
+              <a:rPr lang="en-US" sz="2800" dirty="0">
+                <a:hlinkClick r:id="rId4"/>
+              </a:rPr>
+              <a:t>https://github.com/jkwuc89/kotlinawslambda</a:t>
+            </a:r>
+            <a:endParaRPr lang="en-US" sz="2800" dirty="0"/>
+          </a:p>
+        </p:txBody>
+      </p:sp>
     </p:spTree>
     <p:extLst>
       <p:ext uri="{BB962C8B-B14F-4D97-AF65-F5344CB8AC3E}">
-        <p14:creationId xmlns:p14="http://schemas.microsoft.com/office/powerpoint/2010/main" val="2514435320"/>
+        <p14:creationId xmlns:p14="http://schemas.microsoft.com/office/powerpoint/2010/main" val="3923086136"/>
       </p:ext>
     </p:extLst>
   </p:cSld>
@@ -9976,7 +9779,7 @@
           <p:cNvPr id="2" name="Title 1">
             <a:extLst>
               <a:ext uri="{FF2B5EF4-FFF2-40B4-BE49-F238E27FC236}">
-                <a16:creationId xmlns:a16="http://schemas.microsoft.com/office/drawing/2014/main" id="{019428AE-A3E3-764E-9B6A-8217D5478EAF}"/>
+                <a16:creationId xmlns:a16="http://schemas.microsoft.com/office/drawing/2014/main" id="{C2CC7635-4966-BC4A-84DD-29BFC0ED1226}"/>
               </a:ext>
             </a:extLst>
           </p:cNvPr>
@@ -9994,46 +9797,75 @@
           <a:p>
             <a:r>
               <a:rPr lang="en-US" dirty="0"/>
-              <a:t>Before We Get Started…</a:t>
-            </a:r>
-          </a:p>
-        </p:txBody>
-      </p:sp>
-      <p:pic>
-        <p:nvPicPr>
-          <p:cNvPr id="7" name="Content Placeholder 6">
+              <a:t>Introduction (me)</a:t>
+            </a:r>
+          </a:p>
+        </p:txBody>
+      </p:sp>
+      <p:sp>
+        <p:nvSpPr>
+          <p:cNvPr id="3" name="Content Placeholder 2">
             <a:extLst>
               <a:ext uri="{FF2B5EF4-FFF2-40B4-BE49-F238E27FC236}">
-                <a16:creationId xmlns:a16="http://schemas.microsoft.com/office/drawing/2014/main" id="{8C164050-9FAD-6B4B-AF7E-39F2469728BD}"/>
+                <a16:creationId xmlns:a16="http://schemas.microsoft.com/office/drawing/2014/main" id="{ADDCD2F1-0788-8746-8807-EE55D7BB763A}"/>
               </a:ext>
             </a:extLst>
           </p:cNvPr>
-          <p:cNvPicPr>
-            <a:picLocks noGrp="1" noChangeAspect="1"/>
-          </p:cNvPicPr>
+          <p:cNvSpPr>
+            <a:spLocks noGrp="1"/>
+          </p:cNvSpPr>
           <p:nvPr>
             <p:ph idx="1"/>
           </p:nvPr>
-        </p:nvPicPr>
-        <p:blipFill>
-          <a:blip r:embed="rId2"/>
-          <a:stretch>
-            <a:fillRect/>
-          </a:stretch>
-        </p:blipFill>
-        <p:spPr>
-          <a:xfrm>
-            <a:off x="4434567" y="1233152"/>
-            <a:ext cx="3340861" cy="3340861"/>
-          </a:xfrm>
-        </p:spPr>
-      </p:pic>
+        </p:nvSpPr>
+        <p:spPr/>
+        <p:txBody>
+          <a:bodyPr>
+            <a:normAutofit/>
+          </a:bodyPr>
+          <a:lstStyle/>
+          <a:p>
+            <a:r>
+              <a:rPr lang="en-US" sz="2400" dirty="0"/>
+              <a:t>28+ year career</a:t>
+            </a:r>
+          </a:p>
+          <a:p>
+            <a:r>
+              <a:rPr lang="en-US" sz="2400" dirty="0"/>
+              <a:t>Several development projects for multiple companies</a:t>
+            </a:r>
+          </a:p>
+          <a:p>
+            <a:pPr lvl="1"/>
+            <a:r>
+              <a:rPr lang="en-US" sz="2000" dirty="0"/>
+              <a:t>IBM, Lexmark, Diebold, Limited Brands, Sterling Commerce, IBM (again), Leading EDJE, Crown Equipment Corp, Wendy’s, OEC, Improving, Ohio State, Abercrombie &amp; Fitch</a:t>
+            </a:r>
+          </a:p>
+          <a:p>
+            <a:r>
+              <a:rPr lang="en-US" sz="2400" dirty="0"/>
+              <a:t>Enjoy dining, traveling and craft brewery exploration with my wife</a:t>
+            </a:r>
+          </a:p>
+          <a:p>
+            <a:r>
+              <a:rPr lang="en-US" sz="2400" dirty="0"/>
+              <a:t>Who are you?</a:t>
+            </a:r>
+          </a:p>
+          <a:p>
+            <a:endParaRPr lang="en-US" sz="2400" dirty="0"/>
+          </a:p>
+        </p:txBody>
+      </p:sp>
       <p:sp>
         <p:nvSpPr>
           <p:cNvPr id="4" name="Subtitle 3">
             <a:extLst>
               <a:ext uri="{FF2B5EF4-FFF2-40B4-BE49-F238E27FC236}">
-                <a16:creationId xmlns:a16="http://schemas.microsoft.com/office/drawing/2014/main" id="{494F5345-2D74-7D49-8027-AF99D65D7382}"/>
+                <a16:creationId xmlns:a16="http://schemas.microsoft.com/office/drawing/2014/main" id="{697E533F-79B0-1242-B668-3B28772F61F0}"/>
               </a:ext>
             </a:extLst>
           </p:cNvPr>
@@ -10058,7 +9890,7 @@
           <p:cNvPr id="5" name="Footer Placeholder 4">
             <a:extLst>
               <a:ext uri="{FF2B5EF4-FFF2-40B4-BE49-F238E27FC236}">
-                <a16:creationId xmlns:a16="http://schemas.microsoft.com/office/drawing/2014/main" id="{6F1A7598-D015-D140-A248-0F4C10D6E22F}"/>
+                <a16:creationId xmlns:a16="http://schemas.microsoft.com/office/drawing/2014/main" id="{499E2D86-ADF2-A446-92C2-2DE3B2C01879}"/>
               </a:ext>
             </a:extLst>
           </p:cNvPr>
@@ -10087,7 +9919,7 @@
           <p:cNvPr id="6" name="Slide Number Placeholder 5">
             <a:extLst>
               <a:ext uri="{FF2B5EF4-FFF2-40B4-BE49-F238E27FC236}">
-                <a16:creationId xmlns:a16="http://schemas.microsoft.com/office/drawing/2014/main" id="{44154E07-A14C-CB46-8835-DD36BE322D64}"/>
+                <a16:creationId xmlns:a16="http://schemas.microsoft.com/office/drawing/2014/main" id="{5F065DAA-3C97-BB48-980B-806F5C93A8CC}"/>
               </a:ext>
             </a:extLst>
           </p:cNvPr>
@@ -10113,78 +9945,10 @@
           </a:p>
         </p:txBody>
       </p:sp>
-      <p:sp>
-        <p:nvSpPr>
-          <p:cNvPr id="8" name="TextBox 7">
-            <a:extLst>
-              <a:ext uri="{FF2B5EF4-FFF2-40B4-BE49-F238E27FC236}">
-                <a16:creationId xmlns:a16="http://schemas.microsoft.com/office/drawing/2014/main" id="{1BAC3316-0DC7-FE42-8C97-F233651D0BEC}"/>
-              </a:ext>
-            </a:extLst>
-          </p:cNvPr>
-          <p:cNvSpPr txBox="1"/>
-          <p:nvPr/>
-        </p:nvSpPr>
-        <p:spPr>
-          <a:xfrm>
-            <a:off x="289324" y="4772685"/>
-            <a:ext cx="11631346" cy="1384995"/>
-          </a:xfrm>
-          <a:prstGeom prst="rect">
-            <a:avLst/>
-          </a:prstGeom>
-          <a:noFill/>
-        </p:spPr>
-        <p:txBody>
-          <a:bodyPr wrap="square" rtlCol="0">
-            <a:spAutoFit/>
-          </a:bodyPr>
-          <a:lstStyle/>
-          <a:p>
-            <a:pPr algn="ctr"/>
-            <a:r>
-              <a:rPr lang="en-US" sz="2800" dirty="0"/>
-              <a:t>No need to write down or take pics of slide deck content</a:t>
-            </a:r>
-          </a:p>
-          <a:p>
-            <a:pPr algn="ctr"/>
-            <a:r>
-              <a:rPr lang="en-US" sz="2800" dirty="0"/>
-              <a:t>Presentation: </a:t>
-            </a:r>
-            <a:r>
-              <a:rPr lang="en-US" sz="2800" dirty="0">
-                <a:hlinkClick r:id="rId3"/>
-              </a:rPr>
-              <a:t>https://goo.gl/EHfTEC</a:t>
-            </a:r>
-            <a:endParaRPr lang="en-US" sz="2800" dirty="0"/>
-          </a:p>
-          <a:p>
-            <a:pPr algn="ctr"/>
-            <a:r>
-              <a:rPr lang="en-US" sz="2800" dirty="0" err="1"/>
-              <a:t>Github</a:t>
-            </a:r>
-            <a:r>
-              <a:rPr lang="en-US" sz="2800" dirty="0"/>
-              <a:t> repository: </a:t>
-            </a:r>
-            <a:r>
-              <a:rPr lang="en-US" sz="2800" dirty="0">
-                <a:hlinkClick r:id="rId4"/>
-              </a:rPr>
-              <a:t>https://github.com/jkwuc89/kotlinawslambda</a:t>
-            </a:r>
-            <a:endParaRPr lang="en-US" sz="2800" dirty="0"/>
-          </a:p>
-        </p:txBody>
-      </p:sp>
     </p:spTree>
     <p:extLst>
       <p:ext uri="{BB962C8B-B14F-4D97-AF65-F5344CB8AC3E}">
-        <p14:creationId xmlns:p14="http://schemas.microsoft.com/office/powerpoint/2010/main" val="3923086136"/>
+        <p14:creationId xmlns:p14="http://schemas.microsoft.com/office/powerpoint/2010/main" val="1247063801"/>
       </p:ext>
     </p:extLst>
   </p:cSld>
@@ -10216,7 +9980,7 @@
           <p:cNvPr id="2" name="Title 1">
             <a:extLst>
               <a:ext uri="{FF2B5EF4-FFF2-40B4-BE49-F238E27FC236}">
-                <a16:creationId xmlns:a16="http://schemas.microsoft.com/office/drawing/2014/main" id="{C2CC7635-4966-BC4A-84DD-29BFC0ED1226}"/>
+                <a16:creationId xmlns:a16="http://schemas.microsoft.com/office/drawing/2014/main" id="{FFC029B8-0887-0E44-94F7-FF3426F445C0}"/>
               </a:ext>
             </a:extLst>
           </p:cNvPr>
@@ -10234,7 +9998,7 @@
           <a:p>
             <a:r>
               <a:rPr lang="en-US" dirty="0"/>
-              <a:t>Introduction (me)</a:t>
+              <a:t>Introduction (Improving)</a:t>
             </a:r>
           </a:p>
         </p:txBody>
@@ -10244,7 +10008,7 @@
           <p:cNvPr id="3" name="Content Placeholder 2">
             <a:extLst>
               <a:ext uri="{FF2B5EF4-FFF2-40B4-BE49-F238E27FC236}">
-                <a16:creationId xmlns:a16="http://schemas.microsoft.com/office/drawing/2014/main" id="{ADDCD2F1-0788-8746-8807-EE55D7BB763A}"/>
+                <a16:creationId xmlns:a16="http://schemas.microsoft.com/office/drawing/2014/main" id="{70E434A7-7358-3F4D-B766-3F6626014219}"/>
               </a:ext>
             </a:extLst>
           </p:cNvPr>
@@ -10263,37 +10027,81 @@
           <a:lstStyle/>
           <a:p>
             <a:r>
-              <a:rPr lang="en-US" sz="2400" dirty="0"/>
-              <a:t>28+ year career</a:t>
-            </a:r>
-          </a:p>
-          <a:p>
-            <a:r>
-              <a:rPr lang="en-US" sz="2400" dirty="0"/>
-              <a:t>Several development projects for multiple companies</a:t>
+              <a:rPr lang="en-US" sz="2000" b="1" dirty="0"/>
+              <a:t>Values: Excellence, Involvement, and Dedication</a:t>
+            </a:r>
+            <a:r>
+              <a:rPr lang="en-US" sz="2000" dirty="0"/>
+              <a:t> </a:t>
+            </a:r>
+          </a:p>
+          <a:p>
+            <a:r>
+              <a:rPr lang="en-US" sz="2000" dirty="0"/>
+              <a:t>Complete IT services firm, offering training, consulting, recruiting, and project services</a:t>
+            </a:r>
+          </a:p>
+          <a:p>
+            <a:r>
+              <a:rPr lang="en-US" sz="2000" dirty="0"/>
+              <a:t>Offices in Columbus, Cleveland, Calgary, Minneapolis, Dallas, Houston and College Station</a:t>
+            </a:r>
+          </a:p>
+          <a:p>
+            <a:r>
+              <a:rPr lang="en-US" sz="2000" dirty="0"/>
+              <a:t>Creating a great place to work by </a:t>
             </a:r>
           </a:p>
           <a:p>
             <a:pPr lvl="1"/>
             <a:r>
-              <a:rPr lang="en-US" sz="2000" dirty="0"/>
-              <a:t>IBM, Lexmark, Diebold, Limited Brands, Sterling Commerce, IBM (again), Leading EDJE, Crown Equipment Corp, Wendy’s, OEC, Improving, Ohio State, Abercrombie &amp; Fitch</a:t>
-            </a:r>
-          </a:p>
-          <a:p>
-            <a:r>
-              <a:rPr lang="en-US" sz="2400" dirty="0"/>
-              <a:t>Enjoy dining, traveling and craft brewery exploration with my wife</a:t>
-            </a:r>
-          </a:p>
-          <a:p>
-            <a:r>
-              <a:rPr lang="en-US" sz="2400" dirty="0"/>
-              <a:t>Who are you?</a:t>
-            </a:r>
-          </a:p>
-          <a:p>
-            <a:endParaRPr lang="en-US" sz="2400" dirty="0"/>
+              <a:rPr lang="en-US" sz="1800" dirty="0"/>
+              <a:t>Cultivating an environment that fosters authentic and long term professional relationships </a:t>
+            </a:r>
+          </a:p>
+          <a:p>
+            <a:pPr lvl="1"/>
+            <a:r>
+              <a:rPr lang="en-US" sz="1800" dirty="0"/>
+              <a:t>Sharing the success and accomplishments of the company </a:t>
+            </a:r>
+          </a:p>
+          <a:p>
+            <a:pPr lvl="1"/>
+            <a:r>
+              <a:rPr lang="en-US" sz="1800" dirty="0"/>
+              <a:t>Promoting open and honest communication </a:t>
+            </a:r>
+          </a:p>
+          <a:p>
+            <a:pPr lvl="1"/>
+            <a:r>
+              <a:rPr lang="en-US" sz="1800" dirty="0"/>
+              <a:t>Providing creative ways for each of us to learn and grow</a:t>
+            </a:r>
+          </a:p>
+          <a:p>
+            <a:pPr lvl="1"/>
+            <a:r>
+              <a:rPr lang="en-US" sz="1800" dirty="0"/>
+              <a:t>Encouraging a positive atmosphere which is both friendly and fun</a:t>
+            </a:r>
+          </a:p>
+          <a:p>
+            <a:r>
+              <a:rPr lang="en-US" sz="1950" dirty="0">
+                <a:hlinkClick r:id="rId2"/>
+              </a:rPr>
+              <a:t>http://improving.com</a:t>
+            </a:r>
+            <a:endParaRPr lang="en-US" sz="1950" dirty="0"/>
+          </a:p>
+          <a:p>
+            <a:pPr marL="51435" indent="0">
+              <a:buNone/>
+            </a:pPr>
+            <a:endParaRPr lang="en-US" sz="1950" dirty="0"/>
           </a:p>
         </p:txBody>
       </p:sp>
@@ -10302,7 +10110,7 @@
           <p:cNvPr id="4" name="Subtitle 3">
             <a:extLst>
               <a:ext uri="{FF2B5EF4-FFF2-40B4-BE49-F238E27FC236}">
-                <a16:creationId xmlns:a16="http://schemas.microsoft.com/office/drawing/2014/main" id="{697E533F-79B0-1242-B668-3B28772F61F0}"/>
+                <a16:creationId xmlns:a16="http://schemas.microsoft.com/office/drawing/2014/main" id="{0DF9A954-920E-734B-BC6B-DAB19D274AC3}"/>
               </a:ext>
             </a:extLst>
           </p:cNvPr>
@@ -10327,7 +10135,7 @@
           <p:cNvPr id="5" name="Footer Placeholder 4">
             <a:extLst>
               <a:ext uri="{FF2B5EF4-FFF2-40B4-BE49-F238E27FC236}">
-                <a16:creationId xmlns:a16="http://schemas.microsoft.com/office/drawing/2014/main" id="{499E2D86-ADF2-A446-92C2-2DE3B2C01879}"/>
+                <a16:creationId xmlns:a16="http://schemas.microsoft.com/office/drawing/2014/main" id="{B2C7DCCD-B733-914A-AB9B-8803BCA8771B}"/>
               </a:ext>
             </a:extLst>
           </p:cNvPr>
@@ -10356,7 +10164,7 @@
           <p:cNvPr id="6" name="Slide Number Placeholder 5">
             <a:extLst>
               <a:ext uri="{FF2B5EF4-FFF2-40B4-BE49-F238E27FC236}">
-                <a16:creationId xmlns:a16="http://schemas.microsoft.com/office/drawing/2014/main" id="{5F065DAA-3C97-BB48-980B-806F5C93A8CC}"/>
+                <a16:creationId xmlns:a16="http://schemas.microsoft.com/office/drawing/2014/main" id="{33C67A40-2014-2441-9229-6743DB3B77D0}"/>
               </a:ext>
             </a:extLst>
           </p:cNvPr>
@@ -10385,7 +10193,7 @@
     </p:spTree>
     <p:extLst>
       <p:ext uri="{BB962C8B-B14F-4D97-AF65-F5344CB8AC3E}">
-        <p14:creationId xmlns:p14="http://schemas.microsoft.com/office/powerpoint/2010/main" val="1247063801"/>
+        <p14:creationId xmlns:p14="http://schemas.microsoft.com/office/powerpoint/2010/main" val="2676875404"/>
       </p:ext>
     </p:extLst>
   </p:cSld>
@@ -10417,7 +10225,7 @@
           <p:cNvPr id="2" name="Title 1">
             <a:extLst>
               <a:ext uri="{FF2B5EF4-FFF2-40B4-BE49-F238E27FC236}">
-                <a16:creationId xmlns:a16="http://schemas.microsoft.com/office/drawing/2014/main" id="{FFC029B8-0887-0E44-94F7-FF3426F445C0}"/>
+                <a16:creationId xmlns:a16="http://schemas.microsoft.com/office/drawing/2014/main" id="{369CD339-1E2E-944A-8563-AA22857F3965}"/>
               </a:ext>
             </a:extLst>
           </p:cNvPr>
@@ -10435,7 +10243,7 @@
           <a:p>
             <a:r>
               <a:rPr lang="en-US" dirty="0"/>
-              <a:t>Introduction (Improving)</a:t>
+              <a:t>AWS Lambda Elevator Pitch</a:t>
             </a:r>
           </a:p>
         </p:txBody>
@@ -10445,7 +10253,7 @@
           <p:cNvPr id="3" name="Content Placeholder 2">
             <a:extLst>
               <a:ext uri="{FF2B5EF4-FFF2-40B4-BE49-F238E27FC236}">
-                <a16:creationId xmlns:a16="http://schemas.microsoft.com/office/drawing/2014/main" id="{70E434A7-7358-3F4D-B766-3F6626014219}"/>
+                <a16:creationId xmlns:a16="http://schemas.microsoft.com/office/drawing/2014/main" id="{81C062E8-9121-AB4F-AF9B-2487EDB8DE52}"/>
               </a:ext>
             </a:extLst>
           </p:cNvPr>
@@ -10458,87 +10266,126 @@
         </p:nvSpPr>
         <p:spPr/>
         <p:txBody>
-          <a:bodyPr>
-            <a:normAutofit/>
-          </a:bodyPr>
+          <a:bodyPr/>
           <a:lstStyle/>
           <a:p>
             <a:r>
-              <a:rPr lang="en-US" sz="2000" b="1" dirty="0"/>
-              <a:t>Values: Excellence, Involvement, and Dedication</a:t>
-            </a:r>
-            <a:r>
-              <a:rPr lang="en-US" sz="2000" dirty="0"/>
-              <a:t> </a:t>
-            </a:r>
-          </a:p>
-          <a:p>
-            <a:r>
-              <a:rPr lang="en-US" sz="2000" dirty="0"/>
-              <a:t>Complete IT services firm, offering training, consulting, recruiting, and project services</a:t>
-            </a:r>
-          </a:p>
-          <a:p>
-            <a:r>
-              <a:rPr lang="en-US" sz="2000" dirty="0"/>
-              <a:t>Offices in Columbus, Cleveland, Calgary, Minneapolis, Dallas, Houston and College Station</a:t>
-            </a:r>
-          </a:p>
-          <a:p>
-            <a:r>
-              <a:rPr lang="en-US" sz="2000" dirty="0"/>
-              <a:t>Creating a great place to work by </a:t>
+              <a:rPr lang="en-US" dirty="0"/>
+              <a:t>“Serverless” computing…what does this mean?</a:t>
+            </a:r>
+          </a:p>
+          <a:p>
+            <a:r>
+              <a:rPr lang="en-US" dirty="0"/>
+              <a:t>“Run code without thinking about servers”</a:t>
             </a:r>
           </a:p>
           <a:p>
             <a:pPr lvl="1"/>
             <a:r>
-              <a:rPr lang="en-US" sz="1800" dirty="0"/>
-              <a:t>Cultivating an environment that fosters authentic and long term professional relationships </a:t>
+              <a:rPr lang="en-US" dirty="0"/>
+              <a:t>No servers to provision or manage</a:t>
+            </a:r>
+          </a:p>
+          <a:p>
+            <a:pPr lvl="2"/>
+            <a:r>
+              <a:rPr lang="en-US" dirty="0"/>
+              <a:t>Performs all the operational and administrative activities on your behalf</a:t>
             </a:r>
           </a:p>
           <a:p>
             <a:pPr lvl="1"/>
             <a:r>
-              <a:rPr lang="en-US" sz="1800" dirty="0"/>
-              <a:t>Sharing the success and accomplishments of the company </a:t>
+              <a:rPr lang="en-US" dirty="0"/>
+              <a:t>Lambda only runs when triggered</a:t>
             </a:r>
           </a:p>
           <a:p>
             <a:pPr lvl="1"/>
             <a:r>
-              <a:rPr lang="en-US" sz="1800" dirty="0"/>
-              <a:t>Promoting open and honest communication </a:t>
+              <a:rPr lang="en-US" dirty="0"/>
+              <a:t>Uses only the compute resources needed</a:t>
+            </a:r>
+          </a:p>
+          <a:p>
+            <a:pPr lvl="2"/>
+            <a:r>
+              <a:rPr lang="en-US" dirty="0"/>
+              <a:t>Automatic scales up to large number of parallel executions</a:t>
+            </a:r>
+          </a:p>
+          <a:p>
+            <a:pPr lvl="2"/>
+            <a:r>
+              <a:rPr lang="en-US" dirty="0"/>
+              <a:t>Automatic downscaling by terminating execution when function ends</a:t>
             </a:r>
           </a:p>
           <a:p>
             <a:pPr lvl="1"/>
             <a:r>
-              <a:rPr lang="en-US" sz="1800" dirty="0"/>
-              <a:t>Providing creative ways for each of us to learn and grow</a:t>
-            </a:r>
-          </a:p>
-          <a:p>
-            <a:pPr lvl="1"/>
-            <a:r>
-              <a:rPr lang="en-US" sz="1800" dirty="0"/>
-              <a:t>Encouraging a positive atmosphere which is both friendly and fun</a:t>
-            </a:r>
-          </a:p>
-          <a:p>
-            <a:r>
-              <a:rPr lang="en-US" sz="1950" dirty="0">
+              <a:rPr lang="en-US" dirty="0"/>
+              <a:t>Pay as you Go pricing rounded to nearest 100 </a:t>
+            </a:r>
+            <a:r>
+              <a:rPr lang="en-US" dirty="0" err="1"/>
+              <a:t>ms</a:t>
+            </a:r>
+            <a:endParaRPr lang="en-US" dirty="0"/>
+          </a:p>
+          <a:p>
+            <a:pPr lvl="2"/>
+            <a:r>
+              <a:rPr lang="en-US" dirty="0"/>
+              <a:t>Generous free tier: See </a:t>
+            </a:r>
+            <a:r>
+              <a:rPr lang="en-US" dirty="0">
                 <a:hlinkClick r:id="rId2"/>
               </a:rPr>
-              <a:t>http://improving.com</a:t>
-            </a:r>
-            <a:endParaRPr lang="en-US" sz="1950" dirty="0"/>
-          </a:p>
-          <a:p>
-            <a:pPr marL="51435" indent="0">
-              <a:buNone/>
-            </a:pPr>
-            <a:endParaRPr lang="en-US" sz="1950" dirty="0"/>
+              <a:t>https://aws.amazon.com/lambda/pricing/</a:t>
+            </a:r>
+            <a:endParaRPr lang="en-US" dirty="0"/>
+          </a:p>
+          <a:p>
+            <a:pPr lvl="1"/>
+            <a:r>
+              <a:rPr lang="en-US" dirty="0"/>
+              <a:t>Native support for:</a:t>
+            </a:r>
+          </a:p>
+          <a:p>
+            <a:pPr lvl="2"/>
+            <a:r>
+              <a:rPr lang="en-US" dirty="0"/>
+              <a:t>C# with .NET Core 1.0 or 2.0</a:t>
+            </a:r>
+          </a:p>
+          <a:p>
+            <a:pPr lvl="2"/>
+            <a:r>
+              <a:rPr lang="en-US" dirty="0"/>
+              <a:t>Java 8</a:t>
+            </a:r>
+          </a:p>
+          <a:p>
+            <a:pPr lvl="2"/>
+            <a:r>
+              <a:rPr lang="en-US" dirty="0"/>
+              <a:t>NodeJS 6.10 or 8.10</a:t>
+            </a:r>
+          </a:p>
+          <a:p>
+            <a:pPr lvl="2"/>
+            <a:r>
+              <a:rPr lang="en-US" dirty="0"/>
+              <a:t>Python 2.7 or 3.6</a:t>
+            </a:r>
+          </a:p>
+          <a:p>
+            <a:pPr lvl="1"/>
+            <a:endParaRPr lang="en-US" dirty="0"/>
           </a:p>
         </p:txBody>
       </p:sp>
@@ -10547,7 +10394,7 @@
           <p:cNvPr id="4" name="Subtitle 3">
             <a:extLst>
               <a:ext uri="{FF2B5EF4-FFF2-40B4-BE49-F238E27FC236}">
-                <a16:creationId xmlns:a16="http://schemas.microsoft.com/office/drawing/2014/main" id="{0DF9A954-920E-734B-BC6B-DAB19D274AC3}"/>
+                <a16:creationId xmlns:a16="http://schemas.microsoft.com/office/drawing/2014/main" id="{F7F32C62-F1D1-2B4C-85F2-92258682D1CE}"/>
               </a:ext>
             </a:extLst>
           </p:cNvPr>
@@ -10572,7 +10419,7 @@
           <p:cNvPr id="5" name="Footer Placeholder 4">
             <a:extLst>
               <a:ext uri="{FF2B5EF4-FFF2-40B4-BE49-F238E27FC236}">
-                <a16:creationId xmlns:a16="http://schemas.microsoft.com/office/drawing/2014/main" id="{B2C7DCCD-B733-914A-AB9B-8803BCA8771B}"/>
+                <a16:creationId xmlns:a16="http://schemas.microsoft.com/office/drawing/2014/main" id="{AED3FABB-4992-6E43-95FB-C5C28B23D5BF}"/>
               </a:ext>
             </a:extLst>
           </p:cNvPr>
@@ -10601,7 +10448,7 @@
           <p:cNvPr id="6" name="Slide Number Placeholder 5">
             <a:extLst>
               <a:ext uri="{FF2B5EF4-FFF2-40B4-BE49-F238E27FC236}">
-                <a16:creationId xmlns:a16="http://schemas.microsoft.com/office/drawing/2014/main" id="{33C67A40-2014-2441-9229-6743DB3B77D0}"/>
+                <a16:creationId xmlns:a16="http://schemas.microsoft.com/office/drawing/2014/main" id="{0CD66874-E8F4-BB4D-AC40-F55F4D5E6F37}"/>
               </a:ext>
             </a:extLst>
           </p:cNvPr>
@@ -10630,7 +10477,7 @@
     </p:spTree>
     <p:extLst>
       <p:ext uri="{BB962C8B-B14F-4D97-AF65-F5344CB8AC3E}">
-        <p14:creationId xmlns:p14="http://schemas.microsoft.com/office/powerpoint/2010/main" val="2676875404"/>
+        <p14:creationId xmlns:p14="http://schemas.microsoft.com/office/powerpoint/2010/main" val="3715813274"/>
       </p:ext>
     </p:extLst>
   </p:cSld>
@@ -10662,7 +10509,7 @@
           <p:cNvPr id="2" name="Title 1">
             <a:extLst>
               <a:ext uri="{FF2B5EF4-FFF2-40B4-BE49-F238E27FC236}">
-                <a16:creationId xmlns:a16="http://schemas.microsoft.com/office/drawing/2014/main" id="{369CD339-1E2E-944A-8563-AA22857F3965}"/>
+                <a16:creationId xmlns:a16="http://schemas.microsoft.com/office/drawing/2014/main" id="{136A9C2F-85A6-1F48-B084-1DDE61AB24D1}"/>
               </a:ext>
             </a:extLst>
           </p:cNvPr>
@@ -10680,7 +10527,15 @@
           <a:p>
             <a:r>
               <a:rPr lang="en-US" dirty="0"/>
-              <a:t>AWS Lambda Elevator Pitch</a:t>
+              <a:t>Why </a:t>
+            </a:r>
+            <a:r>
+              <a:rPr lang="en-US" dirty="0" err="1"/>
+              <a:t>Kotlin</a:t>
+            </a:r>
+            <a:r>
+              <a:rPr lang="en-US" dirty="0"/>
+              <a:t>?</a:t>
             </a:r>
           </a:p>
         </p:txBody>
@@ -10690,7 +10545,7 @@
           <p:cNvPr id="3" name="Content Placeholder 2">
             <a:extLst>
               <a:ext uri="{FF2B5EF4-FFF2-40B4-BE49-F238E27FC236}">
-                <a16:creationId xmlns:a16="http://schemas.microsoft.com/office/drawing/2014/main" id="{81C062E8-9121-AB4F-AF9B-2487EDB8DE52}"/>
+                <a16:creationId xmlns:a16="http://schemas.microsoft.com/office/drawing/2014/main" id="{F7E7C40A-DF6E-9741-96BE-4CB57A697E02}"/>
               </a:ext>
             </a:extLst>
           </p:cNvPr>
@@ -10703,126 +10558,131 @@
         </p:nvSpPr>
         <p:spPr/>
         <p:txBody>
-          <a:bodyPr/>
+          <a:bodyPr>
+            <a:normAutofit/>
+          </a:bodyPr>
           <a:lstStyle/>
           <a:p>
             <a:r>
               <a:rPr lang="en-US" dirty="0"/>
-              <a:t>“Serverless” computing…what does this mean?</a:t>
-            </a:r>
-          </a:p>
-          <a:p>
+              <a:t>Reason #1: 100% compatibility with Java</a:t>
+            </a:r>
+          </a:p>
+          <a:p>
+            <a:pPr lvl="1"/>
             <a:r>
               <a:rPr lang="en-US" dirty="0"/>
-              <a:t>“Run code without thinking about servers”</a:t>
+              <a:t>Mix and match Java code and </a:t>
+            </a:r>
+            <a:r>
+              <a:rPr lang="en-US" dirty="0" err="1"/>
+              <a:t>Kotlin</a:t>
+            </a:r>
+            <a:r>
+              <a:rPr lang="en-US" dirty="0"/>
+              <a:t> code freely!</a:t>
             </a:r>
           </a:p>
           <a:p>
             <a:pPr lvl="1"/>
             <a:r>
               <a:rPr lang="en-US" dirty="0"/>
-              <a:t>No servers to provision or manage</a:t>
+              <a:t>Demo</a:t>
+            </a:r>
+          </a:p>
+          <a:p>
+            <a:r>
+              <a:rPr lang="en-US" dirty="0"/>
+              <a:t>Reason #2: Code brevity</a:t>
+            </a:r>
+          </a:p>
+          <a:p>
+            <a:pPr lvl="1"/>
+            <a:r>
+              <a:rPr lang="en-US" dirty="0"/>
+              <a:t>Prime example: Data classes</a:t>
             </a:r>
           </a:p>
           <a:p>
             <a:pPr lvl="2"/>
             <a:r>
               <a:rPr lang="en-US" dirty="0"/>
-              <a:t>Performs all the operational and administrative activities on your behalf</a:t>
-            </a:r>
+              <a:t>No more writing getters/setters/</a:t>
+            </a:r>
+            <a:r>
+              <a:rPr lang="en-US" dirty="0" err="1"/>
+              <a:t>hashCode</a:t>
+            </a:r>
+            <a:r>
+              <a:rPr lang="en-US" dirty="0"/>
+              <a:t>/equals/</a:t>
+            </a:r>
+            <a:r>
+              <a:rPr lang="en-US" dirty="0" err="1"/>
+              <a:t>toString</a:t>
+            </a:r>
+            <a:r>
+              <a:rPr lang="en-US" dirty="0"/>
+              <a:t>()</a:t>
+            </a:r>
+          </a:p>
+          <a:p>
+            <a:pPr lvl="2"/>
+            <a:r>
+              <a:rPr lang="en-US" dirty="0"/>
+              <a:t>JSON serialization is coming: </a:t>
+            </a:r>
+            <a:r>
+              <a:rPr lang="en-US" dirty="0">
+                <a:hlinkClick r:id="rId3"/>
+              </a:rPr>
+              <a:t>https://github.com/Kotlin/kotlinx.serialization</a:t>
+            </a:r>
+            <a:endParaRPr lang="en-US" dirty="0"/>
           </a:p>
           <a:p>
             <a:pPr lvl="1"/>
             <a:r>
               <a:rPr lang="en-US" dirty="0"/>
-              <a:t>Lambda only runs when triggered</a:t>
+              <a:t>Demo</a:t>
+            </a:r>
+          </a:p>
+          <a:p>
+            <a:r>
+              <a:rPr lang="en-US" dirty="0"/>
+              <a:t>Reason #3: Ecosystem support</a:t>
             </a:r>
           </a:p>
           <a:p>
             <a:pPr lvl="1"/>
             <a:r>
               <a:rPr lang="en-US" dirty="0"/>
-              <a:t>Uses only the compute resources needed</a:t>
+              <a:t>IntelliJ IDEA</a:t>
+            </a:r>
+          </a:p>
+          <a:p>
+            <a:pPr lvl="1"/>
+            <a:r>
+              <a:rPr lang="en-US" dirty="0"/>
+              <a:t>Spring Framework 5.0</a:t>
             </a:r>
           </a:p>
           <a:p>
             <a:pPr lvl="2"/>
             <a:r>
+              <a:rPr lang="en-US" dirty="0">
+                <a:hlinkClick r:id="rId4"/>
+              </a:rPr>
+              <a:t>https://spring.io/blog/2017/01/04/introducing-kotlin-support-in-spring-framework-5-0</a:t>
+            </a:r>
+            <a:endParaRPr lang="en-US" dirty="0"/>
+          </a:p>
+          <a:p>
+            <a:pPr lvl="1"/>
+            <a:r>
               <a:rPr lang="en-US" dirty="0"/>
-              <a:t>Automatic scales up to large number of parallel executions</a:t>
-            </a:r>
-          </a:p>
-          <a:p>
-            <a:pPr lvl="2"/>
-            <a:r>
-              <a:rPr lang="en-US" dirty="0"/>
-              <a:t>Automatic downscaling by terminating execution when function ends</a:t>
-            </a:r>
-          </a:p>
-          <a:p>
-            <a:pPr lvl="1"/>
-            <a:r>
-              <a:rPr lang="en-US" dirty="0"/>
-              <a:t>Pay as you Go pricing rounded to nearest 100 </a:t>
-            </a:r>
-            <a:r>
-              <a:rPr lang="en-US" dirty="0" err="1"/>
-              <a:t>ms</a:t>
-            </a:r>
-            <a:endParaRPr lang="en-US" dirty="0"/>
-          </a:p>
-          <a:p>
-            <a:pPr lvl="2"/>
-            <a:r>
-              <a:rPr lang="en-US" dirty="0"/>
-              <a:t>Generous free tier: See </a:t>
-            </a:r>
-            <a:r>
-              <a:rPr lang="en-US" dirty="0">
-                <a:hlinkClick r:id="rId2"/>
-              </a:rPr>
-              <a:t>https://aws.amazon.com/lambda/pricing/</a:t>
-            </a:r>
-            <a:endParaRPr lang="en-US" dirty="0"/>
-          </a:p>
-          <a:p>
-            <a:pPr lvl="1"/>
-            <a:r>
-              <a:rPr lang="en-US" dirty="0"/>
-              <a:t>Native support for:</a:t>
-            </a:r>
-          </a:p>
-          <a:p>
-            <a:pPr lvl="2"/>
-            <a:r>
-              <a:rPr lang="en-US" dirty="0"/>
-              <a:t>C# with .NET Core 1.0 or 2.0</a:t>
-            </a:r>
-          </a:p>
-          <a:p>
-            <a:pPr lvl="2"/>
-            <a:r>
-              <a:rPr lang="en-US" dirty="0"/>
-              <a:t>Java 8</a:t>
-            </a:r>
-          </a:p>
-          <a:p>
-            <a:pPr lvl="2"/>
-            <a:r>
-              <a:rPr lang="en-US" dirty="0"/>
-              <a:t>NodeJS 6.10 or 8.10</a:t>
-            </a:r>
-          </a:p>
-          <a:p>
-            <a:pPr lvl="2"/>
-            <a:r>
-              <a:rPr lang="en-US" dirty="0"/>
-              <a:t>Python 2.7 or 3.6</a:t>
-            </a:r>
-          </a:p>
-          <a:p>
-            <a:pPr lvl="1"/>
-            <a:endParaRPr lang="en-US" dirty="0"/>
+              <a:t>Android</a:t>
+            </a:r>
           </a:p>
         </p:txBody>
       </p:sp>
@@ -10831,7 +10691,7 @@
           <p:cNvPr id="4" name="Subtitle 3">
             <a:extLst>
               <a:ext uri="{FF2B5EF4-FFF2-40B4-BE49-F238E27FC236}">
-                <a16:creationId xmlns:a16="http://schemas.microsoft.com/office/drawing/2014/main" id="{F7F32C62-F1D1-2B4C-85F2-92258682D1CE}"/>
+                <a16:creationId xmlns:a16="http://schemas.microsoft.com/office/drawing/2014/main" id="{452221BF-98F6-934D-84FC-A5C3EACB4147}"/>
               </a:ext>
             </a:extLst>
           </p:cNvPr>
@@ -10856,7 +10716,7 @@
           <p:cNvPr id="5" name="Footer Placeholder 4">
             <a:extLst>
               <a:ext uri="{FF2B5EF4-FFF2-40B4-BE49-F238E27FC236}">
-                <a16:creationId xmlns:a16="http://schemas.microsoft.com/office/drawing/2014/main" id="{AED3FABB-4992-6E43-95FB-C5C28B23D5BF}"/>
+                <a16:creationId xmlns:a16="http://schemas.microsoft.com/office/drawing/2014/main" id="{23751EEB-57C6-024E-B90E-03EBDCB2F94C}"/>
               </a:ext>
             </a:extLst>
           </p:cNvPr>
@@ -10885,7 +10745,7 @@
           <p:cNvPr id="6" name="Slide Number Placeholder 5">
             <a:extLst>
               <a:ext uri="{FF2B5EF4-FFF2-40B4-BE49-F238E27FC236}">
-                <a16:creationId xmlns:a16="http://schemas.microsoft.com/office/drawing/2014/main" id="{0CD66874-E8F4-BB4D-AC40-F55F4D5E6F37}"/>
+                <a16:creationId xmlns:a16="http://schemas.microsoft.com/office/drawing/2014/main" id="{621FAAC5-FC95-C843-ADEA-B9D8D66A0CAA}"/>
               </a:ext>
             </a:extLst>
           </p:cNvPr>
@@ -10914,7 +10774,7 @@
     </p:spTree>
     <p:extLst>
       <p:ext uri="{BB962C8B-B14F-4D97-AF65-F5344CB8AC3E}">
-        <p14:creationId xmlns:p14="http://schemas.microsoft.com/office/powerpoint/2010/main" val="3715813274"/>
+        <p14:creationId xmlns:p14="http://schemas.microsoft.com/office/powerpoint/2010/main" val="2410272699"/>
       </p:ext>
     </p:extLst>
   </p:cSld>
@@ -10946,7 +10806,7 @@
           <p:cNvPr id="2" name="Title 1">
             <a:extLst>
               <a:ext uri="{FF2B5EF4-FFF2-40B4-BE49-F238E27FC236}">
-                <a16:creationId xmlns:a16="http://schemas.microsoft.com/office/drawing/2014/main" id="{136A9C2F-85A6-1F48-B084-1DDE61AB24D1}"/>
+                <a16:creationId xmlns:a16="http://schemas.microsoft.com/office/drawing/2014/main" id="{22AE005E-2764-DA4D-8B29-5547B81AB2FA}"/>
               </a:ext>
             </a:extLst>
           </p:cNvPr>
@@ -10982,7 +10842,7 @@
           <p:cNvPr id="3" name="Content Placeholder 2">
             <a:extLst>
               <a:ext uri="{FF2B5EF4-FFF2-40B4-BE49-F238E27FC236}">
-                <a16:creationId xmlns:a16="http://schemas.microsoft.com/office/drawing/2014/main" id="{F7E7C40A-DF6E-9741-96BE-4CB57A697E02}"/>
+                <a16:creationId xmlns:a16="http://schemas.microsoft.com/office/drawing/2014/main" id="{910A520C-7947-094A-81DA-E71851EC052D}"/>
               </a:ext>
             </a:extLst>
           </p:cNvPr>
@@ -11001,141 +10861,89 @@
           <a:lstStyle/>
           <a:p>
             <a:r>
-              <a:rPr lang="en-US" dirty="0"/>
-              <a:t>Reason #1: 100% compatibility with Java</a:t>
+              <a:rPr lang="en-US" sz="2800" dirty="0"/>
+              <a:t>So, how do I learn?</a:t>
             </a:r>
           </a:p>
           <a:p>
             <a:pPr lvl="1"/>
             <a:r>
-              <a:rPr lang="en-US" dirty="0"/>
-              <a:t>Mix and match Java code and </a:t>
-            </a:r>
-            <a:r>
-              <a:rPr lang="en-US" dirty="0" err="1"/>
+              <a:rPr lang="en-US" sz="2400" dirty="0"/>
+              <a:t>Documentation</a:t>
+            </a:r>
+          </a:p>
+          <a:p>
+            <a:pPr lvl="2"/>
+            <a:r>
+              <a:rPr lang="en-US" sz="2000" dirty="0">
+                <a:hlinkClick r:id="rId2"/>
+              </a:rPr>
+              <a:t>https://kotlinlang.org/docs/reference/</a:t>
+            </a:r>
+            <a:endParaRPr lang="en-US" sz="2000" dirty="0"/>
+          </a:p>
+          <a:p>
+            <a:pPr lvl="1"/>
+            <a:r>
+              <a:rPr lang="en-US" sz="2400" dirty="0" err="1"/>
               <a:t>Kotlin</a:t>
             </a:r>
             <a:r>
-              <a:rPr lang="en-US" dirty="0"/>
-              <a:t> code freely!</a:t>
-            </a:r>
-          </a:p>
-          <a:p>
-            <a:pPr lvl="1"/>
-            <a:r>
-              <a:rPr lang="en-US" dirty="0"/>
-              <a:t>Demo</a:t>
-            </a:r>
-          </a:p>
-          <a:p>
-            <a:r>
-              <a:rPr lang="en-US" dirty="0"/>
-              <a:t>Reason #2: Code brevity</a:t>
-            </a:r>
-          </a:p>
-          <a:p>
-            <a:pPr lvl="1"/>
-            <a:r>
-              <a:rPr lang="en-US" dirty="0"/>
-              <a:t>Prime example: Data classes</a:t>
-            </a:r>
+              <a:rPr lang="en-US" sz="2400" dirty="0"/>
+              <a:t> </a:t>
+            </a:r>
+            <a:r>
+              <a:rPr lang="en-US" sz="2400" dirty="0" err="1"/>
+              <a:t>Koans</a:t>
+            </a:r>
+            <a:endParaRPr lang="en-US" sz="2400" dirty="0"/>
           </a:p>
           <a:p>
             <a:pPr lvl="2"/>
             <a:r>
-              <a:rPr lang="en-US" dirty="0"/>
-              <a:t>No more writing getters/setters/</a:t>
-            </a:r>
-            <a:r>
-              <a:rPr lang="en-US" dirty="0" err="1"/>
-              <a:t>hashCode</a:t>
-            </a:r>
-            <a:r>
-              <a:rPr lang="en-US" dirty="0"/>
-              <a:t>/equals/</a:t>
-            </a:r>
-            <a:r>
-              <a:rPr lang="en-US" dirty="0" err="1"/>
-              <a:t>toString</a:t>
-            </a:r>
-            <a:r>
-              <a:rPr lang="en-US" dirty="0"/>
-              <a:t>()</a:t>
+              <a:rPr lang="en-US" sz="2000" dirty="0"/>
+              <a:t>Completely online, no local tools necessary</a:t>
             </a:r>
           </a:p>
           <a:p>
             <a:pPr lvl="2"/>
             <a:r>
-              <a:rPr lang="en-US" dirty="0"/>
-              <a:t>JSON serialization is coming: </a:t>
-            </a:r>
-            <a:r>
-              <a:rPr lang="en-US" dirty="0">
+              <a:rPr lang="en-US" sz="2000" dirty="0">
                 <a:hlinkClick r:id="rId3"/>
               </a:rPr>
-              <a:t>https://github.com/Kotlin/kotlinx.serialization</a:t>
-            </a:r>
-            <a:endParaRPr lang="en-US" dirty="0"/>
+              <a:t>https://try.kotlinlang.org/</a:t>
+            </a:r>
+            <a:endParaRPr lang="en-US" sz="2000" dirty="0"/>
           </a:p>
           <a:p>
             <a:pPr lvl="1"/>
             <a:r>
-              <a:rPr lang="en-US" dirty="0"/>
-              <a:t>Demo</a:t>
-            </a:r>
-          </a:p>
-          <a:p>
-            <a:r>
-              <a:rPr lang="en-US" dirty="0"/>
-              <a:t>Reason #3: Ecosystem support</a:t>
-            </a:r>
-          </a:p>
-          <a:p>
-            <a:pPr lvl="1"/>
-            <a:r>
-              <a:rPr lang="en-US" dirty="0"/>
-              <a:t>Spring Framework 5.0</a:t>
-            </a:r>
+              <a:rPr lang="en-US" sz="2000" dirty="0"/>
+              <a:t>Pick a project or challenge and implement it in </a:t>
+            </a:r>
+            <a:r>
+              <a:rPr lang="en-US" sz="2000" dirty="0" err="1"/>
+              <a:t>Kotlin</a:t>
+            </a:r>
+            <a:endParaRPr lang="en-US" sz="2000" dirty="0"/>
           </a:p>
           <a:p>
             <a:pPr lvl="2"/>
             <a:r>
-              <a:rPr lang="en-US" dirty="0">
+              <a:rPr lang="en-US" sz="2000" dirty="0"/>
+              <a:t>Advent of Code - </a:t>
+            </a:r>
+            <a:r>
+              <a:rPr lang="en-US" sz="2000" dirty="0">
                 <a:hlinkClick r:id="rId4"/>
               </a:rPr>
-              <a:t>https://spring.io/blog/2017/01/04/introducing-kotlin-support-in-spring-framework-5-0</a:t>
-            </a:r>
-            <a:endParaRPr lang="en-US" dirty="0"/>
-          </a:p>
-          <a:p>
-            <a:pPr lvl="1"/>
-            <a:r>
-              <a:rPr lang="en-US" dirty="0"/>
-              <a:t>Android</a:t>
-            </a:r>
-          </a:p>
-          <a:p>
-            <a:pPr lvl="1"/>
-            <a:r>
-              <a:rPr lang="en-US" dirty="0"/>
-              <a:t>IntelliJ IDEA</a:t>
-            </a:r>
+              <a:t>http://adventofcode.com</a:t>
+            </a:r>
+            <a:endParaRPr lang="en-US" sz="2000" dirty="0"/>
           </a:p>
           <a:p>
             <a:pPr lvl="2"/>
-            <a:r>
-              <a:rPr lang="en-US" dirty="0"/>
-              <a:t>Bonus: Convert Java to </a:t>
-            </a:r>
-            <a:r>
-              <a:rPr lang="en-US" dirty="0" err="1"/>
-              <a:t>Kotlin</a:t>
-            </a:r>
-            <a:endParaRPr lang="en-US" dirty="0"/>
-          </a:p>
-          <a:p>
-            <a:pPr lvl="1"/>
-            <a:endParaRPr lang="en-US" dirty="0"/>
+            <a:endParaRPr lang="en-US" sz="2000" dirty="0"/>
           </a:p>
         </p:txBody>
       </p:sp>
@@ -11144,7 +10952,7 @@
           <p:cNvPr id="4" name="Subtitle 3">
             <a:extLst>
               <a:ext uri="{FF2B5EF4-FFF2-40B4-BE49-F238E27FC236}">
-                <a16:creationId xmlns:a16="http://schemas.microsoft.com/office/drawing/2014/main" id="{452221BF-98F6-934D-84FC-A5C3EACB4147}"/>
+                <a16:creationId xmlns:a16="http://schemas.microsoft.com/office/drawing/2014/main" id="{CB326C52-2385-074C-AD86-6059FA534673}"/>
               </a:ext>
             </a:extLst>
           </p:cNvPr>
@@ -11169,7 +10977,7 @@
           <p:cNvPr id="5" name="Footer Placeholder 4">
             <a:extLst>
               <a:ext uri="{FF2B5EF4-FFF2-40B4-BE49-F238E27FC236}">
-                <a16:creationId xmlns:a16="http://schemas.microsoft.com/office/drawing/2014/main" id="{23751EEB-57C6-024E-B90E-03EBDCB2F94C}"/>
+                <a16:creationId xmlns:a16="http://schemas.microsoft.com/office/drawing/2014/main" id="{5D37C899-C7E9-CB47-9A81-7259E1E4715A}"/>
               </a:ext>
             </a:extLst>
           </p:cNvPr>
@@ -11187,7 +10995,7 @@
           <a:p>
             <a:r>
               <a:rPr lang="en-US"/>
-              <a:t>AWS Java Lambda Functions with Kotlin</a:t>
+              <a:t>Dogs and Cats, Living Together: Kotlin, Spring Boot and REST on Azure</a:t>
             </a:r>
             <a:endParaRPr lang="en-US" dirty="0"/>
           </a:p>
@@ -11198,7 +11006,7 @@
           <p:cNvPr id="6" name="Slide Number Placeholder 5">
             <a:extLst>
               <a:ext uri="{FF2B5EF4-FFF2-40B4-BE49-F238E27FC236}">
-                <a16:creationId xmlns:a16="http://schemas.microsoft.com/office/drawing/2014/main" id="{621FAAC5-FC95-C843-ADEA-B9D8D66A0CAA}"/>
+                <a16:creationId xmlns:a16="http://schemas.microsoft.com/office/drawing/2014/main" id="{DF19A58A-0FC0-4742-9E7C-6F8A0FE0A386}"/>
               </a:ext>
             </a:extLst>
           </p:cNvPr>
@@ -11227,7 +11035,7 @@
     </p:spTree>
     <p:extLst>
       <p:ext uri="{BB962C8B-B14F-4D97-AF65-F5344CB8AC3E}">
-        <p14:creationId xmlns:p14="http://schemas.microsoft.com/office/powerpoint/2010/main" val="2410272699"/>
+        <p14:creationId xmlns:p14="http://schemas.microsoft.com/office/powerpoint/2010/main" val="1807632402"/>
       </p:ext>
     </p:extLst>
   </p:cSld>
@@ -11259,7 +11067,7 @@
           <p:cNvPr id="2" name="Title 1">
             <a:extLst>
               <a:ext uri="{FF2B5EF4-FFF2-40B4-BE49-F238E27FC236}">
-                <a16:creationId xmlns:a16="http://schemas.microsoft.com/office/drawing/2014/main" id="{22AE005E-2764-DA4D-8B29-5547B81AB2FA}"/>
+                <a16:creationId xmlns:a16="http://schemas.microsoft.com/office/drawing/2014/main" id="{6076743A-6C42-8644-AA7A-4FE77DBCC4B9}"/>
               </a:ext>
             </a:extLst>
           </p:cNvPr>
@@ -11272,20 +11080,14 @@
         </p:nvSpPr>
         <p:spPr/>
         <p:txBody>
-          <a:bodyPr/>
+          <a:bodyPr>
+            <a:noAutofit/>
+          </a:bodyPr>
           <a:lstStyle/>
           <a:p>
             <a:r>
               <a:rPr lang="en-US" dirty="0"/>
-              <a:t>Why </a:t>
-            </a:r>
-            <a:r>
-              <a:rPr lang="en-US" dirty="0" err="1"/>
-              <a:t>Kotlin</a:t>
-            </a:r>
-            <a:r>
-              <a:rPr lang="en-US" dirty="0"/>
-              <a:t>?</a:t>
+              <a:t>So, how do we do this?</a:t>
             </a:r>
           </a:p>
         </p:txBody>
@@ -11295,7 +11097,7 @@
           <p:cNvPr id="3" name="Content Placeholder 2">
             <a:extLst>
               <a:ext uri="{FF2B5EF4-FFF2-40B4-BE49-F238E27FC236}">
-                <a16:creationId xmlns:a16="http://schemas.microsoft.com/office/drawing/2014/main" id="{910A520C-7947-094A-81DA-E71851EC052D}"/>
+                <a16:creationId xmlns:a16="http://schemas.microsoft.com/office/drawing/2014/main" id="{DE306633-5D07-9B44-AD8F-EED4A2BC5A65}"/>
               </a:ext>
             </a:extLst>
           </p:cNvPr>
@@ -11304,6 +11106,183 @@
           </p:cNvSpPr>
           <p:nvPr>
             <p:ph idx="1"/>
+          </p:nvPr>
+        </p:nvSpPr>
+        <p:spPr/>
+        <p:txBody>
+          <a:bodyPr>
+            <a:normAutofit lnSpcReduction="10000"/>
+          </a:bodyPr>
+          <a:lstStyle/>
+          <a:p>
+            <a:pPr marL="51435" indent="0">
+              <a:buNone/>
+            </a:pPr>
+            <a:r>
+              <a:rPr lang="en-US" sz="2000" dirty="0"/>
+              <a:t>First, some prerequisites, recommendations and tips</a:t>
+            </a:r>
+          </a:p>
+          <a:p>
+            <a:r>
+              <a:rPr lang="en-US" sz="2000" dirty="0"/>
+              <a:t>Install </a:t>
+            </a:r>
+            <a:r>
+              <a:rPr lang="en-US" sz="2000" b="1" dirty="0"/>
+              <a:t>AWS CLI</a:t>
+            </a:r>
+          </a:p>
+          <a:p>
+            <a:pPr lvl="1"/>
+            <a:r>
+              <a:rPr lang="en-US" sz="1850" dirty="0">
+                <a:hlinkClick r:id="rId3"/>
+              </a:rPr>
+              <a:t>https://aws.amazon.com/cli/</a:t>
+            </a:r>
+            <a:endParaRPr lang="en-US" sz="1850" dirty="0"/>
+          </a:p>
+          <a:p>
+            <a:pPr lvl="2"/>
+            <a:r>
+              <a:rPr lang="en-US" sz="1700" dirty="0"/>
+              <a:t>Windows version uses Windows installer</a:t>
+            </a:r>
+          </a:p>
+          <a:p>
+            <a:pPr lvl="2"/>
+            <a:r>
+              <a:rPr lang="en-US" sz="1700" dirty="0"/>
+              <a:t>Mac OS version requires Python and pip (use pip3 if using Python 3)</a:t>
+            </a:r>
+          </a:p>
+          <a:p>
+            <a:r>
+              <a:rPr lang="en-US" sz="2000" dirty="0"/>
+              <a:t>Use </a:t>
+            </a:r>
+            <a:r>
+              <a:rPr lang="en-US" sz="2000" b="1" dirty="0"/>
+              <a:t>Postman</a:t>
+            </a:r>
+            <a:r>
+              <a:rPr lang="en-US" sz="2000" dirty="0"/>
+              <a:t> for REST API testing</a:t>
+            </a:r>
+          </a:p>
+          <a:p>
+            <a:pPr lvl="1"/>
+            <a:r>
+              <a:rPr lang="en-US" sz="1850" dirty="0">
+                <a:hlinkClick r:id="rId4"/>
+              </a:rPr>
+              <a:t>https://www.getpostman.com/apps</a:t>
+            </a:r>
+            <a:endParaRPr lang="en-US" sz="1850" dirty="0"/>
+          </a:p>
+          <a:p>
+            <a:r>
+              <a:rPr lang="en-US" sz="2000" dirty="0"/>
+              <a:t>Use </a:t>
+            </a:r>
+            <a:r>
+              <a:rPr lang="en-US" sz="2000" b="1" dirty="0" err="1"/>
+              <a:t>sdkman</a:t>
+            </a:r>
+            <a:r>
+              <a:rPr lang="en-US" sz="2000" dirty="0"/>
+              <a:t> to manage and use multiple </a:t>
+            </a:r>
+            <a:r>
+              <a:rPr lang="en-US" sz="2000" dirty="0" err="1"/>
+              <a:t>gradle</a:t>
+            </a:r>
+            <a:r>
+              <a:rPr lang="en-US" sz="2000" dirty="0"/>
+              <a:t> / </a:t>
+            </a:r>
+            <a:r>
+              <a:rPr lang="en-US" sz="2000" dirty="0" err="1"/>
+              <a:t>kotlin</a:t>
+            </a:r>
+            <a:r>
+              <a:rPr lang="en-US" sz="2000" dirty="0"/>
+              <a:t> / maven versions</a:t>
+            </a:r>
+          </a:p>
+          <a:p>
+            <a:pPr lvl="1"/>
+            <a:r>
+              <a:rPr lang="en-US" sz="1800" dirty="0">
+                <a:hlinkClick r:id="rId5"/>
+              </a:rPr>
+              <a:t>http://sdkman.io</a:t>
+            </a:r>
+            <a:endParaRPr lang="en-US" sz="1800" dirty="0"/>
+          </a:p>
+          <a:p>
+            <a:r>
+              <a:rPr lang="en-US" sz="2000" dirty="0"/>
+              <a:t>Use </a:t>
+            </a:r>
+            <a:r>
+              <a:rPr lang="en-US" sz="2000" dirty="0" err="1"/>
+              <a:t>gradle</a:t>
+            </a:r>
+            <a:r>
+              <a:rPr lang="en-US" sz="2000" dirty="0"/>
+              <a:t> wrapper inside Gradle based projects (demo soon)</a:t>
+            </a:r>
+          </a:p>
+          <a:p>
+            <a:r>
+              <a:rPr lang="en-US" sz="2000" dirty="0"/>
+              <a:t>Install a clipboard manager</a:t>
+            </a:r>
+          </a:p>
+          <a:p>
+            <a:pPr lvl="1"/>
+            <a:r>
+              <a:rPr lang="en-US" sz="1800" dirty="0"/>
+              <a:t>I like </a:t>
+            </a:r>
+            <a:r>
+              <a:rPr lang="en-US" sz="1800" b="1" dirty="0" err="1"/>
+              <a:t>Copy’em</a:t>
+            </a:r>
+            <a:r>
+              <a:rPr lang="en-US" sz="1800" b="1" dirty="0"/>
+              <a:t> Paste </a:t>
+            </a:r>
+            <a:r>
+              <a:rPr lang="en-US" sz="1800" dirty="0"/>
+              <a:t>- </a:t>
+            </a:r>
+            <a:r>
+              <a:rPr lang="en-US" sz="1800" dirty="0">
+                <a:hlinkClick r:id="rId6"/>
+              </a:rPr>
+              <a:t>https://goo.gl/MwSrkA</a:t>
+            </a:r>
+            <a:endParaRPr lang="en-US" sz="1800" dirty="0"/>
+          </a:p>
+        </p:txBody>
+      </p:sp>
+      <p:sp>
+        <p:nvSpPr>
+          <p:cNvPr id="4" name="Subtitle 3">
+            <a:extLst>
+              <a:ext uri="{FF2B5EF4-FFF2-40B4-BE49-F238E27FC236}">
+                <a16:creationId xmlns:a16="http://schemas.microsoft.com/office/drawing/2014/main" id="{3A7FC29D-DE93-D640-8034-41978FD492C6}"/>
+              </a:ext>
+            </a:extLst>
+          </p:cNvPr>
+          <p:cNvSpPr>
+            <a:spLocks noGrp="1"/>
+          </p:cNvSpPr>
+          <p:nvPr>
+            <p:ph type="subTitle" idx="12"/>
           </p:nvPr>
         </p:nvSpPr>
         <p:spPr/>
@@ -11313,99 +11292,16 @@
           </a:bodyPr>
           <a:lstStyle/>
           <a:p>
-            <a:r>
-              <a:rPr lang="en-US" sz="2800" dirty="0"/>
-              <a:t>So, how do I learn?</a:t>
-            </a:r>
-          </a:p>
-          <a:p>
-            <a:pPr lvl="1"/>
-            <a:r>
-              <a:rPr lang="en-US" sz="2400" dirty="0"/>
-              <a:t>Documentation</a:t>
-            </a:r>
-          </a:p>
-          <a:p>
-            <a:pPr lvl="2"/>
-            <a:r>
-              <a:rPr lang="en-US" sz="2000" dirty="0">
-                <a:hlinkClick r:id="rId2"/>
-              </a:rPr>
-              <a:t>https://kotlinlang.org/docs/reference/</a:t>
-            </a:r>
-            <a:endParaRPr lang="en-US" sz="2000" dirty="0"/>
-          </a:p>
-          <a:p>
-            <a:pPr lvl="1"/>
-            <a:r>
-              <a:rPr lang="en-US" sz="2400" dirty="0" err="1"/>
-              <a:t>Kotlin</a:t>
-            </a:r>
-            <a:r>
-              <a:rPr lang="en-US" sz="2400" dirty="0"/>
-              <a:t> </a:t>
-            </a:r>
-            <a:r>
-              <a:rPr lang="en-US" sz="2400" dirty="0" err="1"/>
-              <a:t>Koans</a:t>
-            </a:r>
-            <a:endParaRPr lang="en-US" sz="2400" dirty="0"/>
-          </a:p>
-          <a:p>
-            <a:pPr lvl="2"/>
-            <a:r>
-              <a:rPr lang="en-US" sz="2000" dirty="0"/>
-              <a:t>Completely online, no local tools necessary</a:t>
-            </a:r>
-          </a:p>
-          <a:p>
-            <a:pPr lvl="2"/>
-            <a:r>
-              <a:rPr lang="en-US" sz="2000" dirty="0">
-                <a:hlinkClick r:id="rId3"/>
-              </a:rPr>
-              <a:t>https://try.kotlinlang.org/</a:t>
-            </a:r>
-            <a:endParaRPr lang="en-US" sz="2000" dirty="0"/>
-          </a:p>
-          <a:p>
-            <a:pPr lvl="1"/>
-            <a:r>
-              <a:rPr lang="en-US" sz="2000" dirty="0"/>
-              <a:t>Pick a project or challenge and implement it in </a:t>
-            </a:r>
-            <a:r>
-              <a:rPr lang="en-US" sz="2000" dirty="0" err="1"/>
-              <a:t>Kotlin</a:t>
-            </a:r>
-            <a:endParaRPr lang="en-US" sz="2000" dirty="0"/>
-          </a:p>
-          <a:p>
-            <a:pPr lvl="2"/>
-            <a:r>
-              <a:rPr lang="en-US" sz="2000" dirty="0"/>
-              <a:t>Advent of Code - </a:t>
-            </a:r>
-            <a:r>
-              <a:rPr lang="en-US" sz="2000" dirty="0">
-                <a:hlinkClick r:id="rId4"/>
-              </a:rPr>
-              <a:t>http://adventofcode.com</a:t>
-            </a:r>
-            <a:endParaRPr lang="en-US" sz="2000" dirty="0"/>
-          </a:p>
-          <a:p>
-            <a:pPr lvl="2"/>
-            <a:endParaRPr lang="en-US" sz="2000" dirty="0"/>
-          </a:p>
-        </p:txBody>
-      </p:sp>
-      <p:sp>
-        <p:nvSpPr>
-          <p:cNvPr id="4" name="Subtitle 3">
+            <a:endParaRPr lang="en-US" sz="2000"/>
+          </a:p>
+        </p:txBody>
+      </p:sp>
+      <p:sp>
+        <p:nvSpPr>
+          <p:cNvPr id="5" name="Footer Placeholder 4">
             <a:extLst>
               <a:ext uri="{FF2B5EF4-FFF2-40B4-BE49-F238E27FC236}">
-                <a16:creationId xmlns:a16="http://schemas.microsoft.com/office/drawing/2014/main" id="{CB326C52-2385-074C-AD86-6059FA534673}"/>
+                <a16:creationId xmlns:a16="http://schemas.microsoft.com/office/drawing/2014/main" id="{1CDD5634-CB80-2D45-A34C-24C66E6127AA}"/>
               </a:ext>
             </a:extLst>
           </p:cNvPr>
@@ -11413,7 +11309,7 @@
             <a:spLocks noGrp="1"/>
           </p:cNvSpPr>
           <p:nvPr>
-            <p:ph type="subTitle" idx="12"/>
+            <p:ph type="ftr" sz="quarter" idx="3"/>
           </p:nvPr>
         </p:nvSpPr>
         <p:spPr/>
@@ -11421,16 +11317,20 @@
           <a:bodyPr/>
           <a:lstStyle/>
           <a:p>
-            <a:endParaRPr lang="en-US"/>
-          </a:p>
-        </p:txBody>
-      </p:sp>
-      <p:sp>
-        <p:nvSpPr>
-          <p:cNvPr id="5" name="Footer Placeholder 4">
+            <a:r>
+              <a:rPr lang="en-US" sz="1600"/>
+              <a:t>AWS Java Lambda Functions with Kotlin</a:t>
+            </a:r>
+            <a:endParaRPr lang="en-US" sz="1600" dirty="0"/>
+          </a:p>
+        </p:txBody>
+      </p:sp>
+      <p:sp>
+        <p:nvSpPr>
+          <p:cNvPr id="6" name="Slide Number Placeholder 5">
             <a:extLst>
               <a:ext uri="{FF2B5EF4-FFF2-40B4-BE49-F238E27FC236}">
-                <a16:creationId xmlns:a16="http://schemas.microsoft.com/office/drawing/2014/main" id="{5D37C899-C7E9-CB47-9A81-7259E1E4715A}"/>
+                <a16:creationId xmlns:a16="http://schemas.microsoft.com/office/drawing/2014/main" id="{865CA060-3F57-694F-9B42-08335B8611F0}"/>
               </a:ext>
             </a:extLst>
           </p:cNvPr>
@@ -11438,7 +11338,7 @@
             <a:spLocks noGrp="1"/>
           </p:cNvSpPr>
           <p:nvPr>
-            <p:ph type="ftr" sz="quarter" idx="3"/>
+            <p:ph type="sldNum" sz="quarter" idx="4"/>
           </p:nvPr>
         </p:nvSpPr>
         <p:spPr/>
@@ -11446,49 +11346,20 @@
           <a:bodyPr/>
           <a:lstStyle/>
           <a:p>
-            <a:r>
-              <a:rPr lang="en-US"/>
-              <a:t>Dogs and Cats, Living Together: Kotlin, Spring Boot and REST on Azure</a:t>
-            </a:r>
-            <a:endParaRPr lang="en-US" dirty="0"/>
-          </a:p>
-        </p:txBody>
-      </p:sp>
-      <p:sp>
-        <p:nvSpPr>
-          <p:cNvPr id="6" name="Slide Number Placeholder 5">
-            <a:extLst>
-              <a:ext uri="{FF2B5EF4-FFF2-40B4-BE49-F238E27FC236}">
-                <a16:creationId xmlns:a16="http://schemas.microsoft.com/office/drawing/2014/main" id="{DF19A58A-0FC0-4742-9E7C-6F8A0FE0A386}"/>
-              </a:ext>
-            </a:extLst>
-          </p:cNvPr>
-          <p:cNvSpPr>
-            <a:spLocks noGrp="1"/>
-          </p:cNvSpPr>
-          <p:nvPr>
-            <p:ph type="sldNum" sz="quarter" idx="4"/>
-          </p:nvPr>
-        </p:nvSpPr>
-        <p:spPr/>
-        <p:txBody>
-          <a:bodyPr/>
-          <a:lstStyle/>
-          <a:p>
             <a:pPr algn="l"/>
             <a:fld id="{ABCABC6B-F667-1540-8370-D056DC2C0FCE}" type="slidenum">
-              <a:rPr lang="en-US" smtClean="0"/>
+              <a:rPr lang="en-US" sz="1600" smtClean="0"/>
               <a:pPr algn="l"/>
               <a:t>9</a:t>
             </a:fld>
-            <a:endParaRPr lang="en-US" dirty="0"/>
+            <a:endParaRPr lang="en-US" sz="1600" dirty="0"/>
           </a:p>
         </p:txBody>
       </p:sp>
     </p:spTree>
     <p:extLst>
       <p:ext uri="{BB962C8B-B14F-4D97-AF65-F5344CB8AC3E}">
-        <p14:creationId xmlns:p14="http://schemas.microsoft.com/office/powerpoint/2010/main" val="1807632402"/>
+        <p14:creationId xmlns:p14="http://schemas.microsoft.com/office/powerpoint/2010/main" val="102645228"/>
       </p:ext>
     </p:extLst>
   </p:cSld>

</xml_diff>